<commit_message>
added ERD and UCD
</commit_message>
<xml_diff>
--- a/Pres.pptx
+++ b/Pres.pptx
@@ -20,7 +20,7 @@
     <p:sldId id="268" r:id="rId15"/>
   </p:sldIdLst>
   <p:sldSz cx="10080625" cy="5670550"/>
-  <p:notesSz cx="7772400" cy="10058400"/>
+  <p:notesSz cx="7559675" cy="10691813"/>
 </p:presentation>
 </file>
 
@@ -75,7 +75,7 @@
         <p:txBody>
           <a:bodyPr/>
           <a:p>
-            <a:fld id="{57F4DE38-2963-4E93-A4E8-04A6C274BA25}" type="slidenum">
+            <a:fld id="{60CE62BC-D18D-42C3-8A81-4F8F8CD18305}" type="slidenum">
               <a:t>&lt;#&gt;</a:t>
             </a:fld>
           </a:p>
@@ -136,8 +136,8 @@
         </p:nvSpPr>
         <p:spPr>
           <a:xfrm>
-            <a:off x="540000" y="270000"/>
-            <a:ext cx="8999280" cy="989280"/>
+            <a:off x="504000" y="226080"/>
+            <a:ext cx="9072000" cy="946440"/>
           </a:xfrm>
           <a:prstGeom prst="rect">
             <a:avLst/>
@@ -174,7 +174,7 @@
         <p:spPr>
           <a:xfrm>
             <a:off x="504000" y="1326600"/>
-            <a:ext cx="9071640" cy="1568160"/>
+            <a:ext cx="9072000" cy="1568520"/>
           </a:xfrm>
           <a:prstGeom prst="rect">
             <a:avLst/>
@@ -190,6 +190,9 @@
           </a:bodyPr>
           <a:p>
             <a:endParaRPr b="0" lang="en-US" sz="3200" spc="-1" strike="noStrike">
+              <a:solidFill>
+                <a:srgbClr val="ffffff"/>
+              </a:solidFill>
               <a:latin typeface="Arial"/>
             </a:endParaRPr>
           </a:p>
@@ -207,8 +210,8 @@
         </p:nvSpPr>
         <p:spPr>
           <a:xfrm>
-            <a:off x="504000" y="3044160"/>
-            <a:ext cx="9071640" cy="1568160"/>
+            <a:off x="504000" y="3044520"/>
+            <a:ext cx="9072000" cy="1568520"/>
           </a:xfrm>
           <a:prstGeom prst="rect">
             <a:avLst/>
@@ -224,6 +227,9 @@
           </a:bodyPr>
           <a:p>
             <a:endParaRPr b="0" lang="en-US" sz="3200" spc="-1" strike="noStrike">
+              <a:solidFill>
+                <a:srgbClr val="ffffff"/>
+              </a:solidFill>
               <a:latin typeface="Arial"/>
             </a:endParaRPr>
           </a:p>
@@ -263,7 +269,7 @@
         <p:txBody>
           <a:bodyPr/>
           <a:p>
-            <a:fld id="{8DA0E4AD-BA26-479F-B432-AF0BA77EA41C}" type="slidenum">
+            <a:fld id="{5D05B66C-CA0C-40A4-A080-2EC41E7A2BD1}" type="slidenum">
               <a:t>&lt;#&gt;</a:t>
             </a:fld>
           </a:p>
@@ -324,8 +330,8 @@
         </p:nvSpPr>
         <p:spPr>
           <a:xfrm>
-            <a:off x="540000" y="270000"/>
-            <a:ext cx="8999280" cy="989280"/>
+            <a:off x="504000" y="226080"/>
+            <a:ext cx="9072000" cy="946440"/>
           </a:xfrm>
           <a:prstGeom prst="rect">
             <a:avLst/>
@@ -362,7 +368,7 @@
         <p:spPr>
           <a:xfrm>
             <a:off x="504000" y="1326600"/>
-            <a:ext cx="4426920" cy="1568160"/>
+            <a:ext cx="4426920" cy="1568520"/>
           </a:xfrm>
           <a:prstGeom prst="rect">
             <a:avLst/>
@@ -378,6 +384,9 @@
           </a:bodyPr>
           <a:p>
             <a:endParaRPr b="0" lang="en-US" sz="3200" spc="-1" strike="noStrike">
+              <a:solidFill>
+                <a:srgbClr val="ffffff"/>
+              </a:solidFill>
               <a:latin typeface="Arial"/>
             </a:endParaRPr>
           </a:p>
@@ -396,7 +405,7 @@
         <p:spPr>
           <a:xfrm>
             <a:off x="5152680" y="1326600"/>
-            <a:ext cx="4426920" cy="1568160"/>
+            <a:ext cx="4426920" cy="1568520"/>
           </a:xfrm>
           <a:prstGeom prst="rect">
             <a:avLst/>
@@ -412,6 +421,9 @@
           </a:bodyPr>
           <a:p>
             <a:endParaRPr b="0" lang="en-US" sz="3200" spc="-1" strike="noStrike">
+              <a:solidFill>
+                <a:srgbClr val="ffffff"/>
+              </a:solidFill>
               <a:latin typeface="Arial"/>
             </a:endParaRPr>
           </a:p>
@@ -429,8 +441,8 @@
         </p:nvSpPr>
         <p:spPr>
           <a:xfrm>
-            <a:off x="504000" y="3044160"/>
-            <a:ext cx="4426920" cy="1568160"/>
+            <a:off x="504000" y="3044520"/>
+            <a:ext cx="4426920" cy="1568520"/>
           </a:xfrm>
           <a:prstGeom prst="rect">
             <a:avLst/>
@@ -446,6 +458,9 @@
           </a:bodyPr>
           <a:p>
             <a:endParaRPr b="0" lang="en-US" sz="3200" spc="-1" strike="noStrike">
+              <a:solidFill>
+                <a:srgbClr val="ffffff"/>
+              </a:solidFill>
               <a:latin typeface="Arial"/>
             </a:endParaRPr>
           </a:p>
@@ -463,8 +478,8 @@
         </p:nvSpPr>
         <p:spPr>
           <a:xfrm>
-            <a:off x="5152680" y="3044160"/>
-            <a:ext cx="4426920" cy="1568160"/>
+            <a:off x="5152680" y="3044520"/>
+            <a:ext cx="4426920" cy="1568520"/>
           </a:xfrm>
           <a:prstGeom prst="rect">
             <a:avLst/>
@@ -480,6 +495,9 @@
           </a:bodyPr>
           <a:p>
             <a:endParaRPr b="0" lang="en-US" sz="3200" spc="-1" strike="noStrike">
+              <a:solidFill>
+                <a:srgbClr val="ffffff"/>
+              </a:solidFill>
               <a:latin typeface="Arial"/>
             </a:endParaRPr>
           </a:p>
@@ -519,7 +537,7 @@
         <p:txBody>
           <a:bodyPr/>
           <a:p>
-            <a:fld id="{AF2D314A-2BE1-4F40-ACC4-B146BDBA8FDE}" type="slidenum">
+            <a:fld id="{E2FD8B02-48C4-435D-84D0-09A8B9839669}" type="slidenum">
               <a:t>&lt;#&gt;</a:t>
             </a:fld>
           </a:p>
@@ -580,8 +598,8 @@
         </p:nvSpPr>
         <p:spPr>
           <a:xfrm>
-            <a:off x="540000" y="270000"/>
-            <a:ext cx="8999280" cy="989280"/>
+            <a:off x="504000" y="226080"/>
+            <a:ext cx="9072000" cy="946440"/>
           </a:xfrm>
           <a:prstGeom prst="rect">
             <a:avLst/>
@@ -618,7 +636,7 @@
         <p:spPr>
           <a:xfrm>
             <a:off x="504000" y="1326600"/>
-            <a:ext cx="2920680" cy="1568160"/>
+            <a:ext cx="2921040" cy="1568520"/>
           </a:xfrm>
           <a:prstGeom prst="rect">
             <a:avLst/>
@@ -634,6 +652,9 @@
           </a:bodyPr>
           <a:p>
             <a:endParaRPr b="0" lang="en-US" sz="3200" spc="-1" strike="noStrike">
+              <a:solidFill>
+                <a:srgbClr val="ffffff"/>
+              </a:solidFill>
               <a:latin typeface="Arial"/>
             </a:endParaRPr>
           </a:p>
@@ -651,8 +672,8 @@
         </p:nvSpPr>
         <p:spPr>
           <a:xfrm>
-            <a:off x="3571200" y="1326600"/>
-            <a:ext cx="2920680" cy="1568160"/>
+            <a:off x="3571560" y="1326600"/>
+            <a:ext cx="2921040" cy="1568520"/>
           </a:xfrm>
           <a:prstGeom prst="rect">
             <a:avLst/>
@@ -668,6 +689,9 @@
           </a:bodyPr>
           <a:p>
             <a:endParaRPr b="0" lang="en-US" sz="3200" spc="-1" strike="noStrike">
+              <a:solidFill>
+                <a:srgbClr val="ffffff"/>
+              </a:solidFill>
               <a:latin typeface="Arial"/>
             </a:endParaRPr>
           </a:p>
@@ -685,8 +709,8 @@
         </p:nvSpPr>
         <p:spPr>
           <a:xfrm>
-            <a:off x="6638040" y="1326600"/>
-            <a:ext cx="2920680" cy="1568160"/>
+            <a:off x="6639120" y="1326600"/>
+            <a:ext cx="2921040" cy="1568520"/>
           </a:xfrm>
           <a:prstGeom prst="rect">
             <a:avLst/>
@@ -702,6 +726,9 @@
           </a:bodyPr>
           <a:p>
             <a:endParaRPr b="0" lang="en-US" sz="3200" spc="-1" strike="noStrike">
+              <a:solidFill>
+                <a:srgbClr val="ffffff"/>
+              </a:solidFill>
               <a:latin typeface="Arial"/>
             </a:endParaRPr>
           </a:p>
@@ -719,8 +746,8 @@
         </p:nvSpPr>
         <p:spPr>
           <a:xfrm>
-            <a:off x="504000" y="3044160"/>
-            <a:ext cx="2920680" cy="1568160"/>
+            <a:off x="504000" y="3044520"/>
+            <a:ext cx="2921040" cy="1568520"/>
           </a:xfrm>
           <a:prstGeom prst="rect">
             <a:avLst/>
@@ -736,6 +763,9 @@
           </a:bodyPr>
           <a:p>
             <a:endParaRPr b="0" lang="en-US" sz="3200" spc="-1" strike="noStrike">
+              <a:solidFill>
+                <a:srgbClr val="ffffff"/>
+              </a:solidFill>
               <a:latin typeface="Arial"/>
             </a:endParaRPr>
           </a:p>
@@ -753,8 +783,8 @@
         </p:nvSpPr>
         <p:spPr>
           <a:xfrm>
-            <a:off x="3571200" y="3044160"/>
-            <a:ext cx="2920680" cy="1568160"/>
+            <a:off x="3571560" y="3044520"/>
+            <a:ext cx="2921040" cy="1568520"/>
           </a:xfrm>
           <a:prstGeom prst="rect">
             <a:avLst/>
@@ -770,6 +800,9 @@
           </a:bodyPr>
           <a:p>
             <a:endParaRPr b="0" lang="en-US" sz="3200" spc="-1" strike="noStrike">
+              <a:solidFill>
+                <a:srgbClr val="ffffff"/>
+              </a:solidFill>
               <a:latin typeface="Arial"/>
             </a:endParaRPr>
           </a:p>
@@ -787,8 +820,8 @@
         </p:nvSpPr>
         <p:spPr>
           <a:xfrm>
-            <a:off x="6638040" y="3044160"/>
-            <a:ext cx="2920680" cy="1568160"/>
+            <a:off x="6639120" y="3044520"/>
+            <a:ext cx="2921040" cy="1568520"/>
           </a:xfrm>
           <a:prstGeom prst="rect">
             <a:avLst/>
@@ -804,6 +837,9 @@
           </a:bodyPr>
           <a:p>
             <a:endParaRPr b="0" lang="en-US" sz="3200" spc="-1" strike="noStrike">
+              <a:solidFill>
+                <a:srgbClr val="ffffff"/>
+              </a:solidFill>
               <a:latin typeface="Arial"/>
             </a:endParaRPr>
           </a:p>
@@ -843,7 +879,7 @@
         <p:txBody>
           <a:bodyPr/>
           <a:p>
-            <a:fld id="{C8966B58-CC0D-4342-AB11-F71FF2502521}" type="slidenum">
+            <a:fld id="{B5829236-92F6-4824-8FB2-582A73BC9B3F}" type="slidenum">
               <a:t>&lt;#&gt;</a:t>
             </a:fld>
           </a:p>
@@ -904,8 +940,8 @@
         </p:nvSpPr>
         <p:spPr>
           <a:xfrm>
-            <a:off x="540000" y="270000"/>
-            <a:ext cx="8999280" cy="989280"/>
+            <a:off x="504000" y="226080"/>
+            <a:ext cx="9072000" cy="946440"/>
           </a:xfrm>
           <a:prstGeom prst="rect">
             <a:avLst/>
@@ -942,7 +978,7 @@
         <p:spPr>
           <a:xfrm>
             <a:off x="504000" y="1326600"/>
-            <a:ext cx="9071640" cy="3288240"/>
+            <a:ext cx="9072000" cy="3288600"/>
           </a:xfrm>
           <a:prstGeom prst="rect">
             <a:avLst/>
@@ -960,7 +996,7 @@
             <a:pPr algn="ctr">
               <a:buNone/>
             </a:pPr>
-            <a:endParaRPr b="0" lang="en-US" sz="3200" spc="-1" strike="noStrike">
+            <a:endParaRPr b="0" lang="en-US" sz="1800" spc="-1" strike="noStrike">
               <a:solidFill>
                 <a:srgbClr val="ffffff"/>
               </a:solidFill>
@@ -1003,7 +1039,7 @@
         <p:txBody>
           <a:bodyPr/>
           <a:p>
-            <a:fld id="{DD552CC7-73BC-41FC-B781-BD3CC762E6A6}" type="slidenum">
+            <a:fld id="{DCE8B458-A53B-4BD1-8BA7-7FB2ACB734BE}" type="slidenum">
               <a:t>&lt;#&gt;</a:t>
             </a:fld>
           </a:p>
@@ -1064,8 +1100,8 @@
         </p:nvSpPr>
         <p:spPr>
           <a:xfrm>
-            <a:off x="540000" y="270000"/>
-            <a:ext cx="8999280" cy="989280"/>
+            <a:off x="504000" y="226080"/>
+            <a:ext cx="9072000" cy="946440"/>
           </a:xfrm>
           <a:prstGeom prst="rect">
             <a:avLst/>
@@ -1102,7 +1138,7 @@
         <p:spPr>
           <a:xfrm>
             <a:off x="504000" y="1326600"/>
-            <a:ext cx="9071640" cy="3288240"/>
+            <a:ext cx="9072000" cy="3288600"/>
           </a:xfrm>
           <a:prstGeom prst="rect">
             <a:avLst/>
@@ -1118,6 +1154,9 @@
           </a:bodyPr>
           <a:p>
             <a:endParaRPr b="0" lang="en-US" sz="3200" spc="-1" strike="noStrike">
+              <a:solidFill>
+                <a:srgbClr val="ffffff"/>
+              </a:solidFill>
               <a:latin typeface="Arial"/>
             </a:endParaRPr>
           </a:p>
@@ -1157,7 +1196,7 @@
         <p:txBody>
           <a:bodyPr/>
           <a:p>
-            <a:fld id="{A1E67B66-2DB6-4465-BE85-0A96A5257D90}" type="slidenum">
+            <a:fld id="{76EE0F88-A546-4F66-AD10-3D2D2FA096A0}" type="slidenum">
               <a:t>&lt;#&gt;</a:t>
             </a:fld>
           </a:p>
@@ -1218,8 +1257,8 @@
         </p:nvSpPr>
         <p:spPr>
           <a:xfrm>
-            <a:off x="540000" y="270000"/>
-            <a:ext cx="8999280" cy="989280"/>
+            <a:off x="504000" y="226080"/>
+            <a:ext cx="9072000" cy="946440"/>
           </a:xfrm>
           <a:prstGeom prst="rect">
             <a:avLst/>
@@ -1256,7 +1295,7 @@
         <p:spPr>
           <a:xfrm>
             <a:off x="504000" y="1326600"/>
-            <a:ext cx="4426920" cy="3288240"/>
+            <a:ext cx="4426920" cy="3288600"/>
           </a:xfrm>
           <a:prstGeom prst="rect">
             <a:avLst/>
@@ -1272,6 +1311,9 @@
           </a:bodyPr>
           <a:p>
             <a:endParaRPr b="0" lang="en-US" sz="3200" spc="-1" strike="noStrike">
+              <a:solidFill>
+                <a:srgbClr val="ffffff"/>
+              </a:solidFill>
               <a:latin typeface="Arial"/>
             </a:endParaRPr>
           </a:p>
@@ -1290,7 +1332,7 @@
         <p:spPr>
           <a:xfrm>
             <a:off x="5152680" y="1326600"/>
-            <a:ext cx="4426920" cy="3288240"/>
+            <a:ext cx="4426920" cy="3288600"/>
           </a:xfrm>
           <a:prstGeom prst="rect">
             <a:avLst/>
@@ -1306,6 +1348,9 @@
           </a:bodyPr>
           <a:p>
             <a:endParaRPr b="0" lang="en-US" sz="3200" spc="-1" strike="noStrike">
+              <a:solidFill>
+                <a:srgbClr val="ffffff"/>
+              </a:solidFill>
               <a:latin typeface="Arial"/>
             </a:endParaRPr>
           </a:p>
@@ -1345,7 +1390,7 @@
         <p:txBody>
           <a:bodyPr/>
           <a:p>
-            <a:fld id="{89E7543E-C000-47A9-ABBE-2BB93105FCDD}" type="slidenum">
+            <a:fld id="{245273D2-C177-4DC0-A17E-5A1D0DA82E57}" type="slidenum">
               <a:t>&lt;#&gt;</a:t>
             </a:fld>
           </a:p>
@@ -1406,8 +1451,8 @@
         </p:nvSpPr>
         <p:spPr>
           <a:xfrm>
-            <a:off x="540000" y="270000"/>
-            <a:ext cx="8999280" cy="989280"/>
+            <a:off x="504000" y="226080"/>
+            <a:ext cx="9072000" cy="946440"/>
           </a:xfrm>
           <a:prstGeom prst="rect">
             <a:avLst/>
@@ -1465,7 +1510,7 @@
         <p:txBody>
           <a:bodyPr/>
           <a:p>
-            <a:fld id="{EA0C5BE2-03E7-44B5-86C0-4EFE801FA176}" type="slidenum">
+            <a:fld id="{942A63D4-A37D-475A-9B63-5F4D7A6BA7B4}" type="slidenum">
               <a:t>&lt;#&gt;</a:t>
             </a:fld>
           </a:p>
@@ -1526,8 +1571,8 @@
         </p:nvSpPr>
         <p:spPr>
           <a:xfrm>
-            <a:off x="540000" y="270000"/>
-            <a:ext cx="8999280" cy="4587120"/>
+            <a:off x="504000" y="226080"/>
+            <a:ext cx="9072000" cy="4388400"/>
           </a:xfrm>
           <a:prstGeom prst="rect">
             <a:avLst/>
@@ -1545,7 +1590,7 @@
             <a:pPr algn="ctr">
               <a:buNone/>
             </a:pPr>
-            <a:endParaRPr b="0" lang="en-US" sz="3200" spc="-1" strike="noStrike">
+            <a:endParaRPr b="0" lang="en-US" sz="1800" spc="-1" strike="noStrike">
               <a:solidFill>
                 <a:srgbClr val="ffffff"/>
               </a:solidFill>
@@ -1588,7 +1633,7 @@
         <p:txBody>
           <a:bodyPr/>
           <a:p>
-            <a:fld id="{BC187AB1-83AE-4918-9F3E-5070DA8BCA55}" type="slidenum">
+            <a:fld id="{24D20A7F-69B2-42C0-9931-71B24D99C2C7}" type="slidenum">
               <a:t>&lt;#&gt;</a:t>
             </a:fld>
           </a:p>
@@ -1649,8 +1694,8 @@
         </p:nvSpPr>
         <p:spPr>
           <a:xfrm>
-            <a:off x="540000" y="270000"/>
-            <a:ext cx="8999280" cy="989280"/>
+            <a:off x="504000" y="226080"/>
+            <a:ext cx="9072000" cy="946440"/>
           </a:xfrm>
           <a:prstGeom prst="rect">
             <a:avLst/>
@@ -1687,7 +1732,7 @@
         <p:spPr>
           <a:xfrm>
             <a:off x="504000" y="1326600"/>
-            <a:ext cx="4426920" cy="1568160"/>
+            <a:ext cx="4426920" cy="1568520"/>
           </a:xfrm>
           <a:prstGeom prst="rect">
             <a:avLst/>
@@ -1703,6 +1748,9 @@
           </a:bodyPr>
           <a:p>
             <a:endParaRPr b="0" lang="en-US" sz="3200" spc="-1" strike="noStrike">
+              <a:solidFill>
+                <a:srgbClr val="ffffff"/>
+              </a:solidFill>
               <a:latin typeface="Arial"/>
             </a:endParaRPr>
           </a:p>
@@ -1721,7 +1769,7 @@
         <p:spPr>
           <a:xfrm>
             <a:off x="5152680" y="1326600"/>
-            <a:ext cx="4426920" cy="3288240"/>
+            <a:ext cx="4426920" cy="3288600"/>
           </a:xfrm>
           <a:prstGeom prst="rect">
             <a:avLst/>
@@ -1737,6 +1785,9 @@
           </a:bodyPr>
           <a:p>
             <a:endParaRPr b="0" lang="en-US" sz="3200" spc="-1" strike="noStrike">
+              <a:solidFill>
+                <a:srgbClr val="ffffff"/>
+              </a:solidFill>
               <a:latin typeface="Arial"/>
             </a:endParaRPr>
           </a:p>
@@ -1754,8 +1805,8 @@
         </p:nvSpPr>
         <p:spPr>
           <a:xfrm>
-            <a:off x="504000" y="3044160"/>
-            <a:ext cx="4426920" cy="1568160"/>
+            <a:off x="504000" y="3044520"/>
+            <a:ext cx="4426920" cy="1568520"/>
           </a:xfrm>
           <a:prstGeom prst="rect">
             <a:avLst/>
@@ -1771,6 +1822,9 @@
           </a:bodyPr>
           <a:p>
             <a:endParaRPr b="0" lang="en-US" sz="3200" spc="-1" strike="noStrike">
+              <a:solidFill>
+                <a:srgbClr val="ffffff"/>
+              </a:solidFill>
               <a:latin typeface="Arial"/>
             </a:endParaRPr>
           </a:p>
@@ -1810,7 +1864,7 @@
         <p:txBody>
           <a:bodyPr/>
           <a:p>
-            <a:fld id="{3F4DA9B6-F928-45FF-A746-C32D0BC9A6F7}" type="slidenum">
+            <a:fld id="{BBF9ED85-9248-43B2-A24C-D08AAB2307BA}" type="slidenum">
               <a:t>&lt;#&gt;</a:t>
             </a:fld>
           </a:p>
@@ -1871,8 +1925,8 @@
         </p:nvSpPr>
         <p:spPr>
           <a:xfrm>
-            <a:off x="540000" y="270000"/>
-            <a:ext cx="8999280" cy="989280"/>
+            <a:off x="504000" y="226080"/>
+            <a:ext cx="9072000" cy="946440"/>
           </a:xfrm>
           <a:prstGeom prst="rect">
             <a:avLst/>
@@ -1909,7 +1963,7 @@
         <p:spPr>
           <a:xfrm>
             <a:off x="504000" y="1326600"/>
-            <a:ext cx="4426920" cy="3288240"/>
+            <a:ext cx="4426920" cy="3288600"/>
           </a:xfrm>
           <a:prstGeom prst="rect">
             <a:avLst/>
@@ -1925,6 +1979,9 @@
           </a:bodyPr>
           <a:p>
             <a:endParaRPr b="0" lang="en-US" sz="3200" spc="-1" strike="noStrike">
+              <a:solidFill>
+                <a:srgbClr val="ffffff"/>
+              </a:solidFill>
               <a:latin typeface="Arial"/>
             </a:endParaRPr>
           </a:p>
@@ -1943,7 +2000,7 @@
         <p:spPr>
           <a:xfrm>
             <a:off x="5152680" y="1326600"/>
-            <a:ext cx="4426920" cy="1568160"/>
+            <a:ext cx="4426920" cy="1568520"/>
           </a:xfrm>
           <a:prstGeom prst="rect">
             <a:avLst/>
@@ -1959,6 +2016,9 @@
           </a:bodyPr>
           <a:p>
             <a:endParaRPr b="0" lang="en-US" sz="3200" spc="-1" strike="noStrike">
+              <a:solidFill>
+                <a:srgbClr val="ffffff"/>
+              </a:solidFill>
               <a:latin typeface="Arial"/>
             </a:endParaRPr>
           </a:p>
@@ -1976,8 +2036,8 @@
         </p:nvSpPr>
         <p:spPr>
           <a:xfrm>
-            <a:off x="5152680" y="3044160"/>
-            <a:ext cx="4426920" cy="1568160"/>
+            <a:off x="5152680" y="3044520"/>
+            <a:ext cx="4426920" cy="1568520"/>
           </a:xfrm>
           <a:prstGeom prst="rect">
             <a:avLst/>
@@ -1993,6 +2053,9 @@
           </a:bodyPr>
           <a:p>
             <a:endParaRPr b="0" lang="en-US" sz="3200" spc="-1" strike="noStrike">
+              <a:solidFill>
+                <a:srgbClr val="ffffff"/>
+              </a:solidFill>
               <a:latin typeface="Arial"/>
             </a:endParaRPr>
           </a:p>
@@ -2032,7 +2095,7 @@
         <p:txBody>
           <a:bodyPr/>
           <a:p>
-            <a:fld id="{24A2AB38-EA0D-4C79-9B87-3A7D9E0F5C29}" type="slidenum">
+            <a:fld id="{4F4C3CD7-4AD9-4F85-92AC-9144151E5A2C}" type="slidenum">
               <a:t>&lt;#&gt;</a:t>
             </a:fld>
           </a:p>
@@ -2093,8 +2156,8 @@
         </p:nvSpPr>
         <p:spPr>
           <a:xfrm>
-            <a:off x="540000" y="270000"/>
-            <a:ext cx="8999280" cy="989280"/>
+            <a:off x="504000" y="226080"/>
+            <a:ext cx="9072000" cy="946440"/>
           </a:xfrm>
           <a:prstGeom prst="rect">
             <a:avLst/>
@@ -2131,7 +2194,7 @@
         <p:spPr>
           <a:xfrm>
             <a:off x="504000" y="1326600"/>
-            <a:ext cx="4426920" cy="1568160"/>
+            <a:ext cx="4426920" cy="1568520"/>
           </a:xfrm>
           <a:prstGeom prst="rect">
             <a:avLst/>
@@ -2147,6 +2210,9 @@
           </a:bodyPr>
           <a:p>
             <a:endParaRPr b="0" lang="en-US" sz="3200" spc="-1" strike="noStrike">
+              <a:solidFill>
+                <a:srgbClr val="ffffff"/>
+              </a:solidFill>
               <a:latin typeface="Arial"/>
             </a:endParaRPr>
           </a:p>
@@ -2165,7 +2231,7 @@
         <p:spPr>
           <a:xfrm>
             <a:off x="5152680" y="1326600"/>
-            <a:ext cx="4426920" cy="1568160"/>
+            <a:ext cx="4426920" cy="1568520"/>
           </a:xfrm>
           <a:prstGeom prst="rect">
             <a:avLst/>
@@ -2181,6 +2247,9 @@
           </a:bodyPr>
           <a:p>
             <a:endParaRPr b="0" lang="en-US" sz="3200" spc="-1" strike="noStrike">
+              <a:solidFill>
+                <a:srgbClr val="ffffff"/>
+              </a:solidFill>
               <a:latin typeface="Arial"/>
             </a:endParaRPr>
           </a:p>
@@ -2198,8 +2267,8 @@
         </p:nvSpPr>
         <p:spPr>
           <a:xfrm>
-            <a:off x="504000" y="3044160"/>
-            <a:ext cx="9071640" cy="1568160"/>
+            <a:off x="504000" y="3044520"/>
+            <a:ext cx="9072000" cy="1568520"/>
           </a:xfrm>
           <a:prstGeom prst="rect">
             <a:avLst/>
@@ -2215,6 +2284,9 @@
           </a:bodyPr>
           <a:p>
             <a:endParaRPr b="0" lang="en-US" sz="3200" spc="-1" strike="noStrike">
+              <a:solidFill>
+                <a:srgbClr val="ffffff"/>
+              </a:solidFill>
               <a:latin typeface="Arial"/>
             </a:endParaRPr>
           </a:p>
@@ -2254,7 +2326,7 @@
         <p:txBody>
           <a:bodyPr/>
           <a:p>
-            <a:fld id="{E2299770-D169-424C-8120-3DBB0AF3FF84}" type="slidenum">
+            <a:fld id="{ADAC92BE-6A66-4DF8-9CE2-F7B7B3496588}" type="slidenum">
               <a:t>&lt;#&gt;</a:t>
             </a:fld>
           </a:p>
@@ -2312,7 +2384,7 @@
         <p:spPr>
           <a:xfrm>
             <a:off x="0" y="0"/>
-            <a:ext cx="10079280" cy="5669280"/>
+            <a:ext cx="10078920" cy="5668920"/>
           </a:xfrm>
           <a:prstGeom prst="rect">
             <a:avLst/>
@@ -2348,7 +2420,7 @@
         <p:spPr>
           <a:xfrm>
             <a:off x="1440000" y="1080000"/>
-            <a:ext cx="1439280" cy="1259280"/>
+            <a:ext cx="1438920" cy="1258920"/>
           </a:xfrm>
           <a:prstGeom prst="ellipse">
             <a:avLst/>
@@ -2378,7 +2450,7 @@
         <p:spPr>
           <a:xfrm>
             <a:off x="7380000" y="3960000"/>
-            <a:ext cx="1439280" cy="1259280"/>
+            <a:ext cx="1438920" cy="1258920"/>
           </a:xfrm>
           <a:prstGeom prst="ellipse">
             <a:avLst/>
@@ -2408,7 +2480,7 @@
         <p:spPr>
           <a:xfrm>
             <a:off x="9000000" y="2700000"/>
-            <a:ext cx="1259280" cy="1079280"/>
+            <a:ext cx="1258920" cy="1078920"/>
           </a:xfrm>
           <a:prstGeom prst="ellipse">
             <a:avLst/>
@@ -2438,7 +2510,7 @@
         <p:spPr>
           <a:xfrm>
             <a:off x="-180000" y="2430000"/>
-            <a:ext cx="1439280" cy="1349280"/>
+            <a:ext cx="1438920" cy="1348920"/>
           </a:xfrm>
           <a:prstGeom prst="ellipse">
             <a:avLst/>
@@ -2468,7 +2540,7 @@
         <p:spPr>
           <a:xfrm>
             <a:off x="540000" y="1080000"/>
-            <a:ext cx="719280" cy="719280"/>
+            <a:ext cx="718920" cy="718920"/>
           </a:xfrm>
           <a:prstGeom prst="ellipse">
             <a:avLst/>
@@ -2498,7 +2570,7 @@
         <p:spPr>
           <a:xfrm>
             <a:off x="0" y="1260000"/>
-            <a:ext cx="719280" cy="719280"/>
+            <a:ext cx="718920" cy="718920"/>
           </a:xfrm>
           <a:prstGeom prst="ellipse">
             <a:avLst/>
@@ -2528,7 +2600,7 @@
         <p:spPr>
           <a:xfrm>
             <a:off x="0" y="5220000"/>
-            <a:ext cx="1619280" cy="1259280"/>
+            <a:ext cx="1618920" cy="1258920"/>
           </a:xfrm>
           <a:prstGeom prst="ellipse">
             <a:avLst/>
@@ -2558,7 +2630,7 @@
         <p:spPr>
           <a:xfrm>
             <a:off x="9720000" y="4680000"/>
-            <a:ext cx="719280" cy="719280"/>
+            <a:ext cx="718920" cy="718920"/>
           </a:xfrm>
           <a:prstGeom prst="ellipse">
             <a:avLst/>
@@ -2588,7 +2660,7 @@
         <p:spPr>
           <a:xfrm>
             <a:off x="9540000" y="3420000"/>
-            <a:ext cx="719280" cy="719280"/>
+            <a:ext cx="718920" cy="718920"/>
           </a:xfrm>
           <a:prstGeom prst="ellipse">
             <a:avLst/>
@@ -2618,7 +2690,7 @@
         <p:spPr>
           <a:xfrm>
             <a:off x="8100000" y="4680000"/>
-            <a:ext cx="1079280" cy="841680"/>
+            <a:ext cx="1078920" cy="841320"/>
           </a:xfrm>
           <a:prstGeom prst="ellipse">
             <a:avLst/>
@@ -2648,7 +2720,7 @@
         <p:spPr>
           <a:xfrm>
             <a:off x="7920000" y="5400000"/>
-            <a:ext cx="899280" cy="899280"/>
+            <a:ext cx="898920" cy="898920"/>
           </a:xfrm>
           <a:prstGeom prst="ellipse">
             <a:avLst/>
@@ -2676,248 +2748,13 @@
             <a:spLocks noGrp="1"/>
           </p:cNvSpPr>
           <p:nvPr>
-            <p:ph type="title"/>
-          </p:nvPr>
-        </p:nvSpPr>
-        <p:spPr>
-          <a:xfrm>
-            <a:off x="540000" y="270000"/>
-            <a:ext cx="8999280" cy="989280"/>
-          </a:xfrm>
-          <a:prstGeom prst="rect">
-            <a:avLst/>
-          </a:prstGeom>
-          <a:noFill/>
-          <a:ln w="0">
-            <a:noFill/>
-          </a:ln>
-        </p:spPr>
-        <p:txBody>
-          <a:bodyPr lIns="0" rIns="0" tIns="0" bIns="0" anchor="ctr">
-            <a:noAutofit/>
-          </a:bodyPr>
-          <a:p>
-            <a:r>
-              <a:rPr b="0" lang="en-US" sz="1800" spc="-1" strike="noStrike">
-                <a:latin typeface="Arial"/>
-              </a:rPr>
-              <a:t>Click to edit </a:t>
-            </a:r>
-            <a:r>
-              <a:rPr b="0" lang="en-US" sz="1800" spc="-1" strike="noStrike">
-                <a:latin typeface="Arial"/>
-              </a:rPr>
-              <a:t>the title text </a:t>
-            </a:r>
-            <a:r>
-              <a:rPr b="0" lang="en-US" sz="1800" spc="-1" strike="noStrike">
-                <a:latin typeface="Arial"/>
-              </a:rPr>
-              <a:t>format</a:t>
-            </a:r>
-            <a:endParaRPr b="0" lang="en-US" sz="1800" spc="-1" strike="noStrike">
-              <a:latin typeface="Arial"/>
-            </a:endParaRPr>
-          </a:p>
-        </p:txBody>
-      </p:sp>
-      <p:sp>
-        <p:nvSpPr>
-          <p:cNvPr id="13" name="PlaceHolder 2"/>
-          <p:cNvSpPr>
-            <a:spLocks noGrp="1"/>
-          </p:cNvSpPr>
-          <p:nvPr>
-            <p:ph type="body"/>
-          </p:nvPr>
-        </p:nvSpPr>
-        <p:spPr>
-          <a:xfrm>
-            <a:off x="504000" y="1326600"/>
-            <a:ext cx="9071640" cy="3288240"/>
-          </a:xfrm>
-          <a:prstGeom prst="rect">
-            <a:avLst/>
-          </a:prstGeom>
-          <a:noFill/>
-          <a:ln w="0">
-            <a:noFill/>
-          </a:ln>
-        </p:spPr>
-        <p:txBody>
-          <a:bodyPr lIns="0" rIns="0" tIns="0" bIns="0" anchor="t">
-            <a:normAutofit/>
-          </a:bodyPr>
-          <a:p>
-            <a:pPr marL="432000" indent="-324000">
-              <a:spcBef>
-                <a:spcPts val="1417"/>
-              </a:spcBef>
-              <a:buClr>
-                <a:srgbClr val="000000"/>
-              </a:buClr>
-              <a:buSzPct val="45000"/>
-              <a:buFont typeface="Wingdings" charset="2"/>
-              <a:buChar char=""/>
-            </a:pPr>
-            <a:r>
-              <a:rPr b="0" lang="en-US" sz="1800" spc="-1" strike="noStrike">
-                <a:latin typeface="Arial"/>
-              </a:rPr>
-              <a:t>Click to edit the outline text format</a:t>
-            </a:r>
-            <a:endParaRPr b="0" lang="en-US" sz="1800" spc="-1" strike="noStrike">
-              <a:latin typeface="Arial"/>
-            </a:endParaRPr>
-          </a:p>
-          <a:p>
-            <a:pPr lvl="1" marL="864000" indent="-324000">
-              <a:spcBef>
-                <a:spcPts val="1134"/>
-              </a:spcBef>
-              <a:buClr>
-                <a:srgbClr val="000000"/>
-              </a:buClr>
-              <a:buSzPct val="75000"/>
-              <a:buFont typeface="Symbol" charset="2"/>
-              <a:buChar char=""/>
-            </a:pPr>
-            <a:r>
-              <a:rPr b="0" lang="en-US" sz="1800" spc="-1" strike="noStrike">
-                <a:latin typeface="Arial"/>
-              </a:rPr>
-              <a:t>Second Outline Level</a:t>
-            </a:r>
-            <a:endParaRPr b="0" lang="en-US" sz="1800" spc="-1" strike="noStrike">
-              <a:latin typeface="Arial"/>
-            </a:endParaRPr>
-          </a:p>
-          <a:p>
-            <a:pPr lvl="2" marL="1296000" indent="-288000">
-              <a:spcBef>
-                <a:spcPts val="850"/>
-              </a:spcBef>
-              <a:buClr>
-                <a:srgbClr val="000000"/>
-              </a:buClr>
-              <a:buSzPct val="45000"/>
-              <a:buFont typeface="Wingdings" charset="2"/>
-              <a:buChar char=""/>
-            </a:pPr>
-            <a:r>
-              <a:rPr b="0" lang="en-US" sz="1800" spc="-1" strike="noStrike">
-                <a:latin typeface="Arial"/>
-              </a:rPr>
-              <a:t>Third Outline Level</a:t>
-            </a:r>
-            <a:endParaRPr b="0" lang="en-US" sz="1800" spc="-1" strike="noStrike">
-              <a:latin typeface="Arial"/>
-            </a:endParaRPr>
-          </a:p>
-          <a:p>
-            <a:pPr lvl="3" marL="1728000" indent="-216000">
-              <a:spcBef>
-                <a:spcPts val="567"/>
-              </a:spcBef>
-              <a:buClr>
-                <a:srgbClr val="000000"/>
-              </a:buClr>
-              <a:buSzPct val="75000"/>
-              <a:buFont typeface="Symbol" charset="2"/>
-              <a:buChar char=""/>
-            </a:pPr>
-            <a:r>
-              <a:rPr b="0" lang="en-US" sz="1800" spc="-1" strike="noStrike">
-                <a:latin typeface="Arial"/>
-              </a:rPr>
-              <a:t>Fourth Outline Level</a:t>
-            </a:r>
-            <a:endParaRPr b="0" lang="en-US" sz="1800" spc="-1" strike="noStrike">
-              <a:latin typeface="Arial"/>
-            </a:endParaRPr>
-          </a:p>
-          <a:p>
-            <a:pPr lvl="4" marL="2160000" indent="-216000">
-              <a:spcBef>
-                <a:spcPts val="283"/>
-              </a:spcBef>
-              <a:buClr>
-                <a:srgbClr val="000000"/>
-              </a:buClr>
-              <a:buSzPct val="45000"/>
-              <a:buFont typeface="Wingdings" charset="2"/>
-              <a:buChar char=""/>
-            </a:pPr>
-            <a:r>
-              <a:rPr b="0" lang="en-US" sz="1800" spc="-1" strike="noStrike">
-                <a:latin typeface="Arial"/>
-              </a:rPr>
-              <a:t>Fifth Outline Level</a:t>
-            </a:r>
-            <a:endParaRPr b="0" lang="en-US" sz="1800" spc="-1" strike="noStrike">
-              <a:latin typeface="Arial"/>
-            </a:endParaRPr>
-          </a:p>
-          <a:p>
-            <a:pPr lvl="5" marL="2592000" indent="-216000">
-              <a:spcBef>
-                <a:spcPts val="283"/>
-              </a:spcBef>
-              <a:buClr>
-                <a:srgbClr val="000000"/>
-              </a:buClr>
-              <a:buSzPct val="45000"/>
-              <a:buFont typeface="Wingdings" charset="2"/>
-              <a:buChar char=""/>
-            </a:pPr>
-            <a:r>
-              <a:rPr b="0" lang="en-US" sz="1800" spc="-1" strike="noStrike">
-                <a:latin typeface="Arial"/>
-              </a:rPr>
-              <a:t>Sixth Outline Level</a:t>
-            </a:r>
-            <a:endParaRPr b="0" lang="en-US" sz="1800" spc="-1" strike="noStrike">
-              <a:latin typeface="Arial"/>
-            </a:endParaRPr>
-          </a:p>
-          <a:p>
-            <a:pPr lvl="6" marL="3024000" indent="-216000">
-              <a:spcBef>
-                <a:spcPts val="283"/>
-              </a:spcBef>
-              <a:buClr>
-                <a:srgbClr val="000000"/>
-              </a:buClr>
-              <a:buSzPct val="45000"/>
-              <a:buFont typeface="Wingdings" charset="2"/>
-              <a:buChar char=""/>
-            </a:pPr>
-            <a:r>
-              <a:rPr b="0" lang="en-US" sz="1800" spc="-1" strike="noStrike">
-                <a:latin typeface="Arial"/>
-              </a:rPr>
-              <a:t>Seventh Outline Level</a:t>
-            </a:r>
-            <a:endParaRPr b="0" lang="en-US" sz="1800" spc="-1" strike="noStrike">
-              <a:latin typeface="Arial"/>
-            </a:endParaRPr>
-          </a:p>
-        </p:txBody>
-      </p:sp>
-      <p:sp>
-        <p:nvSpPr>
-          <p:cNvPr id="14" name="PlaceHolder 3"/>
-          <p:cNvSpPr>
-            <a:spLocks noGrp="1"/>
-          </p:cNvSpPr>
-          <p:nvPr>
             <p:ph type="ftr" idx="1"/>
           </p:nvPr>
         </p:nvSpPr>
         <p:spPr>
           <a:xfrm>
             <a:off x="3420000" y="5130000"/>
-            <a:ext cx="3239280" cy="391680"/>
+            <a:ext cx="3238920" cy="391320"/>
           </a:xfrm>
           <a:prstGeom prst="rect">
             <a:avLst/>
@@ -2969,7 +2806,7 @@
       </p:sp>
       <p:sp>
         <p:nvSpPr>
-          <p:cNvPr id="15" name="PlaceHolder 4"/>
+          <p:cNvPr id="13" name="PlaceHolder 2"/>
           <p:cNvSpPr>
             <a:spLocks noGrp="1"/>
           </p:cNvSpPr>
@@ -2980,7 +2817,7 @@
         <p:spPr>
           <a:xfrm>
             <a:off x="7560000" y="5130000"/>
-            <a:ext cx="2339280" cy="391680"/>
+            <a:ext cx="2338920" cy="391320"/>
           </a:xfrm>
           <a:prstGeom prst="rect">
             <a:avLst/>
@@ -3015,7 +2852,7 @@
               </a:lnSpc>
               <a:buNone/>
             </a:pPr>
-            <a:fld id="{B86FCEB2-F90E-4836-AAB5-27B42ED048B0}" type="slidenum">
+            <a:fld id="{E248D9A1-1867-4C89-9975-D15BB7D53C59}" type="slidenum">
               <a:rPr b="0" lang="en-US" sz="1400" spc="-1" strike="noStrike">
                 <a:solidFill>
                   <a:srgbClr val="ffffff"/>
@@ -3032,7 +2869,7 @@
       </p:sp>
       <p:sp>
         <p:nvSpPr>
-          <p:cNvPr id="16" name="PlaceHolder 5"/>
+          <p:cNvPr id="14" name="PlaceHolder 3"/>
           <p:cNvSpPr>
             <a:spLocks noGrp="1"/>
           </p:cNvSpPr>
@@ -3043,7 +2880,7 @@
         <p:spPr>
           <a:xfrm>
             <a:off x="180000" y="5130000"/>
-            <a:ext cx="2339280" cy="391680"/>
+            <a:ext cx="2338920" cy="391320"/>
           </a:xfrm>
           <a:prstGeom prst="rect">
             <a:avLst/>
@@ -3073,6 +2910,316 @@
             </a:r>
             <a:endParaRPr b="0" lang="en-US" sz="1400" spc="-1" strike="noStrike">
               <a:latin typeface="Times New Roman"/>
+            </a:endParaRPr>
+          </a:p>
+        </p:txBody>
+      </p:sp>
+      <p:sp>
+        <p:nvSpPr>
+          <p:cNvPr id="15" name="PlaceHolder 4"/>
+          <p:cNvSpPr>
+            <a:spLocks noGrp="1"/>
+          </p:cNvSpPr>
+          <p:nvPr>
+            <p:ph type="title"/>
+          </p:nvPr>
+        </p:nvSpPr>
+        <p:spPr>
+          <a:xfrm>
+            <a:off x="504000" y="226080"/>
+            <a:ext cx="9072000" cy="946440"/>
+          </a:xfrm>
+          <a:prstGeom prst="rect">
+            <a:avLst/>
+          </a:prstGeom>
+          <a:noFill/>
+          <a:ln w="0">
+            <a:noFill/>
+          </a:ln>
+        </p:spPr>
+        <p:txBody>
+          <a:bodyPr lIns="0" rIns="0" tIns="0" bIns="0" anchor="ctr">
+            <a:noAutofit/>
+          </a:bodyPr>
+          <a:p>
+            <a:pPr algn="ctr">
+              <a:buNone/>
+            </a:pPr>
+            <a:r>
+              <a:rPr b="0" lang="en-US" sz="4400" spc="-1" strike="noStrike">
+                <a:latin typeface="Arial"/>
+              </a:rPr>
+              <a:t>Clic</a:t>
+            </a:r>
+            <a:r>
+              <a:rPr b="0" lang="en-US" sz="4400" spc="-1" strike="noStrike">
+                <a:latin typeface="Arial"/>
+              </a:rPr>
+              <a:t>k to </a:t>
+            </a:r>
+            <a:r>
+              <a:rPr b="0" lang="en-US" sz="4400" spc="-1" strike="noStrike">
+                <a:latin typeface="Arial"/>
+              </a:rPr>
+              <a:t>edit </a:t>
+            </a:r>
+            <a:r>
+              <a:rPr b="0" lang="en-US" sz="4400" spc="-1" strike="noStrike">
+                <a:latin typeface="Arial"/>
+              </a:rPr>
+              <a:t>the </a:t>
+            </a:r>
+            <a:r>
+              <a:rPr b="0" lang="en-US" sz="4400" spc="-1" strike="noStrike">
+                <a:latin typeface="Arial"/>
+              </a:rPr>
+              <a:t>title </a:t>
+            </a:r>
+            <a:r>
+              <a:rPr b="0" lang="en-US" sz="4400" spc="-1" strike="noStrike">
+                <a:latin typeface="Arial"/>
+              </a:rPr>
+              <a:t>text </a:t>
+            </a:r>
+            <a:r>
+              <a:rPr b="0" lang="en-US" sz="4400" spc="-1" strike="noStrike">
+                <a:latin typeface="Arial"/>
+              </a:rPr>
+              <a:t>form</a:t>
+            </a:r>
+            <a:r>
+              <a:rPr b="0" lang="en-US" sz="4400" spc="-1" strike="noStrike">
+                <a:latin typeface="Arial"/>
+              </a:rPr>
+              <a:t>at</a:t>
+            </a:r>
+            <a:endParaRPr b="0" lang="en-US" sz="4400" spc="-1" strike="noStrike">
+              <a:latin typeface="Arial"/>
+            </a:endParaRPr>
+          </a:p>
+        </p:txBody>
+      </p:sp>
+      <p:sp>
+        <p:nvSpPr>
+          <p:cNvPr id="16" name="PlaceHolder 5"/>
+          <p:cNvSpPr>
+            <a:spLocks noGrp="1"/>
+          </p:cNvSpPr>
+          <p:nvPr>
+            <p:ph type="body"/>
+          </p:nvPr>
+        </p:nvSpPr>
+        <p:spPr>
+          <a:xfrm>
+            <a:off x="504000" y="1326600"/>
+            <a:ext cx="9072000" cy="3288600"/>
+          </a:xfrm>
+          <a:prstGeom prst="rect">
+            <a:avLst/>
+          </a:prstGeom>
+          <a:noFill/>
+          <a:ln w="0">
+            <a:noFill/>
+          </a:ln>
+        </p:spPr>
+        <p:txBody>
+          <a:bodyPr lIns="0" rIns="0" tIns="0" bIns="0" anchor="t">
+            <a:normAutofit/>
+          </a:bodyPr>
+          <a:p>
+            <a:pPr marL="432000" indent="-324000">
+              <a:spcBef>
+                <a:spcPts val="1417"/>
+              </a:spcBef>
+              <a:buClr>
+                <a:srgbClr val="000000"/>
+              </a:buClr>
+              <a:buSzPct val="45000"/>
+              <a:buFont typeface="Wingdings" charset="2"/>
+              <a:buChar char=""/>
+            </a:pPr>
+            <a:r>
+              <a:rPr b="0" lang="en-US" sz="3200" spc="-1" strike="noStrike">
+                <a:solidFill>
+                  <a:srgbClr val="ffffff"/>
+                </a:solidFill>
+                <a:latin typeface="Arial"/>
+              </a:rPr>
+              <a:t>Click to edit the outline text format</a:t>
+            </a:r>
+            <a:endParaRPr b="0" lang="en-US" sz="3200" spc="-1" strike="noStrike">
+              <a:solidFill>
+                <a:srgbClr val="ffffff"/>
+              </a:solidFill>
+              <a:latin typeface="Arial"/>
+            </a:endParaRPr>
+          </a:p>
+          <a:p>
+            <a:pPr lvl="1" marL="864000" indent="-324000">
+              <a:spcBef>
+                <a:spcPts val="1134"/>
+              </a:spcBef>
+              <a:buClr>
+                <a:srgbClr val="000000"/>
+              </a:buClr>
+              <a:buSzPct val="75000"/>
+              <a:buFont typeface="Symbol" charset="2"/>
+              <a:buChar char=""/>
+            </a:pPr>
+            <a:r>
+              <a:rPr b="0" lang="en-US" sz="2800" spc="-1" strike="noStrike">
+                <a:solidFill>
+                  <a:srgbClr val="ffffff"/>
+                </a:solidFill>
+                <a:latin typeface="Arial"/>
+              </a:rPr>
+              <a:t>Second Outline Level</a:t>
+            </a:r>
+            <a:endParaRPr b="0" lang="en-US" sz="2800" spc="-1" strike="noStrike">
+              <a:solidFill>
+                <a:srgbClr val="ffffff"/>
+              </a:solidFill>
+              <a:latin typeface="Arial"/>
+            </a:endParaRPr>
+          </a:p>
+          <a:p>
+            <a:pPr lvl="2" marL="1296000" indent="-288000">
+              <a:spcBef>
+                <a:spcPts val="850"/>
+              </a:spcBef>
+              <a:buClr>
+                <a:srgbClr val="000000"/>
+              </a:buClr>
+              <a:buSzPct val="45000"/>
+              <a:buFont typeface="Wingdings" charset="2"/>
+              <a:buChar char=""/>
+            </a:pPr>
+            <a:r>
+              <a:rPr b="0" lang="en-US" sz="2400" spc="-1" strike="noStrike">
+                <a:solidFill>
+                  <a:srgbClr val="ffffff"/>
+                </a:solidFill>
+                <a:latin typeface="Arial"/>
+              </a:rPr>
+              <a:t>Third Outline Level</a:t>
+            </a:r>
+            <a:endParaRPr b="0" lang="en-US" sz="2400" spc="-1" strike="noStrike">
+              <a:solidFill>
+                <a:srgbClr val="ffffff"/>
+              </a:solidFill>
+              <a:latin typeface="Arial"/>
+            </a:endParaRPr>
+          </a:p>
+          <a:p>
+            <a:pPr lvl="3" marL="1728000" indent="-216000">
+              <a:spcBef>
+                <a:spcPts val="567"/>
+              </a:spcBef>
+              <a:buClr>
+                <a:srgbClr val="000000"/>
+              </a:buClr>
+              <a:buSzPct val="75000"/>
+              <a:buFont typeface="Symbol" charset="2"/>
+              <a:buChar char=""/>
+            </a:pPr>
+            <a:r>
+              <a:rPr b="0" lang="en-US" sz="2000" spc="-1" strike="noStrike">
+                <a:solidFill>
+                  <a:srgbClr val="ffffff"/>
+                </a:solidFill>
+                <a:latin typeface="Arial"/>
+              </a:rPr>
+              <a:t>Fourth Outline Level</a:t>
+            </a:r>
+            <a:endParaRPr b="0" lang="en-US" sz="2000" spc="-1" strike="noStrike">
+              <a:solidFill>
+                <a:srgbClr val="ffffff"/>
+              </a:solidFill>
+              <a:latin typeface="Arial"/>
+            </a:endParaRPr>
+          </a:p>
+          <a:p>
+            <a:pPr lvl="4" marL="2160000" indent="-216000">
+              <a:spcBef>
+                <a:spcPts val="283"/>
+              </a:spcBef>
+              <a:buClr>
+                <a:srgbClr val="000000"/>
+              </a:buClr>
+              <a:buSzPct val="45000"/>
+              <a:buFont typeface="Wingdings" charset="2"/>
+              <a:buChar char=""/>
+            </a:pPr>
+            <a:r>
+              <a:rPr b="0" lang="en-US" sz="2000" spc="-1" strike="noStrike">
+                <a:solidFill>
+                  <a:srgbClr val="ffffff"/>
+                </a:solidFill>
+                <a:latin typeface="Arial"/>
+              </a:rPr>
+              <a:t>Fifth Outline Level</a:t>
+            </a:r>
+            <a:endParaRPr b="0" lang="en-US" sz="2000" spc="-1" strike="noStrike">
+              <a:solidFill>
+                <a:srgbClr val="ffffff"/>
+              </a:solidFill>
+              <a:latin typeface="Arial"/>
+            </a:endParaRPr>
+          </a:p>
+          <a:p>
+            <a:pPr lvl="5" marL="2592000" indent="-216000">
+              <a:spcBef>
+                <a:spcPts val="283"/>
+              </a:spcBef>
+              <a:buClr>
+                <a:srgbClr val="000000"/>
+              </a:buClr>
+              <a:buSzPct val="45000"/>
+              <a:buFont typeface="Wingdings" charset="2"/>
+              <a:buChar char=""/>
+            </a:pPr>
+            <a:r>
+              <a:rPr b="0" lang="en-US" sz="2000" spc="-1" strike="noStrike">
+                <a:solidFill>
+                  <a:srgbClr val="ffffff"/>
+                </a:solidFill>
+                <a:latin typeface="Arial"/>
+              </a:rPr>
+              <a:t>Sixth Outline Level</a:t>
+            </a:r>
+            <a:endParaRPr b="0" lang="en-US" sz="2000" spc="-1" strike="noStrike">
+              <a:solidFill>
+                <a:srgbClr val="ffffff"/>
+              </a:solidFill>
+              <a:latin typeface="Arial"/>
+            </a:endParaRPr>
+          </a:p>
+          <a:p>
+            <a:pPr lvl="6" marL="3024000" indent="-216000">
+              <a:spcBef>
+                <a:spcPts val="283"/>
+              </a:spcBef>
+              <a:buClr>
+                <a:srgbClr val="000000"/>
+              </a:buClr>
+              <a:buSzPct val="45000"/>
+              <a:buFont typeface="Wingdings" charset="2"/>
+              <a:buChar char=""/>
+            </a:pPr>
+            <a:r>
+              <a:rPr b="0" lang="en-US" sz="2000" spc="-1" strike="noStrike">
+                <a:solidFill>
+                  <a:srgbClr val="ffffff"/>
+                </a:solidFill>
+                <a:latin typeface="Arial"/>
+              </a:rPr>
+              <a:t>Seventh Outline Level</a:t>
+            </a:r>
+            <a:endParaRPr b="0" lang="en-US" sz="2000" spc="-1" strike="noStrike">
+              <a:solidFill>
+                <a:srgbClr val="ffffff"/>
+              </a:solidFill>
+              <a:latin typeface="Arial"/>
             </a:endParaRPr>
           </a:p>
         </p:txBody>
@@ -3127,7 +3274,7 @@
         <p:spPr>
           <a:xfrm>
             <a:off x="504000" y="1428840"/>
-            <a:ext cx="9070920" cy="946080"/>
+            <a:ext cx="9070560" cy="945720"/>
           </a:xfrm>
           <a:prstGeom prst="rect">
             <a:avLst/>
@@ -3155,7 +3302,16 @@
                 </a:solidFill>
                 <a:latin typeface="Arial"/>
               </a:rPr>
-              <a:t>Contact Manager</a:t>
+              <a:t>Contact </a:t>
+            </a:r>
+            <a:r>
+              <a:rPr b="0" lang="en-US" sz="3300" spc="-1" strike="noStrike">
+                <a:solidFill>
+                  <a:srgbClr val="ffffff"/>
+                </a:solidFill>
+                <a:latin typeface="Arial"/>
+              </a:rPr>
+              <a:t>Manager</a:t>
             </a:r>
             <a:endParaRPr b="0" lang="en-US" sz="3300" spc="-1" strike="noStrike">
               <a:latin typeface="Arial"/>
@@ -3176,7 +3332,7 @@
         <p:spPr>
           <a:xfrm>
             <a:off x="504000" y="2592000"/>
-            <a:ext cx="9070920" cy="2022120"/>
+            <a:ext cx="9070560" cy="2021760"/>
           </a:xfrm>
           <a:prstGeom prst="rect">
             <a:avLst/>
@@ -3194,7 +3350,7 @@
             <a:pPr algn="ctr">
               <a:buNone/>
             </a:pPr>
-            <a:endParaRPr b="0" lang="en-US" sz="3200" spc="-1" strike="noStrike">
+            <a:endParaRPr b="0" lang="en-US" sz="1800" spc="-1" strike="noStrike">
               <a:solidFill>
                 <a:srgbClr val="ffffff"/>
               </a:solidFill>
@@ -3246,7 +3402,7 @@
         <p:spPr>
           <a:xfrm>
             <a:off x="540000" y="139680"/>
-            <a:ext cx="8999280" cy="1249920"/>
+            <a:ext cx="8998920" cy="1249560"/>
           </a:xfrm>
           <a:prstGeom prst="rect">
             <a:avLst/>
@@ -3295,7 +3451,7 @@
         <p:spPr>
           <a:xfrm>
             <a:off x="504000" y="1326600"/>
-            <a:ext cx="9071640" cy="3288240"/>
+            <a:ext cx="9071280" cy="3287880"/>
           </a:xfrm>
           <a:prstGeom prst="rect">
             <a:avLst/>
@@ -3310,7 +3466,56 @@
             <a:normAutofit/>
           </a:bodyPr>
           <a:p>
-            <a:endParaRPr b="0" lang="en-US" sz="3200" spc="-1" strike="noStrike">
+            <a:pPr indent="-324000">
+              <a:lnSpc>
+                <a:spcPct val="100000"/>
+              </a:lnSpc>
+              <a:buClr>
+                <a:srgbClr val="000000"/>
+              </a:buClr>
+              <a:buFont typeface="Wingdings" charset="2"/>
+              <a:buChar char=""/>
+            </a:pPr>
+            <a:r>
+              <a:rPr b="0" lang="en-US" sz="1800" spc="-1" strike="noStrike">
+                <a:solidFill>
+                  <a:srgbClr val="ffffff"/>
+                </a:solidFill>
+                <a:latin typeface="Arial"/>
+              </a:rPr>
+              <a:t>Database</a:t>
+            </a:r>
+            <a:endParaRPr b="0" lang="en-US" sz="1800" spc="-1" strike="noStrike">
+              <a:solidFill>
+                <a:srgbClr val="ffffff"/>
+              </a:solidFill>
+              <a:latin typeface="Arial"/>
+            </a:endParaRPr>
+          </a:p>
+          <a:p>
+            <a:pPr indent="-324000">
+              <a:lnSpc>
+                <a:spcPct val="100000"/>
+              </a:lnSpc>
+              <a:buClr>
+                <a:srgbClr val="000000"/>
+              </a:buClr>
+              <a:buFont typeface="Wingdings" charset="2"/>
+              <a:buChar char=""/>
+            </a:pPr>
+            <a:r>
+              <a:rPr b="0" lang="en-US" sz="1800" spc="-1" strike="noStrike">
+                <a:solidFill>
+                  <a:srgbClr val="ffffff"/>
+                </a:solidFill>
+                <a:latin typeface="Arial"/>
+              </a:rPr>
+              <a:t>API</a:t>
+            </a:r>
+            <a:endParaRPr b="0" lang="en-US" sz="1800" spc="-1" strike="noStrike">
+              <a:solidFill>
+                <a:srgbClr val="ffffff"/>
+              </a:solidFill>
               <a:latin typeface="Arial"/>
             </a:endParaRPr>
           </a:p>
@@ -3359,7 +3564,7 @@
         <p:spPr>
           <a:xfrm>
             <a:off x="540000" y="139680"/>
-            <a:ext cx="8999280" cy="1249920"/>
+            <a:ext cx="8998920" cy="1249560"/>
           </a:xfrm>
           <a:prstGeom prst="rect">
             <a:avLst/>
@@ -3408,7 +3613,7 @@
         <p:spPr>
           <a:xfrm>
             <a:off x="504000" y="1326600"/>
-            <a:ext cx="9071640" cy="3288240"/>
+            <a:ext cx="9071280" cy="3287880"/>
           </a:xfrm>
           <a:prstGeom prst="rect">
             <a:avLst/>
@@ -3424,6 +3629,9 @@
           </a:bodyPr>
           <a:p>
             <a:endParaRPr b="0" lang="en-US" sz="3200" spc="-1" strike="noStrike">
+              <a:solidFill>
+                <a:srgbClr val="ffffff"/>
+              </a:solidFill>
               <a:latin typeface="Arial"/>
             </a:endParaRPr>
           </a:p>
@@ -3472,7 +3680,7 @@
         <p:spPr>
           <a:xfrm>
             <a:off x="540000" y="139680"/>
-            <a:ext cx="8999280" cy="1249920"/>
+            <a:ext cx="8998920" cy="1249560"/>
           </a:xfrm>
           <a:prstGeom prst="rect">
             <a:avLst/>
@@ -3521,7 +3729,7 @@
         <p:spPr>
           <a:xfrm>
             <a:off x="504000" y="1326600"/>
-            <a:ext cx="9071640" cy="3288240"/>
+            <a:ext cx="9071280" cy="3287880"/>
           </a:xfrm>
           <a:prstGeom prst="rect">
             <a:avLst/>
@@ -3537,6 +3745,9 @@
           </a:bodyPr>
           <a:p>
             <a:endParaRPr b="0" lang="en-US" sz="3200" spc="-1" strike="noStrike">
+              <a:solidFill>
+                <a:srgbClr val="ffffff"/>
+              </a:solidFill>
               <a:latin typeface="Arial"/>
             </a:endParaRPr>
           </a:p>
@@ -3585,7 +3796,7 @@
         <p:spPr>
           <a:xfrm>
             <a:off x="540000" y="139680"/>
-            <a:ext cx="8999280" cy="1249920"/>
+            <a:ext cx="8998920" cy="1249560"/>
           </a:xfrm>
           <a:prstGeom prst="rect">
             <a:avLst/>
@@ -3634,7 +3845,7 @@
         <p:spPr>
           <a:xfrm>
             <a:off x="504000" y="1326600"/>
-            <a:ext cx="9071640" cy="3288240"/>
+            <a:ext cx="9071280" cy="3287880"/>
           </a:xfrm>
           <a:prstGeom prst="rect">
             <a:avLst/>
@@ -3650,6 +3861,9 @@
           </a:bodyPr>
           <a:p>
             <a:endParaRPr b="0" lang="en-US" sz="3200" spc="-1" strike="noStrike">
+              <a:solidFill>
+                <a:srgbClr val="ffffff"/>
+              </a:solidFill>
               <a:latin typeface="Arial"/>
             </a:endParaRPr>
           </a:p>
@@ -3698,7 +3912,7 @@
         <p:spPr>
           <a:xfrm>
             <a:off x="530280" y="425520"/>
-            <a:ext cx="9070920" cy="946080"/>
+            <a:ext cx="9070560" cy="945720"/>
           </a:xfrm>
           <a:prstGeom prst="rect">
             <a:avLst/>
@@ -3737,27 +3951,39 @@
       <p:sp>
         <p:nvSpPr>
           <p:cNvPr id="56" name=""/>
-          <p:cNvSpPr txBox="1"/>
+          <p:cNvSpPr/>
           <p:nvPr/>
         </p:nvSpPr>
         <p:spPr>
           <a:xfrm>
             <a:off x="7195320" y="2057400"/>
-            <a:ext cx="1948680" cy="302400"/>
-          </a:xfrm>
-          <a:prstGeom prst="rect">
-            <a:avLst/>
-          </a:prstGeom>
-          <a:noFill/>
-          <a:ln w="0">
-            <a:noFill/>
-          </a:ln>
-        </p:spPr>
+            <a:ext cx="1948320" cy="302040"/>
+          </a:xfrm>
+          <a:prstGeom prst="rect">
+            <a:avLst/>
+          </a:prstGeom>
+          <a:noFill/>
+          <a:ln w="0">
+            <a:noFill/>
+          </a:ln>
+        </p:spPr>
+        <p:style>
+          <a:lnRef idx="0"/>
+          <a:fillRef idx="0"/>
+          <a:effectRef idx="0"/>
+          <a:fontRef idx="minor"/>
+        </p:style>
         <p:txBody>
           <a:bodyPr lIns="90000" rIns="90000" tIns="45000" bIns="45000" anchor="t">
             <a:noAutofit/>
           </a:bodyPr>
           <a:p>
+            <a:pPr>
+              <a:lnSpc>
+                <a:spcPct val="100000"/>
+              </a:lnSpc>
+              <a:buNone/>
+            </a:pPr>
             <a:r>
               <a:rPr b="0" lang="en-US" sz="1500" spc="-1" strike="noStrike">
                 <a:solidFill>
@@ -3776,27 +4002,39 @@
       <p:sp>
         <p:nvSpPr>
           <p:cNvPr id="57" name=""/>
-          <p:cNvSpPr txBox="1"/>
+          <p:cNvSpPr/>
           <p:nvPr/>
         </p:nvSpPr>
         <p:spPr>
           <a:xfrm>
             <a:off x="685800" y="2057400"/>
-            <a:ext cx="1352520" cy="513720"/>
-          </a:xfrm>
-          <a:prstGeom prst="rect">
-            <a:avLst/>
-          </a:prstGeom>
-          <a:noFill/>
-          <a:ln w="0">
-            <a:noFill/>
-          </a:ln>
-        </p:spPr>
+            <a:ext cx="1352160" cy="513360"/>
+          </a:xfrm>
+          <a:prstGeom prst="rect">
+            <a:avLst/>
+          </a:prstGeom>
+          <a:noFill/>
+          <a:ln w="0">
+            <a:noFill/>
+          </a:ln>
+        </p:spPr>
+        <p:style>
+          <a:lnRef idx="0"/>
+          <a:fillRef idx="0"/>
+          <a:effectRef idx="0"/>
+          <a:fontRef idx="minor"/>
+        </p:style>
         <p:txBody>
           <a:bodyPr lIns="90000" rIns="90000" tIns="45000" bIns="45000" anchor="t">
             <a:noAutofit/>
           </a:bodyPr>
           <a:p>
+            <a:pPr>
+              <a:lnSpc>
+                <a:spcPct val="100000"/>
+              </a:lnSpc>
+              <a:buNone/>
+            </a:pPr>
             <a:r>
               <a:rPr b="0" lang="en-US" sz="1500" spc="-1" strike="noStrike">
                 <a:solidFill>
@@ -3815,27 +4053,39 @@
       <p:sp>
         <p:nvSpPr>
           <p:cNvPr id="58" name=""/>
-          <p:cNvSpPr txBox="1"/>
+          <p:cNvSpPr/>
           <p:nvPr/>
         </p:nvSpPr>
         <p:spPr>
           <a:xfrm>
             <a:off x="4167360" y="1983600"/>
-            <a:ext cx="1319040" cy="513720"/>
-          </a:xfrm>
-          <a:prstGeom prst="rect">
-            <a:avLst/>
-          </a:prstGeom>
-          <a:noFill/>
-          <a:ln w="0">
-            <a:noFill/>
-          </a:ln>
-        </p:spPr>
+            <a:ext cx="1318680" cy="513360"/>
+          </a:xfrm>
+          <a:prstGeom prst="rect">
+            <a:avLst/>
+          </a:prstGeom>
+          <a:noFill/>
+          <a:ln w="0">
+            <a:noFill/>
+          </a:ln>
+        </p:spPr>
+        <p:style>
+          <a:lnRef idx="0"/>
+          <a:fillRef idx="0"/>
+          <a:effectRef idx="0"/>
+          <a:fontRef idx="minor"/>
+        </p:style>
         <p:txBody>
           <a:bodyPr lIns="90000" rIns="90000" tIns="45000" bIns="45000" anchor="t">
             <a:noAutofit/>
           </a:bodyPr>
           <a:p>
+            <a:pPr>
+              <a:lnSpc>
+                <a:spcPct val="100000"/>
+              </a:lnSpc>
+              <a:buNone/>
+            </a:pPr>
             <a:r>
               <a:rPr b="0" lang="en-US" sz="1500" spc="-1" strike="noStrike">
                 <a:solidFill>
@@ -3854,27 +4104,39 @@
       <p:sp>
         <p:nvSpPr>
           <p:cNvPr id="59" name=""/>
-          <p:cNvSpPr txBox="1"/>
+          <p:cNvSpPr/>
           <p:nvPr/>
         </p:nvSpPr>
         <p:spPr>
           <a:xfrm>
             <a:off x="616320" y="4572000"/>
-            <a:ext cx="1669680" cy="513720"/>
-          </a:xfrm>
-          <a:prstGeom prst="rect">
-            <a:avLst/>
-          </a:prstGeom>
-          <a:noFill/>
-          <a:ln w="0">
-            <a:noFill/>
-          </a:ln>
-        </p:spPr>
+            <a:ext cx="1669320" cy="513360"/>
+          </a:xfrm>
+          <a:prstGeom prst="rect">
+            <a:avLst/>
+          </a:prstGeom>
+          <a:noFill/>
+          <a:ln w="0">
+            <a:noFill/>
+          </a:ln>
+        </p:spPr>
+        <p:style>
+          <a:lnRef idx="0"/>
+          <a:fillRef idx="0"/>
+          <a:effectRef idx="0"/>
+          <a:fontRef idx="minor"/>
+        </p:style>
         <p:txBody>
           <a:bodyPr lIns="90000" rIns="90000" tIns="45000" bIns="45000" anchor="t">
             <a:noAutofit/>
           </a:bodyPr>
           <a:p>
+            <a:pPr>
+              <a:lnSpc>
+                <a:spcPct val="100000"/>
+              </a:lnSpc>
+              <a:buNone/>
+            </a:pPr>
             <a:r>
               <a:rPr b="0" lang="en-US" sz="1500" spc="-1" strike="noStrike">
                 <a:solidFill>
@@ -3893,27 +4155,39 @@
       <p:sp>
         <p:nvSpPr>
           <p:cNvPr id="60" name=""/>
-          <p:cNvSpPr txBox="1"/>
+          <p:cNvSpPr/>
           <p:nvPr/>
         </p:nvSpPr>
         <p:spPr>
           <a:xfrm>
             <a:off x="4272480" y="4572000"/>
-            <a:ext cx="1671120" cy="513720"/>
-          </a:xfrm>
-          <a:prstGeom prst="rect">
-            <a:avLst/>
-          </a:prstGeom>
-          <a:noFill/>
-          <a:ln w="0">
-            <a:noFill/>
-          </a:ln>
-        </p:spPr>
+            <a:ext cx="1670760" cy="513360"/>
+          </a:xfrm>
+          <a:prstGeom prst="rect">
+            <a:avLst/>
+          </a:prstGeom>
+          <a:noFill/>
+          <a:ln w="0">
+            <a:noFill/>
+          </a:ln>
+        </p:spPr>
+        <p:style>
+          <a:lnRef idx="0"/>
+          <a:fillRef idx="0"/>
+          <a:effectRef idx="0"/>
+          <a:fontRef idx="minor"/>
+        </p:style>
         <p:txBody>
           <a:bodyPr lIns="90000" rIns="90000" tIns="45000" bIns="45000" anchor="t">
             <a:noAutofit/>
           </a:bodyPr>
           <a:p>
+            <a:pPr>
+              <a:lnSpc>
+                <a:spcPct val="100000"/>
+              </a:lnSpc>
+              <a:buNone/>
+            </a:pPr>
             <a:r>
               <a:rPr b="0" lang="en-US" sz="1500" spc="-1" strike="noStrike">
                 <a:solidFill>
@@ -3932,27 +4206,39 @@
       <p:sp>
         <p:nvSpPr>
           <p:cNvPr id="61" name=""/>
-          <p:cNvSpPr txBox="1"/>
+          <p:cNvSpPr/>
           <p:nvPr/>
         </p:nvSpPr>
         <p:spPr>
           <a:xfrm>
             <a:off x="7539840" y="4572000"/>
-            <a:ext cx="1604160" cy="513720"/>
-          </a:xfrm>
-          <a:prstGeom prst="rect">
-            <a:avLst/>
-          </a:prstGeom>
-          <a:noFill/>
-          <a:ln w="0">
-            <a:noFill/>
-          </a:ln>
-        </p:spPr>
+            <a:ext cx="1603800" cy="513360"/>
+          </a:xfrm>
+          <a:prstGeom prst="rect">
+            <a:avLst/>
+          </a:prstGeom>
+          <a:noFill/>
+          <a:ln w="0">
+            <a:noFill/>
+          </a:ln>
+        </p:spPr>
+        <p:style>
+          <a:lnRef idx="0"/>
+          <a:fillRef idx="0"/>
+          <a:effectRef idx="0"/>
+          <a:fontRef idx="minor"/>
+        </p:style>
         <p:txBody>
           <a:bodyPr lIns="90000" rIns="90000" tIns="45000" bIns="45000" anchor="t">
             <a:noAutofit/>
           </a:bodyPr>
           <a:p>
+            <a:pPr>
+              <a:lnSpc>
+                <a:spcPct val="100000"/>
+              </a:lnSpc>
+              <a:buNone/>
+            </a:pPr>
             <a:r>
               <a:rPr b="0" lang="en-US" sz="1500" spc="-1" strike="noStrike">
                 <a:solidFill>
@@ -4011,7 +4297,7 @@
         <p:spPr>
           <a:xfrm>
             <a:off x="504000" y="1428840"/>
-            <a:ext cx="9070920" cy="946080"/>
+            <a:ext cx="9070560" cy="945720"/>
           </a:xfrm>
           <a:prstGeom prst="rect">
             <a:avLst/>
@@ -4059,8 +4345,8 @@
         </p:nvSpPr>
         <p:spPr>
           <a:xfrm>
-            <a:off x="504000" y="2592000"/>
-            <a:ext cx="9070920" cy="2022120"/>
+            <a:off x="504000" y="1958400"/>
+            <a:ext cx="9070560" cy="3288960"/>
           </a:xfrm>
           <a:prstGeom prst="rect">
             <a:avLst/>
@@ -4076,18 +4362,18 @@
           </a:bodyPr>
           <a:p>
             <a:pPr algn="ctr">
-              <a:lnSpc>
-                <a:spcPct val="100000"/>
-              </a:lnSpc>
               <a:buNone/>
             </a:pPr>
             <a:r>
-              <a:rPr b="0" lang="en-US" sz="3200" spc="-1" strike="noStrike">
+              <a:rPr b="0" lang="en-US" sz="1800" spc="-1" strike="noStrike">
+                <a:solidFill>
+                  <a:srgbClr val="ffffff"/>
+                </a:solidFill>
                 <a:latin typeface="Arial"/>
               </a:rPr>
               <a:t>how it was developed, and anything that you feel is important</a:t>
             </a:r>
-            <a:endParaRPr b="0" lang="en-US" sz="3200" spc="-1" strike="noStrike">
+            <a:endParaRPr b="0" lang="en-US" sz="1800" spc="-1" strike="noStrike">
               <a:solidFill>
                 <a:srgbClr val="ffffff"/>
               </a:solidFill>
@@ -4139,7 +4425,7 @@
         <p:spPr>
           <a:xfrm>
             <a:off x="504000" y="1428840"/>
-            <a:ext cx="9070920" cy="946080"/>
+            <a:ext cx="9070560" cy="945720"/>
           </a:xfrm>
           <a:prstGeom prst="rect">
             <a:avLst/>
@@ -4188,7 +4474,7 @@
         <p:spPr>
           <a:xfrm>
             <a:off x="504000" y="2592000"/>
-            <a:ext cx="9070920" cy="2022120"/>
+            <a:ext cx="9070560" cy="2021760"/>
           </a:xfrm>
           <a:prstGeom prst="rect">
             <a:avLst/>
@@ -4239,7 +4525,7 @@
                 </a:solidFill>
                 <a:latin typeface="Arial"/>
               </a:rPr>
-              <a:t>Linux: Hosted on an ubuntu 22.04 server from DigitalOcean w/ IP= 146.190.166.5</a:t>
+              <a:t>Linux: Hosted on an ubuntu 22.04 server from DigitalOcean</a:t>
             </a:r>
             <a:endParaRPr b="0" lang="en-US" sz="1800" spc="-1" strike="noStrike">
               <a:solidFill>
@@ -4362,7 +4648,7 @@
         <p:spPr>
           <a:xfrm>
             <a:off x="504000" y="1428840"/>
-            <a:ext cx="9070920" cy="946080"/>
+            <a:ext cx="9070560" cy="945720"/>
           </a:xfrm>
           <a:prstGeom prst="rect">
             <a:avLst/>
@@ -4411,7 +4697,7 @@
         <p:spPr>
           <a:xfrm>
             <a:off x="504000" y="2592000"/>
-            <a:ext cx="9070920" cy="2022120"/>
+            <a:ext cx="9070560" cy="2021760"/>
           </a:xfrm>
           <a:prstGeom prst="rect">
             <a:avLst/>
@@ -4538,8 +4824,8 @@
         </p:nvSpPr>
         <p:spPr>
           <a:xfrm>
-            <a:off x="504000" y="1428840"/>
-            <a:ext cx="9070920" cy="946080"/>
+            <a:off x="457200" y="197280"/>
+            <a:ext cx="9070560" cy="945720"/>
           </a:xfrm>
           <a:prstGeom prst="rect">
             <a:avLst/>
@@ -4575,58 +4861,29 @@
           </a:p>
         </p:txBody>
       </p:sp>
-      <p:sp>
-        <p:nvSpPr>
-          <p:cNvPr id="69" name="PlaceHolder 2"/>
-          <p:cNvSpPr>
-            <a:spLocks noGrp="1"/>
-          </p:cNvSpPr>
-          <p:nvPr>
-            <p:ph type="subTitle"/>
-          </p:nvPr>
-        </p:nvSpPr>
-        <p:spPr>
-          <a:xfrm>
-            <a:off x="504000" y="2592000"/>
-            <a:ext cx="9070920" cy="2022120"/>
-          </a:xfrm>
-          <a:prstGeom prst="rect">
-            <a:avLst/>
-          </a:prstGeom>
-          <a:noFill/>
-          <a:ln w="0">
-            <a:noFill/>
-          </a:ln>
-        </p:spPr>
-        <p:txBody>
-          <a:bodyPr lIns="0" rIns="0" tIns="0" bIns="0" anchor="ctr">
-            <a:noAutofit/>
-          </a:bodyPr>
-          <a:p>
-            <a:pPr>
-              <a:lnSpc>
-                <a:spcPct val="100000"/>
-              </a:lnSpc>
-              <a:buNone/>
-            </a:pPr>
-            <a:r>
-              <a:rPr b="0" lang="en-US" sz="1800" spc="-1" strike="noStrike">
-                <a:solidFill>
-                  <a:srgbClr val="ffffff"/>
-                </a:solidFill>
-                <a:latin typeface="Arial"/>
-              </a:rPr>
-              <a:t>IP</a:t>
-            </a:r>
-            <a:endParaRPr b="0" lang="en-US" sz="1800" spc="-1" strike="noStrike">
-              <a:solidFill>
-                <a:srgbClr val="ffffff"/>
-              </a:solidFill>
-              <a:latin typeface="Arial"/>
-            </a:endParaRPr>
-          </a:p>
-        </p:txBody>
-      </p:sp>
+      <p:pic>
+        <p:nvPicPr>
+          <p:cNvPr id="69" name="" descr=""/>
+          <p:cNvPicPr/>
+          <p:nvPr/>
+        </p:nvPicPr>
+        <p:blipFill>
+          <a:blip r:embed="rId1"/>
+          <a:stretch/>
+        </p:blipFill>
+        <p:spPr>
+          <a:xfrm>
+            <a:off x="457200" y="1298880"/>
+            <a:ext cx="9372600" cy="3958920"/>
+          </a:xfrm>
+          <a:prstGeom prst="rect">
+            <a:avLst/>
+          </a:prstGeom>
+          <a:ln w="0">
+            <a:noFill/>
+          </a:ln>
+        </p:spPr>
+      </p:pic>
     </p:spTree>
   </p:cSld>
   <mc:AlternateContent>
@@ -4670,7 +4927,7 @@
         <p:spPr>
           <a:xfrm>
             <a:off x="504000" y="1428840"/>
-            <a:ext cx="9070920" cy="946080"/>
+            <a:ext cx="9070560" cy="945720"/>
           </a:xfrm>
           <a:prstGeom prst="rect">
             <a:avLst/>
@@ -4719,7 +4976,7 @@
         <p:spPr>
           <a:xfrm>
             <a:off x="504000" y="2592000"/>
-            <a:ext cx="9070920" cy="2022120"/>
+            <a:ext cx="9070560" cy="2021760"/>
           </a:xfrm>
           <a:prstGeom prst="rect">
             <a:avLst/>
@@ -4800,8 +5057,8 @@
         </p:nvSpPr>
         <p:spPr>
           <a:xfrm>
-            <a:off x="504000" y="1428840"/>
-            <a:ext cx="9070920" cy="946080"/>
+            <a:off x="504000" y="-228600"/>
+            <a:ext cx="9070560" cy="1143000"/>
           </a:xfrm>
           <a:prstGeom prst="rect">
             <a:avLst/>
@@ -4837,58 +5094,29 @@
           </a:p>
         </p:txBody>
       </p:sp>
-      <p:sp>
-        <p:nvSpPr>
-          <p:cNvPr id="73" name="PlaceHolder 2"/>
-          <p:cNvSpPr>
-            <a:spLocks noGrp="1"/>
-          </p:cNvSpPr>
-          <p:nvPr>
-            <p:ph type="subTitle"/>
-          </p:nvPr>
-        </p:nvSpPr>
-        <p:spPr>
-          <a:xfrm>
-            <a:off x="504000" y="2592000"/>
-            <a:ext cx="9070920" cy="2022120"/>
-          </a:xfrm>
-          <a:prstGeom prst="rect">
-            <a:avLst/>
-          </a:prstGeom>
-          <a:noFill/>
-          <a:ln w="0">
-            <a:noFill/>
-          </a:ln>
-        </p:spPr>
-        <p:txBody>
-          <a:bodyPr lIns="0" rIns="0" tIns="0" bIns="0" anchor="ctr">
-            <a:noAutofit/>
-          </a:bodyPr>
-          <a:p>
-            <a:pPr>
-              <a:lnSpc>
-                <a:spcPct val="100000"/>
-              </a:lnSpc>
-              <a:buNone/>
-            </a:pPr>
-            <a:r>
-              <a:rPr b="0" lang="en-US" sz="1800" spc="-1" strike="noStrike">
-                <a:solidFill>
-                  <a:srgbClr val="ffffff"/>
-                </a:solidFill>
-                <a:latin typeface="Arial"/>
-              </a:rPr>
-              <a:t>IP</a:t>
-            </a:r>
-            <a:endParaRPr b="0" lang="en-US" sz="1800" spc="-1" strike="noStrike">
-              <a:solidFill>
-                <a:srgbClr val="ffffff"/>
-              </a:solidFill>
-              <a:latin typeface="Arial"/>
-            </a:endParaRPr>
-          </a:p>
-        </p:txBody>
-      </p:sp>
+      <p:pic>
+        <p:nvPicPr>
+          <p:cNvPr id="73" name="" descr=""/>
+          <p:cNvPicPr/>
+          <p:nvPr/>
+        </p:nvPicPr>
+        <p:blipFill>
+          <a:blip r:embed="rId1"/>
+          <a:stretch/>
+        </p:blipFill>
+        <p:spPr>
+          <a:xfrm>
+            <a:off x="777600" y="680400"/>
+            <a:ext cx="8823600" cy="4963320"/>
+          </a:xfrm>
+          <a:prstGeom prst="rect">
+            <a:avLst/>
+          </a:prstGeom>
+          <a:ln w="0">
+            <a:noFill/>
+          </a:ln>
+        </p:spPr>
+      </p:pic>
     </p:spTree>
   </p:cSld>
   <mc:AlternateContent>
@@ -4932,7 +5160,7 @@
         <p:spPr>
           <a:xfrm>
             <a:off x="540000" y="139680"/>
-            <a:ext cx="8999280" cy="1249920"/>
+            <a:ext cx="8998920" cy="1249560"/>
           </a:xfrm>
           <a:prstGeom prst="rect">
             <a:avLst/>
@@ -4981,7 +5209,7 @@
         <p:spPr>
           <a:xfrm>
             <a:off x="504000" y="1326600"/>
-            <a:ext cx="9071640" cy="3288240"/>
+            <a:ext cx="9071280" cy="3287880"/>
           </a:xfrm>
           <a:prstGeom prst="rect">
             <a:avLst/>
@@ -4996,7 +5224,47 @@
             <a:normAutofit/>
           </a:bodyPr>
           <a:p>
-            <a:endParaRPr b="0" lang="en-US" sz="3200" spc="-1" strike="noStrike">
+            <a:pPr indent="-324000">
+              <a:lnSpc>
+                <a:spcPct val="100000"/>
+              </a:lnSpc>
+              <a:buClr>
+                <a:srgbClr val="000000"/>
+              </a:buClr>
+              <a:buFont typeface="Wingdings" charset="2"/>
+              <a:buChar char=""/>
+            </a:pPr>
+            <a:r>
+              <a:rPr b="0" lang="en-US" sz="1800" spc="-1" strike="noStrike">
+                <a:solidFill>
+                  <a:srgbClr val="ffffff"/>
+                </a:solidFill>
+                <a:latin typeface="Arial"/>
+              </a:rPr>
+              <a:t>Front-End?</a:t>
+            </a:r>
+            <a:endParaRPr b="0" lang="en-US" sz="1800" spc="-1" strike="noStrike">
+              <a:solidFill>
+                <a:srgbClr val="ffffff"/>
+              </a:solidFill>
+              <a:latin typeface="Arial"/>
+            </a:endParaRPr>
+          </a:p>
+          <a:p>
+            <a:pPr indent="-324000">
+              <a:lnSpc>
+                <a:spcPct val="100000"/>
+              </a:lnSpc>
+              <a:buClr>
+                <a:srgbClr val="000000"/>
+              </a:buClr>
+              <a:buFont typeface="Wingdings" charset="2"/>
+              <a:buChar char=""/>
+            </a:pPr>
+            <a:endParaRPr b="0" lang="en-US" sz="1800" spc="-1" strike="noStrike">
+              <a:solidFill>
+                <a:srgbClr val="ffffff"/>
+              </a:solidFill>
               <a:latin typeface="Arial"/>
             </a:endParaRPr>
           </a:p>

</xml_diff>

<commit_message>
added tmp gantt to pres
</commit_message>
<xml_diff>
--- a/Pres.pptx
+++ b/Pres.pptx
@@ -75,7 +75,7 @@
         <p:txBody>
           <a:bodyPr/>
           <a:p>
-            <a:fld id="{60CE62BC-D18D-42C3-8A81-4F8F8CD18305}" type="slidenum">
+            <a:fld id="{7EE8874D-EF5E-47C3-9D40-A4A2B03255B3}" type="slidenum">
               <a:t>&lt;#&gt;</a:t>
             </a:fld>
           </a:p>
@@ -190,9 +190,6 @@
           </a:bodyPr>
           <a:p>
             <a:endParaRPr b="0" lang="en-US" sz="3200" spc="-1" strike="noStrike">
-              <a:solidFill>
-                <a:srgbClr val="ffffff"/>
-              </a:solidFill>
               <a:latin typeface="Arial"/>
             </a:endParaRPr>
           </a:p>
@@ -227,9 +224,6 @@
           </a:bodyPr>
           <a:p>
             <a:endParaRPr b="0" lang="en-US" sz="3200" spc="-1" strike="noStrike">
-              <a:solidFill>
-                <a:srgbClr val="ffffff"/>
-              </a:solidFill>
               <a:latin typeface="Arial"/>
             </a:endParaRPr>
           </a:p>
@@ -269,7 +263,7 @@
         <p:txBody>
           <a:bodyPr/>
           <a:p>
-            <a:fld id="{5D05B66C-CA0C-40A4-A080-2EC41E7A2BD1}" type="slidenum">
+            <a:fld id="{8128F325-428D-45E4-95B6-FD2EDC8CD945}" type="slidenum">
               <a:t>&lt;#&gt;</a:t>
             </a:fld>
           </a:p>
@@ -384,9 +378,6 @@
           </a:bodyPr>
           <a:p>
             <a:endParaRPr b="0" lang="en-US" sz="3200" spc="-1" strike="noStrike">
-              <a:solidFill>
-                <a:srgbClr val="ffffff"/>
-              </a:solidFill>
               <a:latin typeface="Arial"/>
             </a:endParaRPr>
           </a:p>
@@ -421,9 +412,6 @@
           </a:bodyPr>
           <a:p>
             <a:endParaRPr b="0" lang="en-US" sz="3200" spc="-1" strike="noStrike">
-              <a:solidFill>
-                <a:srgbClr val="ffffff"/>
-              </a:solidFill>
               <a:latin typeface="Arial"/>
             </a:endParaRPr>
           </a:p>
@@ -458,9 +446,6 @@
           </a:bodyPr>
           <a:p>
             <a:endParaRPr b="0" lang="en-US" sz="3200" spc="-1" strike="noStrike">
-              <a:solidFill>
-                <a:srgbClr val="ffffff"/>
-              </a:solidFill>
               <a:latin typeface="Arial"/>
             </a:endParaRPr>
           </a:p>
@@ -495,9 +480,6 @@
           </a:bodyPr>
           <a:p>
             <a:endParaRPr b="0" lang="en-US" sz="3200" spc="-1" strike="noStrike">
-              <a:solidFill>
-                <a:srgbClr val="ffffff"/>
-              </a:solidFill>
               <a:latin typeface="Arial"/>
             </a:endParaRPr>
           </a:p>
@@ -537,7 +519,7 @@
         <p:txBody>
           <a:bodyPr/>
           <a:p>
-            <a:fld id="{E2FD8B02-48C4-435D-84D0-09A8B9839669}" type="slidenum">
+            <a:fld id="{E901BA0D-92D5-48BE-8E6E-B9169B23148B}" type="slidenum">
               <a:t>&lt;#&gt;</a:t>
             </a:fld>
           </a:p>
@@ -652,9 +634,6 @@
           </a:bodyPr>
           <a:p>
             <a:endParaRPr b="0" lang="en-US" sz="3200" spc="-1" strike="noStrike">
-              <a:solidFill>
-                <a:srgbClr val="ffffff"/>
-              </a:solidFill>
               <a:latin typeface="Arial"/>
             </a:endParaRPr>
           </a:p>
@@ -689,9 +668,6 @@
           </a:bodyPr>
           <a:p>
             <a:endParaRPr b="0" lang="en-US" sz="3200" spc="-1" strike="noStrike">
-              <a:solidFill>
-                <a:srgbClr val="ffffff"/>
-              </a:solidFill>
               <a:latin typeface="Arial"/>
             </a:endParaRPr>
           </a:p>
@@ -726,9 +702,6 @@
           </a:bodyPr>
           <a:p>
             <a:endParaRPr b="0" lang="en-US" sz="3200" spc="-1" strike="noStrike">
-              <a:solidFill>
-                <a:srgbClr val="ffffff"/>
-              </a:solidFill>
               <a:latin typeface="Arial"/>
             </a:endParaRPr>
           </a:p>
@@ -763,9 +736,6 @@
           </a:bodyPr>
           <a:p>
             <a:endParaRPr b="0" lang="en-US" sz="3200" spc="-1" strike="noStrike">
-              <a:solidFill>
-                <a:srgbClr val="ffffff"/>
-              </a:solidFill>
               <a:latin typeface="Arial"/>
             </a:endParaRPr>
           </a:p>
@@ -800,9 +770,6 @@
           </a:bodyPr>
           <a:p>
             <a:endParaRPr b="0" lang="en-US" sz="3200" spc="-1" strike="noStrike">
-              <a:solidFill>
-                <a:srgbClr val="ffffff"/>
-              </a:solidFill>
               <a:latin typeface="Arial"/>
             </a:endParaRPr>
           </a:p>
@@ -837,9 +804,6 @@
           </a:bodyPr>
           <a:p>
             <a:endParaRPr b="0" lang="en-US" sz="3200" spc="-1" strike="noStrike">
-              <a:solidFill>
-                <a:srgbClr val="ffffff"/>
-              </a:solidFill>
               <a:latin typeface="Arial"/>
             </a:endParaRPr>
           </a:p>
@@ -879,7 +843,7 @@
         <p:txBody>
           <a:bodyPr/>
           <a:p>
-            <a:fld id="{B5829236-92F6-4824-8FB2-582A73BC9B3F}" type="slidenum">
+            <a:fld id="{BACB0C39-BCEB-451B-8AC3-806071275DD4}" type="slidenum">
               <a:t>&lt;#&gt;</a:t>
             </a:fld>
           </a:p>
@@ -996,10 +960,7 @@
             <a:pPr algn="ctr">
               <a:buNone/>
             </a:pPr>
-            <a:endParaRPr b="0" lang="en-US" sz="1800" spc="-1" strike="noStrike">
-              <a:solidFill>
-                <a:srgbClr val="ffffff"/>
-              </a:solidFill>
+            <a:endParaRPr b="0" lang="en-US" sz="3200" spc="-1" strike="noStrike">
               <a:latin typeface="Arial"/>
             </a:endParaRPr>
           </a:p>
@@ -1039,7 +1000,7 @@
         <p:txBody>
           <a:bodyPr/>
           <a:p>
-            <a:fld id="{DCE8B458-A53B-4BD1-8BA7-7FB2ACB734BE}" type="slidenum">
+            <a:fld id="{2533CA03-F124-446E-B5A5-BB955502BE28}" type="slidenum">
               <a:t>&lt;#&gt;</a:t>
             </a:fld>
           </a:p>
@@ -1154,9 +1115,6 @@
           </a:bodyPr>
           <a:p>
             <a:endParaRPr b="0" lang="en-US" sz="3200" spc="-1" strike="noStrike">
-              <a:solidFill>
-                <a:srgbClr val="ffffff"/>
-              </a:solidFill>
               <a:latin typeface="Arial"/>
             </a:endParaRPr>
           </a:p>
@@ -1196,7 +1154,7 @@
         <p:txBody>
           <a:bodyPr/>
           <a:p>
-            <a:fld id="{76EE0F88-A546-4F66-AD10-3D2D2FA096A0}" type="slidenum">
+            <a:fld id="{D43A20AA-A29D-4540-AFB1-AB57060576C8}" type="slidenum">
               <a:t>&lt;#&gt;</a:t>
             </a:fld>
           </a:p>
@@ -1311,9 +1269,6 @@
           </a:bodyPr>
           <a:p>
             <a:endParaRPr b="0" lang="en-US" sz="3200" spc="-1" strike="noStrike">
-              <a:solidFill>
-                <a:srgbClr val="ffffff"/>
-              </a:solidFill>
               <a:latin typeface="Arial"/>
             </a:endParaRPr>
           </a:p>
@@ -1348,9 +1303,6 @@
           </a:bodyPr>
           <a:p>
             <a:endParaRPr b="0" lang="en-US" sz="3200" spc="-1" strike="noStrike">
-              <a:solidFill>
-                <a:srgbClr val="ffffff"/>
-              </a:solidFill>
               <a:latin typeface="Arial"/>
             </a:endParaRPr>
           </a:p>
@@ -1390,7 +1342,7 @@
         <p:txBody>
           <a:bodyPr/>
           <a:p>
-            <a:fld id="{245273D2-C177-4DC0-A17E-5A1D0DA82E57}" type="slidenum">
+            <a:fld id="{C92B0261-BE04-4DCC-AB37-B2CDF8642ED5}" type="slidenum">
               <a:t>&lt;#&gt;</a:t>
             </a:fld>
           </a:p>
@@ -1510,7 +1462,7 @@
         <p:txBody>
           <a:bodyPr/>
           <a:p>
-            <a:fld id="{942A63D4-A37D-475A-9B63-5F4D7A6BA7B4}" type="slidenum">
+            <a:fld id="{C64C903E-2D4A-4BF3-B2B2-82B357ACBF71}" type="slidenum">
               <a:t>&lt;#&gt;</a:t>
             </a:fld>
           </a:p>
@@ -1590,10 +1542,7 @@
             <a:pPr algn="ctr">
               <a:buNone/>
             </a:pPr>
-            <a:endParaRPr b="0" lang="en-US" sz="1800" spc="-1" strike="noStrike">
-              <a:solidFill>
-                <a:srgbClr val="ffffff"/>
-              </a:solidFill>
+            <a:endParaRPr b="0" lang="en-US" sz="3200" spc="-1" strike="noStrike">
               <a:latin typeface="Arial"/>
             </a:endParaRPr>
           </a:p>
@@ -1633,7 +1582,7 @@
         <p:txBody>
           <a:bodyPr/>
           <a:p>
-            <a:fld id="{24D20A7F-69B2-42C0-9931-71B24D99C2C7}" type="slidenum">
+            <a:fld id="{B536AA7A-F03A-4034-A1E0-AAB6ADD1B46A}" type="slidenum">
               <a:t>&lt;#&gt;</a:t>
             </a:fld>
           </a:p>
@@ -1748,9 +1697,6 @@
           </a:bodyPr>
           <a:p>
             <a:endParaRPr b="0" lang="en-US" sz="3200" spc="-1" strike="noStrike">
-              <a:solidFill>
-                <a:srgbClr val="ffffff"/>
-              </a:solidFill>
               <a:latin typeface="Arial"/>
             </a:endParaRPr>
           </a:p>
@@ -1785,9 +1731,6 @@
           </a:bodyPr>
           <a:p>
             <a:endParaRPr b="0" lang="en-US" sz="3200" spc="-1" strike="noStrike">
-              <a:solidFill>
-                <a:srgbClr val="ffffff"/>
-              </a:solidFill>
               <a:latin typeface="Arial"/>
             </a:endParaRPr>
           </a:p>
@@ -1822,9 +1765,6 @@
           </a:bodyPr>
           <a:p>
             <a:endParaRPr b="0" lang="en-US" sz="3200" spc="-1" strike="noStrike">
-              <a:solidFill>
-                <a:srgbClr val="ffffff"/>
-              </a:solidFill>
               <a:latin typeface="Arial"/>
             </a:endParaRPr>
           </a:p>
@@ -1864,7 +1804,7 @@
         <p:txBody>
           <a:bodyPr/>
           <a:p>
-            <a:fld id="{BBF9ED85-9248-43B2-A24C-D08AAB2307BA}" type="slidenum">
+            <a:fld id="{510AC5A1-AF21-4C86-B2D6-18CDA2C7E9B3}" type="slidenum">
               <a:t>&lt;#&gt;</a:t>
             </a:fld>
           </a:p>
@@ -1979,9 +1919,6 @@
           </a:bodyPr>
           <a:p>
             <a:endParaRPr b="0" lang="en-US" sz="3200" spc="-1" strike="noStrike">
-              <a:solidFill>
-                <a:srgbClr val="ffffff"/>
-              </a:solidFill>
               <a:latin typeface="Arial"/>
             </a:endParaRPr>
           </a:p>
@@ -2016,9 +1953,6 @@
           </a:bodyPr>
           <a:p>
             <a:endParaRPr b="0" lang="en-US" sz="3200" spc="-1" strike="noStrike">
-              <a:solidFill>
-                <a:srgbClr val="ffffff"/>
-              </a:solidFill>
               <a:latin typeface="Arial"/>
             </a:endParaRPr>
           </a:p>
@@ -2053,9 +1987,6 @@
           </a:bodyPr>
           <a:p>
             <a:endParaRPr b="0" lang="en-US" sz="3200" spc="-1" strike="noStrike">
-              <a:solidFill>
-                <a:srgbClr val="ffffff"/>
-              </a:solidFill>
               <a:latin typeface="Arial"/>
             </a:endParaRPr>
           </a:p>
@@ -2095,7 +2026,7 @@
         <p:txBody>
           <a:bodyPr/>
           <a:p>
-            <a:fld id="{4F4C3CD7-4AD9-4F85-92AC-9144151E5A2C}" type="slidenum">
+            <a:fld id="{B6159480-B313-4069-A1EB-618B4F573B8A}" type="slidenum">
               <a:t>&lt;#&gt;</a:t>
             </a:fld>
           </a:p>
@@ -2210,9 +2141,6 @@
           </a:bodyPr>
           <a:p>
             <a:endParaRPr b="0" lang="en-US" sz="3200" spc="-1" strike="noStrike">
-              <a:solidFill>
-                <a:srgbClr val="ffffff"/>
-              </a:solidFill>
               <a:latin typeface="Arial"/>
             </a:endParaRPr>
           </a:p>
@@ -2247,9 +2175,6 @@
           </a:bodyPr>
           <a:p>
             <a:endParaRPr b="0" lang="en-US" sz="3200" spc="-1" strike="noStrike">
-              <a:solidFill>
-                <a:srgbClr val="ffffff"/>
-              </a:solidFill>
               <a:latin typeface="Arial"/>
             </a:endParaRPr>
           </a:p>
@@ -2284,9 +2209,6 @@
           </a:bodyPr>
           <a:p>
             <a:endParaRPr b="0" lang="en-US" sz="3200" spc="-1" strike="noStrike">
-              <a:solidFill>
-                <a:srgbClr val="ffffff"/>
-              </a:solidFill>
               <a:latin typeface="Arial"/>
             </a:endParaRPr>
           </a:p>
@@ -2326,7 +2248,7 @@
         <p:txBody>
           <a:bodyPr/>
           <a:p>
-            <a:fld id="{ADAC92BE-6A66-4DF8-9CE2-F7B7B3496588}" type="slidenum">
+            <a:fld id="{D7047EC8-43BB-4942-8C52-5613E22C4DFA}" type="slidenum">
               <a:t>&lt;#&gt;</a:t>
             </a:fld>
           </a:p>
@@ -2384,7 +2306,7 @@
         <p:spPr>
           <a:xfrm>
             <a:off x="0" y="0"/>
-            <a:ext cx="10078920" cy="5668920"/>
+            <a:ext cx="10078560" cy="5668560"/>
           </a:xfrm>
           <a:prstGeom prst="rect">
             <a:avLst/>
@@ -2420,7 +2342,7 @@
         <p:spPr>
           <a:xfrm>
             <a:off x="1440000" y="1080000"/>
-            <a:ext cx="1438920" cy="1258920"/>
+            <a:ext cx="1438560" cy="1258560"/>
           </a:xfrm>
           <a:prstGeom prst="ellipse">
             <a:avLst/>
@@ -2450,7 +2372,7 @@
         <p:spPr>
           <a:xfrm>
             <a:off x="7380000" y="3960000"/>
-            <a:ext cx="1438920" cy="1258920"/>
+            <a:ext cx="1438560" cy="1258560"/>
           </a:xfrm>
           <a:prstGeom prst="ellipse">
             <a:avLst/>
@@ -2480,7 +2402,7 @@
         <p:spPr>
           <a:xfrm>
             <a:off x="9000000" y="2700000"/>
-            <a:ext cx="1258920" cy="1078920"/>
+            <a:ext cx="1258560" cy="1078560"/>
           </a:xfrm>
           <a:prstGeom prst="ellipse">
             <a:avLst/>
@@ -2510,7 +2432,7 @@
         <p:spPr>
           <a:xfrm>
             <a:off x="-180000" y="2430000"/>
-            <a:ext cx="1438920" cy="1348920"/>
+            <a:ext cx="1438560" cy="1348560"/>
           </a:xfrm>
           <a:prstGeom prst="ellipse">
             <a:avLst/>
@@ -2540,7 +2462,7 @@
         <p:spPr>
           <a:xfrm>
             <a:off x="540000" y="1080000"/>
-            <a:ext cx="718920" cy="718920"/>
+            <a:ext cx="718560" cy="718560"/>
           </a:xfrm>
           <a:prstGeom prst="ellipse">
             <a:avLst/>
@@ -2570,7 +2492,7 @@
         <p:spPr>
           <a:xfrm>
             <a:off x="0" y="1260000"/>
-            <a:ext cx="718920" cy="718920"/>
+            <a:ext cx="718560" cy="718560"/>
           </a:xfrm>
           <a:prstGeom prst="ellipse">
             <a:avLst/>
@@ -2600,7 +2522,7 @@
         <p:spPr>
           <a:xfrm>
             <a:off x="0" y="5220000"/>
-            <a:ext cx="1618920" cy="1258920"/>
+            <a:ext cx="1618560" cy="1258560"/>
           </a:xfrm>
           <a:prstGeom prst="ellipse">
             <a:avLst/>
@@ -2630,7 +2552,7 @@
         <p:spPr>
           <a:xfrm>
             <a:off x="9720000" y="4680000"/>
-            <a:ext cx="718920" cy="718920"/>
+            <a:ext cx="718560" cy="718560"/>
           </a:xfrm>
           <a:prstGeom prst="ellipse">
             <a:avLst/>
@@ -2660,7 +2582,7 @@
         <p:spPr>
           <a:xfrm>
             <a:off x="9540000" y="3420000"/>
-            <a:ext cx="718920" cy="718920"/>
+            <a:ext cx="718560" cy="718560"/>
           </a:xfrm>
           <a:prstGeom prst="ellipse">
             <a:avLst/>
@@ -2690,7 +2612,7 @@
         <p:spPr>
           <a:xfrm>
             <a:off x="8100000" y="4680000"/>
-            <a:ext cx="1078920" cy="841320"/>
+            <a:ext cx="1078560" cy="840960"/>
           </a:xfrm>
           <a:prstGeom prst="ellipse">
             <a:avLst/>
@@ -2720,7 +2642,7 @@
         <p:spPr>
           <a:xfrm>
             <a:off x="7920000" y="5400000"/>
-            <a:ext cx="898920" cy="898920"/>
+            <a:ext cx="898560" cy="898560"/>
           </a:xfrm>
           <a:prstGeom prst="ellipse">
             <a:avLst/>
@@ -2754,7 +2676,7 @@
         <p:spPr>
           <a:xfrm>
             <a:off x="3420000" y="5130000"/>
-            <a:ext cx="3238920" cy="391320"/>
+            <a:ext cx="3238560" cy="390960"/>
           </a:xfrm>
           <a:prstGeom prst="rect">
             <a:avLst/>
@@ -2817,7 +2739,7 @@
         <p:spPr>
           <a:xfrm>
             <a:off x="7560000" y="5130000"/>
-            <a:ext cx="2338920" cy="391320"/>
+            <a:ext cx="2338560" cy="390960"/>
           </a:xfrm>
           <a:prstGeom prst="rect">
             <a:avLst/>
@@ -2852,7 +2774,7 @@
               </a:lnSpc>
               <a:buNone/>
             </a:pPr>
-            <a:fld id="{E248D9A1-1867-4C89-9975-D15BB7D53C59}" type="slidenum">
+            <a:fld id="{DAB52581-1BD9-49F4-9462-7DB3E0B937D3}" type="slidenum">
               <a:rPr b="0" lang="en-US" sz="1400" spc="-1" strike="noStrike">
                 <a:solidFill>
                   <a:srgbClr val="ffffff"/>
@@ -2880,7 +2802,7 @@
         <p:spPr>
           <a:xfrm>
             <a:off x="180000" y="5130000"/>
-            <a:ext cx="2338920" cy="391320"/>
+            <a:ext cx="2338560" cy="390960"/>
           </a:xfrm>
           <a:prstGeom prst="rect">
             <a:avLst/>
@@ -2949,49 +2871,7 @@
               <a:rPr b="0" lang="en-US" sz="4400" spc="-1" strike="noStrike">
                 <a:latin typeface="Arial"/>
               </a:rPr>
-              <a:t>Clic</a:t>
-            </a:r>
-            <a:r>
-              <a:rPr b="0" lang="en-US" sz="4400" spc="-1" strike="noStrike">
-                <a:latin typeface="Arial"/>
-              </a:rPr>
-              <a:t>k to </a:t>
-            </a:r>
-            <a:r>
-              <a:rPr b="0" lang="en-US" sz="4400" spc="-1" strike="noStrike">
-                <a:latin typeface="Arial"/>
-              </a:rPr>
-              <a:t>edit </a:t>
-            </a:r>
-            <a:r>
-              <a:rPr b="0" lang="en-US" sz="4400" spc="-1" strike="noStrike">
-                <a:latin typeface="Arial"/>
-              </a:rPr>
-              <a:t>the </a:t>
-            </a:r>
-            <a:r>
-              <a:rPr b="0" lang="en-US" sz="4400" spc="-1" strike="noStrike">
-                <a:latin typeface="Arial"/>
-              </a:rPr>
-              <a:t>title </a:t>
-            </a:r>
-            <a:r>
-              <a:rPr b="0" lang="en-US" sz="4400" spc="-1" strike="noStrike">
-                <a:latin typeface="Arial"/>
-              </a:rPr>
-              <a:t>text </a:t>
-            </a:r>
-            <a:r>
-              <a:rPr b="0" lang="en-US" sz="4400" spc="-1" strike="noStrike">
-                <a:latin typeface="Arial"/>
-              </a:rPr>
-              <a:t>form</a:t>
-            </a:r>
-            <a:r>
-              <a:rPr b="0" lang="en-US" sz="4400" spc="-1" strike="noStrike">
-                <a:latin typeface="Arial"/>
-              </a:rPr>
-              <a:t>at</a:t>
+              <a:t>Click to edit the title text format</a:t>
             </a:r>
             <a:endParaRPr b="0" lang="en-US" sz="4400" spc="-1" strike="noStrike">
               <a:latin typeface="Arial"/>
@@ -3040,17 +2920,11 @@
             </a:pPr>
             <a:r>
               <a:rPr b="0" lang="en-US" sz="3200" spc="-1" strike="noStrike">
-                <a:solidFill>
-                  <a:srgbClr val="ffffff"/>
-                </a:solidFill>
                 <a:latin typeface="Arial"/>
               </a:rPr>
               <a:t>Click to edit the outline text format</a:t>
             </a:r>
             <a:endParaRPr b="0" lang="en-US" sz="3200" spc="-1" strike="noStrike">
-              <a:solidFill>
-                <a:srgbClr val="ffffff"/>
-              </a:solidFill>
               <a:latin typeface="Arial"/>
             </a:endParaRPr>
           </a:p>
@@ -3068,17 +2942,11 @@
             </a:pPr>
             <a:r>
               <a:rPr b="0" lang="en-US" sz="2800" spc="-1" strike="noStrike">
-                <a:solidFill>
-                  <a:srgbClr val="ffffff"/>
-                </a:solidFill>
                 <a:latin typeface="Arial"/>
               </a:rPr>
               <a:t>Second Outline Level</a:t>
             </a:r>
             <a:endParaRPr b="0" lang="en-US" sz="2800" spc="-1" strike="noStrike">
-              <a:solidFill>
-                <a:srgbClr val="ffffff"/>
-              </a:solidFill>
               <a:latin typeface="Arial"/>
             </a:endParaRPr>
           </a:p>
@@ -3096,17 +2964,11 @@
             </a:pPr>
             <a:r>
               <a:rPr b="0" lang="en-US" sz="2400" spc="-1" strike="noStrike">
-                <a:solidFill>
-                  <a:srgbClr val="ffffff"/>
-                </a:solidFill>
                 <a:latin typeface="Arial"/>
               </a:rPr>
               <a:t>Third Outline Level</a:t>
             </a:r>
             <a:endParaRPr b="0" lang="en-US" sz="2400" spc="-1" strike="noStrike">
-              <a:solidFill>
-                <a:srgbClr val="ffffff"/>
-              </a:solidFill>
               <a:latin typeface="Arial"/>
             </a:endParaRPr>
           </a:p>
@@ -3124,17 +2986,11 @@
             </a:pPr>
             <a:r>
               <a:rPr b="0" lang="en-US" sz="2000" spc="-1" strike="noStrike">
-                <a:solidFill>
-                  <a:srgbClr val="ffffff"/>
-                </a:solidFill>
                 <a:latin typeface="Arial"/>
               </a:rPr>
               <a:t>Fourth Outline Level</a:t>
             </a:r>
             <a:endParaRPr b="0" lang="en-US" sz="2000" spc="-1" strike="noStrike">
-              <a:solidFill>
-                <a:srgbClr val="ffffff"/>
-              </a:solidFill>
               <a:latin typeface="Arial"/>
             </a:endParaRPr>
           </a:p>
@@ -3152,17 +3008,11 @@
             </a:pPr>
             <a:r>
               <a:rPr b="0" lang="en-US" sz="2000" spc="-1" strike="noStrike">
-                <a:solidFill>
-                  <a:srgbClr val="ffffff"/>
-                </a:solidFill>
                 <a:latin typeface="Arial"/>
               </a:rPr>
               <a:t>Fifth Outline Level</a:t>
             </a:r>
             <a:endParaRPr b="0" lang="en-US" sz="2000" spc="-1" strike="noStrike">
-              <a:solidFill>
-                <a:srgbClr val="ffffff"/>
-              </a:solidFill>
               <a:latin typeface="Arial"/>
             </a:endParaRPr>
           </a:p>
@@ -3180,17 +3030,11 @@
             </a:pPr>
             <a:r>
               <a:rPr b="0" lang="en-US" sz="2000" spc="-1" strike="noStrike">
-                <a:solidFill>
-                  <a:srgbClr val="ffffff"/>
-                </a:solidFill>
                 <a:latin typeface="Arial"/>
               </a:rPr>
               <a:t>Sixth Outline Level</a:t>
             </a:r>
             <a:endParaRPr b="0" lang="en-US" sz="2000" spc="-1" strike="noStrike">
-              <a:solidFill>
-                <a:srgbClr val="ffffff"/>
-              </a:solidFill>
               <a:latin typeface="Arial"/>
             </a:endParaRPr>
           </a:p>
@@ -3208,17 +3052,11 @@
             </a:pPr>
             <a:r>
               <a:rPr b="0" lang="en-US" sz="2000" spc="-1" strike="noStrike">
-                <a:solidFill>
-                  <a:srgbClr val="ffffff"/>
-                </a:solidFill>
                 <a:latin typeface="Arial"/>
               </a:rPr>
               <a:t>Seventh Outline Level</a:t>
             </a:r>
             <a:endParaRPr b="0" lang="en-US" sz="2000" spc="-1" strike="noStrike">
-              <a:solidFill>
-                <a:srgbClr val="ffffff"/>
-              </a:solidFill>
               <a:latin typeface="Arial"/>
             </a:endParaRPr>
           </a:p>
@@ -3274,7 +3112,7 @@
         <p:spPr>
           <a:xfrm>
             <a:off x="504000" y="1428840"/>
-            <a:ext cx="9070560" cy="945720"/>
+            <a:ext cx="9070200" cy="945360"/>
           </a:xfrm>
           <a:prstGeom prst="rect">
             <a:avLst/>
@@ -3302,16 +3140,7 @@
                 </a:solidFill>
                 <a:latin typeface="Arial"/>
               </a:rPr>
-              <a:t>Contact </a:t>
-            </a:r>
-            <a:r>
-              <a:rPr b="0" lang="en-US" sz="3300" spc="-1" strike="noStrike">
-                <a:solidFill>
-                  <a:srgbClr val="ffffff"/>
-                </a:solidFill>
-                <a:latin typeface="Arial"/>
-              </a:rPr>
-              <a:t>Manager</a:t>
+              <a:t>Contact Manager</a:t>
             </a:r>
             <a:endParaRPr b="0" lang="en-US" sz="3300" spc="-1" strike="noStrike">
               <a:latin typeface="Arial"/>
@@ -3332,7 +3161,7 @@
         <p:spPr>
           <a:xfrm>
             <a:off x="504000" y="2592000"/>
-            <a:ext cx="9070560" cy="2021760"/>
+            <a:ext cx="9070200" cy="2021400"/>
           </a:xfrm>
           <a:prstGeom prst="rect">
             <a:avLst/>
@@ -3350,10 +3179,7 @@
             <a:pPr algn="ctr">
               <a:buNone/>
             </a:pPr>
-            <a:endParaRPr b="0" lang="en-US" sz="1800" spc="-1" strike="noStrike">
-              <a:solidFill>
-                <a:srgbClr val="ffffff"/>
-              </a:solidFill>
+            <a:endParaRPr b="0" lang="en-US" sz="3200" spc="-1" strike="noStrike">
               <a:latin typeface="Arial"/>
             </a:endParaRPr>
           </a:p>
@@ -3402,7 +3228,7 @@
         <p:spPr>
           <a:xfrm>
             <a:off x="540000" y="139680"/>
-            <a:ext cx="8998920" cy="1249560"/>
+            <a:ext cx="8998560" cy="1249200"/>
           </a:xfrm>
           <a:prstGeom prst="rect">
             <a:avLst/>
@@ -3451,7 +3277,7 @@
         <p:spPr>
           <a:xfrm>
             <a:off x="504000" y="1326600"/>
-            <a:ext cx="9071280" cy="3287880"/>
+            <a:ext cx="9070920" cy="3287520"/>
           </a:xfrm>
           <a:prstGeom prst="rect">
             <a:avLst/>
@@ -3466,7 +3292,7 @@
             <a:normAutofit/>
           </a:bodyPr>
           <a:p>
-            <a:pPr indent="-324000">
+            <a:pPr marL="432000" indent="-324000">
               <a:lnSpc>
                 <a:spcPct val="100000"/>
               </a:lnSpc>
@@ -3486,14 +3312,11 @@
               <a:t>Database</a:t>
             </a:r>
             <a:endParaRPr b="0" lang="en-US" sz="1800" spc="-1" strike="noStrike">
-              <a:solidFill>
-                <a:srgbClr val="ffffff"/>
-              </a:solidFill>
-              <a:latin typeface="Arial"/>
-            </a:endParaRPr>
-          </a:p>
-          <a:p>
-            <a:pPr indent="-324000">
+              <a:latin typeface="Arial"/>
+            </a:endParaRPr>
+          </a:p>
+          <a:p>
+            <a:pPr marL="432000" indent="-324000">
               <a:lnSpc>
                 <a:spcPct val="100000"/>
               </a:lnSpc>
@@ -3513,9 +3336,6 @@
               <a:t>API</a:t>
             </a:r>
             <a:endParaRPr b="0" lang="en-US" sz="1800" spc="-1" strike="noStrike">
-              <a:solidFill>
-                <a:srgbClr val="ffffff"/>
-              </a:solidFill>
               <a:latin typeface="Arial"/>
             </a:endParaRPr>
           </a:p>
@@ -3564,7 +3384,7 @@
         <p:spPr>
           <a:xfrm>
             <a:off x="540000" y="139680"/>
-            <a:ext cx="8998920" cy="1249560"/>
+            <a:ext cx="8998560" cy="1249200"/>
           </a:xfrm>
           <a:prstGeom prst="rect">
             <a:avLst/>
@@ -3613,7 +3433,7 @@
         <p:spPr>
           <a:xfrm>
             <a:off x="504000" y="1326600"/>
-            <a:ext cx="9071280" cy="3287880"/>
+            <a:ext cx="9070920" cy="3287520"/>
           </a:xfrm>
           <a:prstGeom prst="rect">
             <a:avLst/>
@@ -3629,9 +3449,6 @@
           </a:bodyPr>
           <a:p>
             <a:endParaRPr b="0" lang="en-US" sz="3200" spc="-1" strike="noStrike">
-              <a:solidFill>
-                <a:srgbClr val="ffffff"/>
-              </a:solidFill>
               <a:latin typeface="Arial"/>
             </a:endParaRPr>
           </a:p>
@@ -3680,7 +3497,7 @@
         <p:spPr>
           <a:xfrm>
             <a:off x="540000" y="139680"/>
-            <a:ext cx="8998920" cy="1249560"/>
+            <a:ext cx="8998560" cy="1249200"/>
           </a:xfrm>
           <a:prstGeom prst="rect">
             <a:avLst/>
@@ -3729,7 +3546,7 @@
         <p:spPr>
           <a:xfrm>
             <a:off x="504000" y="1326600"/>
-            <a:ext cx="9071280" cy="3287880"/>
+            <a:ext cx="9070920" cy="3287520"/>
           </a:xfrm>
           <a:prstGeom prst="rect">
             <a:avLst/>
@@ -3745,9 +3562,6 @@
           </a:bodyPr>
           <a:p>
             <a:endParaRPr b="0" lang="en-US" sz="3200" spc="-1" strike="noStrike">
-              <a:solidFill>
-                <a:srgbClr val="ffffff"/>
-              </a:solidFill>
               <a:latin typeface="Arial"/>
             </a:endParaRPr>
           </a:p>
@@ -3796,7 +3610,7 @@
         <p:spPr>
           <a:xfrm>
             <a:off x="540000" y="139680"/>
-            <a:ext cx="8998920" cy="1249560"/>
+            <a:ext cx="8998560" cy="1249200"/>
           </a:xfrm>
           <a:prstGeom prst="rect">
             <a:avLst/>
@@ -3845,7 +3659,7 @@
         <p:spPr>
           <a:xfrm>
             <a:off x="504000" y="1326600"/>
-            <a:ext cx="9071280" cy="3287880"/>
+            <a:ext cx="9070920" cy="3287520"/>
           </a:xfrm>
           <a:prstGeom prst="rect">
             <a:avLst/>
@@ -3861,9 +3675,6 @@
           </a:bodyPr>
           <a:p>
             <a:endParaRPr b="0" lang="en-US" sz="3200" spc="-1" strike="noStrike">
-              <a:solidFill>
-                <a:srgbClr val="ffffff"/>
-              </a:solidFill>
               <a:latin typeface="Arial"/>
             </a:endParaRPr>
           </a:p>
@@ -3912,7 +3723,7 @@
         <p:spPr>
           <a:xfrm>
             <a:off x="530280" y="425520"/>
-            <a:ext cx="9070560" cy="945720"/>
+            <a:ext cx="9070200" cy="945360"/>
           </a:xfrm>
           <a:prstGeom prst="rect">
             <a:avLst/>
@@ -3957,7 +3768,7 @@
         <p:spPr>
           <a:xfrm>
             <a:off x="7195320" y="2057400"/>
-            <a:ext cx="1948320" cy="302040"/>
+            <a:ext cx="1947960" cy="301680"/>
           </a:xfrm>
           <a:prstGeom prst="rect">
             <a:avLst/>
@@ -3990,6 +3801,7 @@
                   <a:srgbClr val="ffffff"/>
                 </a:solidFill>
                 <a:latin typeface="Arial"/>
+                <a:ea typeface="DejaVu Sans"/>
               </a:rPr>
               <a:t>Joshua Jarquin (PM)</a:t>
             </a:r>
@@ -4008,7 +3820,7 @@
         <p:spPr>
           <a:xfrm>
             <a:off x="685800" y="2057400"/>
-            <a:ext cx="1352160" cy="513360"/>
+            <a:ext cx="1351800" cy="513000"/>
           </a:xfrm>
           <a:prstGeom prst="rect">
             <a:avLst/>
@@ -4041,6 +3853,7 @@
                   <a:srgbClr val="ffffff"/>
                 </a:solidFill>
                 <a:latin typeface="Arial"/>
+                <a:ea typeface="DejaVu Sans"/>
               </a:rPr>
               <a:t>Joshua Bartz (Database) </a:t>
             </a:r>
@@ -4059,7 +3872,7 @@
         <p:spPr>
           <a:xfrm>
             <a:off x="4167360" y="1983600"/>
-            <a:ext cx="1318680" cy="513360"/>
+            <a:ext cx="1318320" cy="513000"/>
           </a:xfrm>
           <a:prstGeom prst="rect">
             <a:avLst/>
@@ -4092,6 +3905,7 @@
                   <a:srgbClr val="ffffff"/>
                 </a:solidFill>
                 <a:latin typeface="Arial"/>
+                <a:ea typeface="DejaVu Sans"/>
               </a:rPr>
               <a:t>Eugenio Diaz (API)</a:t>
             </a:r>
@@ -4110,7 +3924,7 @@
         <p:spPr>
           <a:xfrm>
             <a:off x="616320" y="4572000"/>
-            <a:ext cx="1669320" cy="513360"/>
+            <a:ext cx="1668960" cy="513000"/>
           </a:xfrm>
           <a:prstGeom prst="rect">
             <a:avLst/>
@@ -4143,6 +3957,7 @@
                   <a:srgbClr val="ffffff"/>
                 </a:solidFill>
                 <a:latin typeface="Arial"/>
+                <a:ea typeface="DejaVu Sans"/>
               </a:rPr>
               <a:t>Benjamin Monroy (Front-End)</a:t>
             </a:r>
@@ -4161,7 +3976,7 @@
         <p:spPr>
           <a:xfrm>
             <a:off x="4272480" y="4572000"/>
-            <a:ext cx="1670760" cy="513360"/>
+            <a:ext cx="1670400" cy="513000"/>
           </a:xfrm>
           <a:prstGeom prst="rect">
             <a:avLst/>
@@ -4194,6 +4009,7 @@
                   <a:srgbClr val="ffffff"/>
                 </a:solidFill>
                 <a:latin typeface="Arial"/>
+                <a:ea typeface="DejaVu Sans"/>
               </a:rPr>
               <a:t>Gabriel Rechdan (API) </a:t>
             </a:r>
@@ -4212,7 +4028,7 @@
         <p:spPr>
           <a:xfrm>
             <a:off x="7539840" y="4572000"/>
-            <a:ext cx="1603800" cy="513360"/>
+            <a:ext cx="1603440" cy="513000"/>
           </a:xfrm>
           <a:prstGeom prst="rect">
             <a:avLst/>
@@ -4245,6 +4061,7 @@
                   <a:srgbClr val="ffffff"/>
                 </a:solidFill>
                 <a:latin typeface="Arial"/>
+                <a:ea typeface="DejaVu Sans"/>
               </a:rPr>
               <a:t>Alejandro Tejeira  (Front-End)</a:t>
             </a:r>
@@ -4297,7 +4114,7 @@
         <p:spPr>
           <a:xfrm>
             <a:off x="504000" y="1428840"/>
-            <a:ext cx="9070560" cy="945720"/>
+            <a:ext cx="9070200" cy="945360"/>
           </a:xfrm>
           <a:prstGeom prst="rect">
             <a:avLst/>
@@ -4346,7 +4163,7 @@
         <p:spPr>
           <a:xfrm>
             <a:off x="504000" y="1958400"/>
-            <a:ext cx="9070560" cy="3288960"/>
+            <a:ext cx="9070200" cy="3288600"/>
           </a:xfrm>
           <a:prstGeom prst="rect">
             <a:avLst/>
@@ -4362,6 +4179,9 @@
           </a:bodyPr>
           <a:p>
             <a:pPr algn="ctr">
+              <a:lnSpc>
+                <a:spcPct val="100000"/>
+              </a:lnSpc>
               <a:buNone/>
             </a:pPr>
             <a:r>
@@ -4374,9 +4194,6 @@
               <a:t>how it was developed, and anything that you feel is important</a:t>
             </a:r>
             <a:endParaRPr b="0" lang="en-US" sz="1800" spc="-1" strike="noStrike">
-              <a:solidFill>
-                <a:srgbClr val="ffffff"/>
-              </a:solidFill>
               <a:latin typeface="Arial"/>
             </a:endParaRPr>
           </a:p>
@@ -4425,7 +4242,7 @@
         <p:spPr>
           <a:xfrm>
             <a:off x="504000" y="1428840"/>
-            <a:ext cx="9070560" cy="945720"/>
+            <a:ext cx="9070200" cy="945360"/>
           </a:xfrm>
           <a:prstGeom prst="rect">
             <a:avLst/>
@@ -4474,7 +4291,7 @@
         <p:spPr>
           <a:xfrm>
             <a:off x="504000" y="2592000"/>
-            <a:ext cx="9070560" cy="2021760"/>
+            <a:ext cx="9070200" cy="2021400"/>
           </a:xfrm>
           <a:prstGeom prst="rect">
             <a:avLst/>
@@ -4505,9 +4322,6 @@
               <a:t>LAMP stack implemented</a:t>
             </a:r>
             <a:endParaRPr b="0" lang="en-US" sz="1800" spc="-1" strike="noStrike">
-              <a:solidFill>
-                <a:srgbClr val="ffffff"/>
-              </a:solidFill>
               <a:latin typeface="Arial"/>
             </a:endParaRPr>
           </a:p>
@@ -4528,9 +4342,6 @@
               <a:t>Linux: Hosted on an ubuntu 22.04 server from DigitalOcean</a:t>
             </a:r>
             <a:endParaRPr b="0" lang="en-US" sz="1800" spc="-1" strike="noStrike">
-              <a:solidFill>
-                <a:srgbClr val="ffffff"/>
-              </a:solidFill>
               <a:latin typeface="Arial"/>
             </a:endParaRPr>
           </a:p>
@@ -4551,9 +4362,6 @@
               <a:t>Apache (HTTP): </a:t>
             </a:r>
             <a:endParaRPr b="0" lang="en-US" sz="1800" spc="-1" strike="noStrike">
-              <a:solidFill>
-                <a:srgbClr val="ffffff"/>
-              </a:solidFill>
               <a:latin typeface="Arial"/>
             </a:endParaRPr>
           </a:p>
@@ -4574,9 +4382,6 @@
               <a:t>MySQL: The database solution to store user login info and each user’s contact’s info</a:t>
             </a:r>
             <a:endParaRPr b="0" lang="en-US" sz="1800" spc="-1" strike="noStrike">
-              <a:solidFill>
-                <a:srgbClr val="ffffff"/>
-              </a:solidFill>
               <a:latin typeface="Arial"/>
             </a:endParaRPr>
           </a:p>
@@ -4597,9 +4402,6 @@
               <a:t>PHP: The interface used to communicate between the front-end (user actions) and the database (the info which is then displayed in browser).</a:t>
             </a:r>
             <a:endParaRPr b="0" lang="en-US" sz="1800" spc="-1" strike="noStrike">
-              <a:solidFill>
-                <a:srgbClr val="ffffff"/>
-              </a:solidFill>
               <a:latin typeface="Arial"/>
             </a:endParaRPr>
           </a:p>
@@ -4648,7 +4450,7 @@
         <p:spPr>
           <a:xfrm>
             <a:off x="504000" y="1428840"/>
-            <a:ext cx="9070560" cy="945720"/>
+            <a:ext cx="9070200" cy="945360"/>
           </a:xfrm>
           <a:prstGeom prst="rect">
             <a:avLst/>
@@ -4697,7 +4499,7 @@
         <p:spPr>
           <a:xfrm>
             <a:off x="504000" y="2592000"/>
-            <a:ext cx="9070560" cy="2021760"/>
+            <a:ext cx="9070200" cy="2021400"/>
           </a:xfrm>
           <a:prstGeom prst="rect">
             <a:avLst/>
@@ -4728,9 +4530,6 @@
               <a:t>Github: Source Code &amp; document digital repository host.</a:t>
             </a:r>
             <a:endParaRPr b="0" lang="en-US" sz="1800" spc="-1" strike="noStrike">
-              <a:solidFill>
-                <a:srgbClr val="ffffff"/>
-              </a:solidFill>
               <a:latin typeface="Arial"/>
             </a:endParaRPr>
           </a:p>
@@ -4751,9 +4550,6 @@
               <a:t>Discord: Primary source of communication</a:t>
             </a:r>
             <a:endParaRPr b="0" lang="en-US" sz="1800" spc="-1" strike="noStrike">
-              <a:solidFill>
-                <a:srgbClr val="ffffff"/>
-              </a:solidFill>
               <a:latin typeface="Arial"/>
             </a:endParaRPr>
           </a:p>
@@ -4774,9 +4570,6 @@
               <a:t>Ganttpro: Used to create the gantt chart</a:t>
             </a:r>
             <a:endParaRPr b="0" lang="en-US" sz="1800" spc="-1" strike="noStrike">
-              <a:solidFill>
-                <a:srgbClr val="ffffff"/>
-              </a:solidFill>
               <a:latin typeface="Arial"/>
             </a:endParaRPr>
           </a:p>
@@ -4825,7 +4618,7 @@
         <p:spPr>
           <a:xfrm>
             <a:off x="457200" y="197280"/>
-            <a:ext cx="9070560" cy="945720"/>
+            <a:ext cx="9070200" cy="945360"/>
           </a:xfrm>
           <a:prstGeom prst="rect">
             <a:avLst/>
@@ -4874,7 +4667,7 @@
         <p:spPr>
           <a:xfrm>
             <a:off x="457200" y="1298880"/>
-            <a:ext cx="9372600" cy="3958920"/>
+            <a:ext cx="9372240" cy="3958560"/>
           </a:xfrm>
           <a:prstGeom prst="rect">
             <a:avLst/>
@@ -4926,8 +4719,8 @@
         </p:nvSpPr>
         <p:spPr>
           <a:xfrm>
-            <a:off x="504000" y="1428840"/>
-            <a:ext cx="9070560" cy="945720"/>
+            <a:off x="531000" y="197640"/>
+            <a:ext cx="9070200" cy="945360"/>
           </a:xfrm>
           <a:prstGeom prst="rect">
             <a:avLst/>
@@ -4963,58 +4756,29 @@
           </a:p>
         </p:txBody>
       </p:sp>
-      <p:sp>
-        <p:nvSpPr>
-          <p:cNvPr id="71" name="PlaceHolder 2"/>
-          <p:cNvSpPr>
-            <a:spLocks noGrp="1"/>
-          </p:cNvSpPr>
-          <p:nvPr>
-            <p:ph type="subTitle"/>
-          </p:nvPr>
-        </p:nvSpPr>
-        <p:spPr>
-          <a:xfrm>
-            <a:off x="504000" y="2592000"/>
-            <a:ext cx="9070560" cy="2021760"/>
-          </a:xfrm>
-          <a:prstGeom prst="rect">
-            <a:avLst/>
-          </a:prstGeom>
-          <a:noFill/>
-          <a:ln w="0">
-            <a:noFill/>
-          </a:ln>
-        </p:spPr>
-        <p:txBody>
-          <a:bodyPr lIns="0" rIns="0" tIns="0" bIns="0" anchor="ctr">
-            <a:noAutofit/>
-          </a:bodyPr>
-          <a:p>
-            <a:pPr>
-              <a:lnSpc>
-                <a:spcPct val="100000"/>
-              </a:lnSpc>
-              <a:buNone/>
-            </a:pPr>
-            <a:r>
-              <a:rPr b="0" lang="en-US" sz="1800" spc="-1" strike="noStrike">
-                <a:solidFill>
-                  <a:srgbClr val="ffffff"/>
-                </a:solidFill>
-                <a:latin typeface="Arial"/>
-              </a:rPr>
-              <a:t>IP</a:t>
-            </a:r>
-            <a:endParaRPr b="0" lang="en-US" sz="1800" spc="-1" strike="noStrike">
-              <a:solidFill>
-                <a:srgbClr val="ffffff"/>
-              </a:solidFill>
-              <a:latin typeface="Arial"/>
-            </a:endParaRPr>
-          </a:p>
-        </p:txBody>
-      </p:sp>
+      <p:pic>
+        <p:nvPicPr>
+          <p:cNvPr id="71" name="" descr=""/>
+          <p:cNvPicPr/>
+          <p:nvPr/>
+        </p:nvPicPr>
+        <p:blipFill>
+          <a:blip r:embed="rId1"/>
+          <a:stretch/>
+        </p:blipFill>
+        <p:spPr>
+          <a:xfrm>
+            <a:off x="4320" y="1337760"/>
+            <a:ext cx="10080360" cy="2988360"/>
+          </a:xfrm>
+          <a:prstGeom prst="rect">
+            <a:avLst/>
+          </a:prstGeom>
+          <a:ln w="0">
+            <a:noFill/>
+          </a:ln>
+        </p:spPr>
+      </p:pic>
     </p:spTree>
   </p:cSld>
   <mc:AlternateContent>
@@ -5058,7 +4822,7 @@
         <p:spPr>
           <a:xfrm>
             <a:off x="504000" y="-228600"/>
-            <a:ext cx="9070560" cy="1143000"/>
+            <a:ext cx="9070200" cy="1142640"/>
           </a:xfrm>
           <a:prstGeom prst="rect">
             <a:avLst/>
@@ -5107,7 +4871,7 @@
         <p:spPr>
           <a:xfrm>
             <a:off x="777600" y="680400"/>
-            <a:ext cx="8823600" cy="4963320"/>
+            <a:ext cx="8823240" cy="4962960"/>
           </a:xfrm>
           <a:prstGeom prst="rect">
             <a:avLst/>
@@ -5160,7 +4924,7 @@
         <p:spPr>
           <a:xfrm>
             <a:off x="540000" y="139680"/>
-            <a:ext cx="8998920" cy="1249560"/>
+            <a:ext cx="8998560" cy="1249200"/>
           </a:xfrm>
           <a:prstGeom prst="rect">
             <a:avLst/>
@@ -5209,7 +4973,7 @@
         <p:spPr>
           <a:xfrm>
             <a:off x="504000" y="1326600"/>
-            <a:ext cx="9071280" cy="3287880"/>
+            <a:ext cx="9070920" cy="3287520"/>
           </a:xfrm>
           <a:prstGeom prst="rect">
             <a:avLst/>
@@ -5224,7 +4988,7 @@
             <a:normAutofit/>
           </a:bodyPr>
           <a:p>
-            <a:pPr indent="-324000">
+            <a:pPr marL="432000" indent="-324000">
               <a:lnSpc>
                 <a:spcPct val="100000"/>
               </a:lnSpc>
@@ -5244,27 +5008,17 @@
               <a:t>Front-End?</a:t>
             </a:r>
             <a:endParaRPr b="0" lang="en-US" sz="1800" spc="-1" strike="noStrike">
-              <a:solidFill>
-                <a:srgbClr val="ffffff"/>
-              </a:solidFill>
-              <a:latin typeface="Arial"/>
-            </a:endParaRPr>
-          </a:p>
-          <a:p>
-            <a:pPr indent="-324000">
+              <a:latin typeface="Arial"/>
+            </a:endParaRPr>
+          </a:p>
+          <a:p>
+            <a:pPr>
               <a:lnSpc>
                 <a:spcPct val="100000"/>
               </a:lnSpc>
-              <a:buClr>
-                <a:srgbClr val="000000"/>
-              </a:buClr>
-              <a:buFont typeface="Wingdings" charset="2"/>
-              <a:buChar char=""/>
+              <a:buNone/>
             </a:pPr>
             <a:endParaRPr b="0" lang="en-US" sz="1800" spc="-1" strike="noStrike">
-              <a:solidFill>
-                <a:srgbClr val="ffffff"/>
-              </a:solidFill>
               <a:latin typeface="Arial"/>
             </a:endParaRPr>
           </a:p>

</xml_diff>

<commit_message>
added more content to pres.pptx
</commit_message>
<xml_diff>
--- a/Pres.pptx
+++ b/Pres.pptx
@@ -18,6 +18,8 @@
     <p:sldId id="266" r:id="rId13"/>
     <p:sldId id="267" r:id="rId14"/>
     <p:sldId id="268" r:id="rId15"/>
+    <p:sldId id="269" r:id="rId16"/>
+    <p:sldId id="270" r:id="rId17"/>
   </p:sldIdLst>
   <p:sldSz cx="10080625" cy="5670550"/>
   <p:notesSz cx="7559675" cy="10691813"/>
@@ -75,7 +77,7 @@
         <p:txBody>
           <a:bodyPr/>
           <a:p>
-            <a:fld id="{7EE8874D-EF5E-47C3-9D40-A4A2B03255B3}" type="slidenum">
+            <a:fld id="{A0797950-1CCD-4D8E-BF44-15E3A778D523}" type="slidenum">
               <a:t>&lt;#&gt;</a:t>
             </a:fld>
           </a:p>
@@ -190,6 +192,9 @@
           </a:bodyPr>
           <a:p>
             <a:endParaRPr b="0" lang="en-US" sz="3200" spc="-1" strike="noStrike">
+              <a:solidFill>
+                <a:srgbClr val="ffffff"/>
+              </a:solidFill>
               <a:latin typeface="Arial"/>
             </a:endParaRPr>
           </a:p>
@@ -224,6 +229,9 @@
           </a:bodyPr>
           <a:p>
             <a:endParaRPr b="0" lang="en-US" sz="3200" spc="-1" strike="noStrike">
+              <a:solidFill>
+                <a:srgbClr val="ffffff"/>
+              </a:solidFill>
               <a:latin typeface="Arial"/>
             </a:endParaRPr>
           </a:p>
@@ -263,7 +271,7 @@
         <p:txBody>
           <a:bodyPr/>
           <a:p>
-            <a:fld id="{8128F325-428D-45E4-95B6-FD2EDC8CD945}" type="slidenum">
+            <a:fld id="{60E8AF3F-B5CD-44A0-99F8-49B35702040A}" type="slidenum">
               <a:t>&lt;#&gt;</a:t>
             </a:fld>
           </a:p>
@@ -378,6 +386,9 @@
           </a:bodyPr>
           <a:p>
             <a:endParaRPr b="0" lang="en-US" sz="3200" spc="-1" strike="noStrike">
+              <a:solidFill>
+                <a:srgbClr val="ffffff"/>
+              </a:solidFill>
               <a:latin typeface="Arial"/>
             </a:endParaRPr>
           </a:p>
@@ -412,6 +423,9 @@
           </a:bodyPr>
           <a:p>
             <a:endParaRPr b="0" lang="en-US" sz="3200" spc="-1" strike="noStrike">
+              <a:solidFill>
+                <a:srgbClr val="ffffff"/>
+              </a:solidFill>
               <a:latin typeface="Arial"/>
             </a:endParaRPr>
           </a:p>
@@ -446,6 +460,9 @@
           </a:bodyPr>
           <a:p>
             <a:endParaRPr b="0" lang="en-US" sz="3200" spc="-1" strike="noStrike">
+              <a:solidFill>
+                <a:srgbClr val="ffffff"/>
+              </a:solidFill>
               <a:latin typeface="Arial"/>
             </a:endParaRPr>
           </a:p>
@@ -480,6 +497,9 @@
           </a:bodyPr>
           <a:p>
             <a:endParaRPr b="0" lang="en-US" sz="3200" spc="-1" strike="noStrike">
+              <a:solidFill>
+                <a:srgbClr val="ffffff"/>
+              </a:solidFill>
               <a:latin typeface="Arial"/>
             </a:endParaRPr>
           </a:p>
@@ -519,7 +539,7 @@
         <p:txBody>
           <a:bodyPr/>
           <a:p>
-            <a:fld id="{E901BA0D-92D5-48BE-8E6E-B9169B23148B}" type="slidenum">
+            <a:fld id="{45C5DF6E-A76C-4425-B043-D48D562D2A0B}" type="slidenum">
               <a:t>&lt;#&gt;</a:t>
             </a:fld>
           </a:p>
@@ -634,6 +654,9 @@
           </a:bodyPr>
           <a:p>
             <a:endParaRPr b="0" lang="en-US" sz="3200" spc="-1" strike="noStrike">
+              <a:solidFill>
+                <a:srgbClr val="ffffff"/>
+              </a:solidFill>
               <a:latin typeface="Arial"/>
             </a:endParaRPr>
           </a:p>
@@ -668,6 +691,9 @@
           </a:bodyPr>
           <a:p>
             <a:endParaRPr b="0" lang="en-US" sz="3200" spc="-1" strike="noStrike">
+              <a:solidFill>
+                <a:srgbClr val="ffffff"/>
+              </a:solidFill>
               <a:latin typeface="Arial"/>
             </a:endParaRPr>
           </a:p>
@@ -702,6 +728,9 @@
           </a:bodyPr>
           <a:p>
             <a:endParaRPr b="0" lang="en-US" sz="3200" spc="-1" strike="noStrike">
+              <a:solidFill>
+                <a:srgbClr val="ffffff"/>
+              </a:solidFill>
               <a:latin typeface="Arial"/>
             </a:endParaRPr>
           </a:p>
@@ -736,6 +765,9 @@
           </a:bodyPr>
           <a:p>
             <a:endParaRPr b="0" lang="en-US" sz="3200" spc="-1" strike="noStrike">
+              <a:solidFill>
+                <a:srgbClr val="ffffff"/>
+              </a:solidFill>
               <a:latin typeface="Arial"/>
             </a:endParaRPr>
           </a:p>
@@ -770,6 +802,9 @@
           </a:bodyPr>
           <a:p>
             <a:endParaRPr b="0" lang="en-US" sz="3200" spc="-1" strike="noStrike">
+              <a:solidFill>
+                <a:srgbClr val="ffffff"/>
+              </a:solidFill>
               <a:latin typeface="Arial"/>
             </a:endParaRPr>
           </a:p>
@@ -804,6 +839,9 @@
           </a:bodyPr>
           <a:p>
             <a:endParaRPr b="0" lang="en-US" sz="3200" spc="-1" strike="noStrike">
+              <a:solidFill>
+                <a:srgbClr val="ffffff"/>
+              </a:solidFill>
               <a:latin typeface="Arial"/>
             </a:endParaRPr>
           </a:p>
@@ -843,7 +881,7 @@
         <p:txBody>
           <a:bodyPr/>
           <a:p>
-            <a:fld id="{BACB0C39-BCEB-451B-8AC3-806071275DD4}" type="slidenum">
+            <a:fld id="{85680409-3622-46D6-BB2D-6F3D6F72B71E}" type="slidenum">
               <a:t>&lt;#&gt;</a:t>
             </a:fld>
           </a:p>
@@ -957,9 +995,6 @@
             <a:noAutofit/>
           </a:bodyPr>
           <a:p>
-            <a:pPr algn="ctr">
-              <a:buNone/>
-            </a:pPr>
             <a:endParaRPr b="0" lang="en-US" sz="3200" spc="-1" strike="noStrike">
               <a:latin typeface="Arial"/>
             </a:endParaRPr>
@@ -1000,7 +1035,7 @@
         <p:txBody>
           <a:bodyPr/>
           <a:p>
-            <a:fld id="{2533CA03-F124-446E-B5A5-BB955502BE28}" type="slidenum">
+            <a:fld id="{1E2AD819-A9C5-4C30-A65C-3D03DDC2709D}" type="slidenum">
               <a:t>&lt;#&gt;</a:t>
             </a:fld>
           </a:p>
@@ -1115,6 +1150,9 @@
           </a:bodyPr>
           <a:p>
             <a:endParaRPr b="0" lang="en-US" sz="3200" spc="-1" strike="noStrike">
+              <a:solidFill>
+                <a:srgbClr val="ffffff"/>
+              </a:solidFill>
               <a:latin typeface="Arial"/>
             </a:endParaRPr>
           </a:p>
@@ -1154,7 +1192,7 @@
         <p:txBody>
           <a:bodyPr/>
           <a:p>
-            <a:fld id="{D43A20AA-A29D-4540-AFB1-AB57060576C8}" type="slidenum">
+            <a:fld id="{85EC7235-D7D0-4AEA-BB16-12EB748D4BA3}" type="slidenum">
               <a:t>&lt;#&gt;</a:t>
             </a:fld>
           </a:p>
@@ -1269,6 +1307,9 @@
           </a:bodyPr>
           <a:p>
             <a:endParaRPr b="0" lang="en-US" sz="3200" spc="-1" strike="noStrike">
+              <a:solidFill>
+                <a:srgbClr val="ffffff"/>
+              </a:solidFill>
               <a:latin typeface="Arial"/>
             </a:endParaRPr>
           </a:p>
@@ -1303,6 +1344,9 @@
           </a:bodyPr>
           <a:p>
             <a:endParaRPr b="0" lang="en-US" sz="3200" spc="-1" strike="noStrike">
+              <a:solidFill>
+                <a:srgbClr val="ffffff"/>
+              </a:solidFill>
               <a:latin typeface="Arial"/>
             </a:endParaRPr>
           </a:p>
@@ -1342,7 +1386,7 @@
         <p:txBody>
           <a:bodyPr/>
           <a:p>
-            <a:fld id="{C92B0261-BE04-4DCC-AB37-B2CDF8642ED5}" type="slidenum">
+            <a:fld id="{09508BBD-BA9F-452B-93A9-3AC89E107571}" type="slidenum">
               <a:t>&lt;#&gt;</a:t>
             </a:fld>
           </a:p>
@@ -1462,7 +1506,7 @@
         <p:txBody>
           <a:bodyPr/>
           <a:p>
-            <a:fld id="{C64C903E-2D4A-4BF3-B2B2-82B357ACBF71}" type="slidenum">
+            <a:fld id="{1759758E-1B30-47E3-BE72-F95510B48638}" type="slidenum">
               <a:t>&lt;#&gt;</a:t>
             </a:fld>
           </a:p>
@@ -1539,9 +1583,6 @@
             <a:noAutofit/>
           </a:bodyPr>
           <a:p>
-            <a:pPr algn="ctr">
-              <a:buNone/>
-            </a:pPr>
             <a:endParaRPr b="0" lang="en-US" sz="3200" spc="-1" strike="noStrike">
               <a:latin typeface="Arial"/>
             </a:endParaRPr>
@@ -1582,7 +1623,7 @@
         <p:txBody>
           <a:bodyPr/>
           <a:p>
-            <a:fld id="{B536AA7A-F03A-4034-A1E0-AAB6ADD1B46A}" type="slidenum">
+            <a:fld id="{69566389-F2B1-40D9-8C69-9E23BE2A33E0}" type="slidenum">
               <a:t>&lt;#&gt;</a:t>
             </a:fld>
           </a:p>
@@ -1697,6 +1738,9 @@
           </a:bodyPr>
           <a:p>
             <a:endParaRPr b="0" lang="en-US" sz="3200" spc="-1" strike="noStrike">
+              <a:solidFill>
+                <a:srgbClr val="ffffff"/>
+              </a:solidFill>
               <a:latin typeface="Arial"/>
             </a:endParaRPr>
           </a:p>
@@ -1731,6 +1775,9 @@
           </a:bodyPr>
           <a:p>
             <a:endParaRPr b="0" lang="en-US" sz="3200" spc="-1" strike="noStrike">
+              <a:solidFill>
+                <a:srgbClr val="ffffff"/>
+              </a:solidFill>
               <a:latin typeface="Arial"/>
             </a:endParaRPr>
           </a:p>
@@ -1765,6 +1812,9 @@
           </a:bodyPr>
           <a:p>
             <a:endParaRPr b="0" lang="en-US" sz="3200" spc="-1" strike="noStrike">
+              <a:solidFill>
+                <a:srgbClr val="ffffff"/>
+              </a:solidFill>
               <a:latin typeface="Arial"/>
             </a:endParaRPr>
           </a:p>
@@ -1804,7 +1854,7 @@
         <p:txBody>
           <a:bodyPr/>
           <a:p>
-            <a:fld id="{510AC5A1-AF21-4C86-B2D6-18CDA2C7E9B3}" type="slidenum">
+            <a:fld id="{E358E313-2DFB-4C4F-9BA0-E519CB6B6C20}" type="slidenum">
               <a:t>&lt;#&gt;</a:t>
             </a:fld>
           </a:p>
@@ -1919,6 +1969,9 @@
           </a:bodyPr>
           <a:p>
             <a:endParaRPr b="0" lang="en-US" sz="3200" spc="-1" strike="noStrike">
+              <a:solidFill>
+                <a:srgbClr val="ffffff"/>
+              </a:solidFill>
               <a:latin typeface="Arial"/>
             </a:endParaRPr>
           </a:p>
@@ -1953,6 +2006,9 @@
           </a:bodyPr>
           <a:p>
             <a:endParaRPr b="0" lang="en-US" sz="3200" spc="-1" strike="noStrike">
+              <a:solidFill>
+                <a:srgbClr val="ffffff"/>
+              </a:solidFill>
               <a:latin typeface="Arial"/>
             </a:endParaRPr>
           </a:p>
@@ -1987,6 +2043,9 @@
           </a:bodyPr>
           <a:p>
             <a:endParaRPr b="0" lang="en-US" sz="3200" spc="-1" strike="noStrike">
+              <a:solidFill>
+                <a:srgbClr val="ffffff"/>
+              </a:solidFill>
               <a:latin typeface="Arial"/>
             </a:endParaRPr>
           </a:p>
@@ -2026,7 +2085,7 @@
         <p:txBody>
           <a:bodyPr/>
           <a:p>
-            <a:fld id="{B6159480-B313-4069-A1EB-618B4F573B8A}" type="slidenum">
+            <a:fld id="{EE4A6721-C2DF-46F8-AD63-A5624365EF86}" type="slidenum">
               <a:t>&lt;#&gt;</a:t>
             </a:fld>
           </a:p>
@@ -2141,6 +2200,9 @@
           </a:bodyPr>
           <a:p>
             <a:endParaRPr b="0" lang="en-US" sz="3200" spc="-1" strike="noStrike">
+              <a:solidFill>
+                <a:srgbClr val="ffffff"/>
+              </a:solidFill>
               <a:latin typeface="Arial"/>
             </a:endParaRPr>
           </a:p>
@@ -2175,6 +2237,9 @@
           </a:bodyPr>
           <a:p>
             <a:endParaRPr b="0" lang="en-US" sz="3200" spc="-1" strike="noStrike">
+              <a:solidFill>
+                <a:srgbClr val="ffffff"/>
+              </a:solidFill>
               <a:latin typeface="Arial"/>
             </a:endParaRPr>
           </a:p>
@@ -2209,6 +2274,9 @@
           </a:bodyPr>
           <a:p>
             <a:endParaRPr b="0" lang="en-US" sz="3200" spc="-1" strike="noStrike">
+              <a:solidFill>
+                <a:srgbClr val="ffffff"/>
+              </a:solidFill>
               <a:latin typeface="Arial"/>
             </a:endParaRPr>
           </a:p>
@@ -2248,7 +2316,7 @@
         <p:txBody>
           <a:bodyPr/>
           <a:p>
-            <a:fld id="{D7047EC8-43BB-4942-8C52-5613E22C4DFA}" type="slidenum">
+            <a:fld id="{6055937B-F078-4BF4-A9DB-FF66B9BB7FD0}" type="slidenum">
               <a:t>&lt;#&gt;</a:t>
             </a:fld>
           </a:p>
@@ -2306,7 +2374,7 @@
         <p:spPr>
           <a:xfrm>
             <a:off x="0" y="0"/>
-            <a:ext cx="10078560" cy="5668560"/>
+            <a:ext cx="10078200" cy="5668200"/>
           </a:xfrm>
           <a:prstGeom prst="rect">
             <a:avLst/>
@@ -2342,7 +2410,7 @@
         <p:spPr>
           <a:xfrm>
             <a:off x="1440000" y="1080000"/>
-            <a:ext cx="1438560" cy="1258560"/>
+            <a:ext cx="1438200" cy="1258200"/>
           </a:xfrm>
           <a:prstGeom prst="ellipse">
             <a:avLst/>
@@ -2372,7 +2440,7 @@
         <p:spPr>
           <a:xfrm>
             <a:off x="7380000" y="3960000"/>
-            <a:ext cx="1438560" cy="1258560"/>
+            <a:ext cx="1438200" cy="1258200"/>
           </a:xfrm>
           <a:prstGeom prst="ellipse">
             <a:avLst/>
@@ -2402,7 +2470,7 @@
         <p:spPr>
           <a:xfrm>
             <a:off x="9000000" y="2700000"/>
-            <a:ext cx="1258560" cy="1078560"/>
+            <a:ext cx="1258200" cy="1078200"/>
           </a:xfrm>
           <a:prstGeom prst="ellipse">
             <a:avLst/>
@@ -2432,7 +2500,7 @@
         <p:spPr>
           <a:xfrm>
             <a:off x="-180000" y="2430000"/>
-            <a:ext cx="1438560" cy="1348560"/>
+            <a:ext cx="1438200" cy="1348200"/>
           </a:xfrm>
           <a:prstGeom prst="ellipse">
             <a:avLst/>
@@ -2462,7 +2530,7 @@
         <p:spPr>
           <a:xfrm>
             <a:off x="540000" y="1080000"/>
-            <a:ext cx="718560" cy="718560"/>
+            <a:ext cx="718200" cy="718200"/>
           </a:xfrm>
           <a:prstGeom prst="ellipse">
             <a:avLst/>
@@ -2492,7 +2560,7 @@
         <p:spPr>
           <a:xfrm>
             <a:off x="0" y="1260000"/>
-            <a:ext cx="718560" cy="718560"/>
+            <a:ext cx="718200" cy="718200"/>
           </a:xfrm>
           <a:prstGeom prst="ellipse">
             <a:avLst/>
@@ -2522,7 +2590,7 @@
         <p:spPr>
           <a:xfrm>
             <a:off x="0" y="5220000"/>
-            <a:ext cx="1618560" cy="1258560"/>
+            <a:ext cx="1618200" cy="1258200"/>
           </a:xfrm>
           <a:prstGeom prst="ellipse">
             <a:avLst/>
@@ -2552,7 +2620,7 @@
         <p:spPr>
           <a:xfrm>
             <a:off x="9720000" y="4680000"/>
-            <a:ext cx="718560" cy="718560"/>
+            <a:ext cx="718200" cy="718200"/>
           </a:xfrm>
           <a:prstGeom prst="ellipse">
             <a:avLst/>
@@ -2582,7 +2650,7 @@
         <p:spPr>
           <a:xfrm>
             <a:off x="9540000" y="3420000"/>
-            <a:ext cx="718560" cy="718560"/>
+            <a:ext cx="718200" cy="718200"/>
           </a:xfrm>
           <a:prstGeom prst="ellipse">
             <a:avLst/>
@@ -2612,7 +2680,7 @@
         <p:spPr>
           <a:xfrm>
             <a:off x="8100000" y="4680000"/>
-            <a:ext cx="1078560" cy="840960"/>
+            <a:ext cx="1078200" cy="840600"/>
           </a:xfrm>
           <a:prstGeom prst="ellipse">
             <a:avLst/>
@@ -2642,7 +2710,7 @@
         <p:spPr>
           <a:xfrm>
             <a:off x="7920000" y="5400000"/>
-            <a:ext cx="898560" cy="898560"/>
+            <a:ext cx="898200" cy="898200"/>
           </a:xfrm>
           <a:prstGeom prst="ellipse">
             <a:avLst/>
@@ -2676,7 +2744,7 @@
         <p:spPr>
           <a:xfrm>
             <a:off x="3420000" y="5130000"/>
-            <a:ext cx="3238560" cy="390960"/>
+            <a:ext cx="3238200" cy="390600"/>
           </a:xfrm>
           <a:prstGeom prst="rect">
             <a:avLst/>
@@ -2739,7 +2807,7 @@
         <p:spPr>
           <a:xfrm>
             <a:off x="7560000" y="5130000"/>
-            <a:ext cx="2338560" cy="390960"/>
+            <a:ext cx="2338200" cy="390600"/>
           </a:xfrm>
           <a:prstGeom prst="rect">
             <a:avLst/>
@@ -2774,7 +2842,7 @@
               </a:lnSpc>
               <a:buNone/>
             </a:pPr>
-            <a:fld id="{DAB52581-1BD9-49F4-9462-7DB3E0B937D3}" type="slidenum">
+            <a:fld id="{B72329F8-E8A3-4DC5-89C6-2C47ECF7F69B}" type="slidenum">
               <a:rPr b="0" lang="en-US" sz="1400" spc="-1" strike="noStrike">
                 <a:solidFill>
                   <a:srgbClr val="ffffff"/>
@@ -2802,7 +2870,7 @@
         <p:spPr>
           <a:xfrm>
             <a:off x="180000" y="5130000"/>
-            <a:ext cx="2338560" cy="390960"/>
+            <a:ext cx="2338200" cy="390600"/>
           </a:xfrm>
           <a:prstGeom prst="rect">
             <a:avLst/>
@@ -2907,56 +2975,66 @@
             <a:normAutofit/>
           </a:bodyPr>
           <a:p>
-            <a:pPr marL="432000" indent="-324000">
+            <a:pPr marL="216000" indent="-216000">
               <a:spcBef>
-                <a:spcPts val="1417"/>
+                <a:spcPts val="1414"/>
+              </a:spcBef>
+              <a:buSzPct val="100000"/>
+              <a:buBlip>
+                <a:blip r:embed="rId2"/>
+              </a:buBlip>
+            </a:pPr>
+            <a:r>
+              <a:rPr b="0" lang="en-US" sz="3200" spc="-1" strike="noStrike">
+                <a:solidFill>
+                  <a:srgbClr val="ffffff"/>
+                </a:solidFill>
+                <a:latin typeface="Arial"/>
+              </a:rPr>
+              <a:t>Click to edit the outline text format</a:t>
+            </a:r>
+            <a:endParaRPr b="0" lang="en-US" sz="3200" spc="-1" strike="noStrike">
+              <a:solidFill>
+                <a:srgbClr val="ffffff"/>
+              </a:solidFill>
+              <a:latin typeface="Arial"/>
+            </a:endParaRPr>
+          </a:p>
+          <a:p>
+            <a:pPr lvl="1" marL="432000" indent="-216000">
+              <a:spcBef>
+                <a:spcPts val="1134"/>
               </a:spcBef>
               <a:buClr>
-                <a:srgbClr val="000000"/>
+                <a:srgbClr val="ffffff"/>
               </a:buClr>
               <a:buSzPct val="45000"/>
               <a:buFont typeface="Wingdings" charset="2"/>
               <a:buChar char=""/>
             </a:pPr>
             <a:r>
-              <a:rPr b="0" lang="en-US" sz="3200" spc="-1" strike="noStrike">
-                <a:latin typeface="Arial"/>
-              </a:rPr>
-              <a:t>Click to edit the outline text format</a:t>
-            </a:r>
-            <a:endParaRPr b="0" lang="en-US" sz="3200" spc="-1" strike="noStrike">
-              <a:latin typeface="Arial"/>
-            </a:endParaRPr>
-          </a:p>
-          <a:p>
-            <a:pPr lvl="1" marL="864000" indent="-324000">
-              <a:spcBef>
-                <a:spcPts val="1134"/>
-              </a:spcBef>
-              <a:buClr>
-                <a:srgbClr val="000000"/>
-              </a:buClr>
-              <a:buSzPct val="75000"/>
-              <a:buFont typeface="Symbol" charset="2"/>
-              <a:buChar char=""/>
-            </a:pPr>
-            <a:r>
               <a:rPr b="0" lang="en-US" sz="2800" spc="-1" strike="noStrike">
+                <a:solidFill>
+                  <a:srgbClr val="ffffff"/>
+                </a:solidFill>
                 <a:latin typeface="Arial"/>
               </a:rPr>
               <a:t>Second Outline Level</a:t>
             </a:r>
             <a:endParaRPr b="0" lang="en-US" sz="2800" spc="-1" strike="noStrike">
-              <a:latin typeface="Arial"/>
-            </a:endParaRPr>
-          </a:p>
-          <a:p>
-            <a:pPr lvl="2" marL="1296000" indent="-288000">
+              <a:solidFill>
+                <a:srgbClr val="ffffff"/>
+              </a:solidFill>
+              <a:latin typeface="Arial"/>
+            </a:endParaRPr>
+          </a:p>
+          <a:p>
+            <a:pPr lvl="2" marL="648000" indent="-216000">
               <a:spcBef>
                 <a:spcPts val="850"/>
               </a:spcBef>
               <a:buClr>
-                <a:srgbClr val="000000"/>
+                <a:srgbClr val="ffffff"/>
               </a:buClr>
               <a:buSzPct val="45000"/>
               <a:buFont typeface="Wingdings" charset="2"/>
@@ -2964,43 +3042,55 @@
             </a:pPr>
             <a:r>
               <a:rPr b="0" lang="en-US" sz="2400" spc="-1" strike="noStrike">
+                <a:solidFill>
+                  <a:srgbClr val="ffffff"/>
+                </a:solidFill>
                 <a:latin typeface="Arial"/>
               </a:rPr>
               <a:t>Third Outline Level</a:t>
             </a:r>
             <a:endParaRPr b="0" lang="en-US" sz="2400" spc="-1" strike="noStrike">
-              <a:latin typeface="Arial"/>
-            </a:endParaRPr>
-          </a:p>
-          <a:p>
-            <a:pPr lvl="3" marL="1728000" indent="-216000">
+              <a:solidFill>
+                <a:srgbClr val="ffffff"/>
+              </a:solidFill>
+              <a:latin typeface="Arial"/>
+            </a:endParaRPr>
+          </a:p>
+          <a:p>
+            <a:pPr lvl="3" marL="864000" indent="-216000">
               <a:spcBef>
                 <a:spcPts val="567"/>
               </a:spcBef>
               <a:buClr>
-                <a:srgbClr val="000000"/>
+                <a:srgbClr val="ffffff"/>
               </a:buClr>
-              <a:buSzPct val="75000"/>
-              <a:buFont typeface="Symbol" charset="2"/>
-              <a:buChar char=""/>
+              <a:buSzPct val="45000"/>
+              <a:buFont typeface="Wingdings" charset="2"/>
+              <a:buChar char=""/>
             </a:pPr>
             <a:r>
               <a:rPr b="0" lang="en-US" sz="2000" spc="-1" strike="noStrike">
+                <a:solidFill>
+                  <a:srgbClr val="ffffff"/>
+                </a:solidFill>
                 <a:latin typeface="Arial"/>
               </a:rPr>
               <a:t>Fourth Outline Level</a:t>
             </a:r>
             <a:endParaRPr b="0" lang="en-US" sz="2000" spc="-1" strike="noStrike">
-              <a:latin typeface="Arial"/>
-            </a:endParaRPr>
-          </a:p>
-          <a:p>
-            <a:pPr lvl="4" marL="2160000" indent="-216000">
+              <a:solidFill>
+                <a:srgbClr val="ffffff"/>
+              </a:solidFill>
+              <a:latin typeface="Arial"/>
+            </a:endParaRPr>
+          </a:p>
+          <a:p>
+            <a:pPr lvl="4" marL="1080000" indent="-216000">
               <a:spcBef>
                 <a:spcPts val="283"/>
               </a:spcBef>
               <a:buClr>
-                <a:srgbClr val="000000"/>
+                <a:srgbClr val="ffffff"/>
               </a:buClr>
               <a:buSzPct val="45000"/>
               <a:buFont typeface="Wingdings" charset="2"/>
@@ -3008,21 +3098,27 @@
             </a:pPr>
             <a:r>
               <a:rPr b="0" lang="en-US" sz="2000" spc="-1" strike="noStrike">
+                <a:solidFill>
+                  <a:srgbClr val="ffffff"/>
+                </a:solidFill>
                 <a:latin typeface="Arial"/>
               </a:rPr>
               <a:t>Fifth Outline Level</a:t>
             </a:r>
             <a:endParaRPr b="0" lang="en-US" sz="2000" spc="-1" strike="noStrike">
-              <a:latin typeface="Arial"/>
-            </a:endParaRPr>
-          </a:p>
-          <a:p>
-            <a:pPr lvl="5" marL="2592000" indent="-216000">
+              <a:solidFill>
+                <a:srgbClr val="ffffff"/>
+              </a:solidFill>
+              <a:latin typeface="Arial"/>
+            </a:endParaRPr>
+          </a:p>
+          <a:p>
+            <a:pPr lvl="5" marL="1296000" indent="-216000">
               <a:spcBef>
                 <a:spcPts val="283"/>
               </a:spcBef>
               <a:buClr>
-                <a:srgbClr val="000000"/>
+                <a:srgbClr val="ffffff"/>
               </a:buClr>
               <a:buSzPct val="45000"/>
               <a:buFont typeface="Wingdings" charset="2"/>
@@ -3030,21 +3126,27 @@
             </a:pPr>
             <a:r>
               <a:rPr b="0" lang="en-US" sz="2000" spc="-1" strike="noStrike">
+                <a:solidFill>
+                  <a:srgbClr val="ffffff"/>
+                </a:solidFill>
                 <a:latin typeface="Arial"/>
               </a:rPr>
               <a:t>Sixth Outline Level</a:t>
             </a:r>
             <a:endParaRPr b="0" lang="en-US" sz="2000" spc="-1" strike="noStrike">
-              <a:latin typeface="Arial"/>
-            </a:endParaRPr>
-          </a:p>
-          <a:p>
-            <a:pPr lvl="6" marL="3024000" indent="-216000">
+              <a:solidFill>
+                <a:srgbClr val="ffffff"/>
+              </a:solidFill>
+              <a:latin typeface="Arial"/>
+            </a:endParaRPr>
+          </a:p>
+          <a:p>
+            <a:pPr lvl="6" marL="1512000" indent="-216000">
               <a:spcBef>
                 <a:spcPts val="283"/>
               </a:spcBef>
               <a:buClr>
-                <a:srgbClr val="000000"/>
+                <a:srgbClr val="ffffff"/>
               </a:buClr>
               <a:buSzPct val="45000"/>
               <a:buFont typeface="Wingdings" charset="2"/>
@@ -3052,11 +3154,17 @@
             </a:pPr>
             <a:r>
               <a:rPr b="0" lang="en-US" sz="2000" spc="-1" strike="noStrike">
+                <a:solidFill>
+                  <a:srgbClr val="ffffff"/>
+                </a:solidFill>
                 <a:latin typeface="Arial"/>
               </a:rPr>
               <a:t>Seventh Outline Level</a:t>
             </a:r>
             <a:endParaRPr b="0" lang="en-US" sz="2000" spc="-1" strike="noStrike">
+              <a:solidFill>
+                <a:srgbClr val="ffffff"/>
+              </a:solidFill>
               <a:latin typeface="Arial"/>
             </a:endParaRPr>
           </a:p>
@@ -3066,18 +3174,18 @@
   </p:cSld>
   <p:clrMap bg1="lt1" bg2="lt2" tx1="dk1" tx2="dk2" accent1="accent1" accent2="accent2" accent3="accent3" accent4="accent4" accent5="accent5" accent6="accent6" hlink="hlink" folHlink="folHlink"/>
   <p:sldLayoutIdLst>
-    <p:sldLayoutId id="2147483649" r:id="rId2"/>
-    <p:sldLayoutId id="2147483650" r:id="rId3"/>
-    <p:sldLayoutId id="2147483651" r:id="rId4"/>
-    <p:sldLayoutId id="2147483652" r:id="rId5"/>
-    <p:sldLayoutId id="2147483653" r:id="rId6"/>
-    <p:sldLayoutId id="2147483654" r:id="rId7"/>
-    <p:sldLayoutId id="2147483655" r:id="rId8"/>
-    <p:sldLayoutId id="2147483656" r:id="rId9"/>
-    <p:sldLayoutId id="2147483657" r:id="rId10"/>
-    <p:sldLayoutId id="2147483658" r:id="rId11"/>
-    <p:sldLayoutId id="2147483659" r:id="rId12"/>
-    <p:sldLayoutId id="2147483660" r:id="rId13"/>
+    <p:sldLayoutId id="2147483649" r:id="rId3"/>
+    <p:sldLayoutId id="2147483650" r:id="rId4"/>
+    <p:sldLayoutId id="2147483651" r:id="rId5"/>
+    <p:sldLayoutId id="2147483652" r:id="rId6"/>
+    <p:sldLayoutId id="2147483653" r:id="rId7"/>
+    <p:sldLayoutId id="2147483654" r:id="rId8"/>
+    <p:sldLayoutId id="2147483655" r:id="rId9"/>
+    <p:sldLayoutId id="2147483656" r:id="rId10"/>
+    <p:sldLayoutId id="2147483657" r:id="rId11"/>
+    <p:sldLayoutId id="2147483658" r:id="rId12"/>
+    <p:sldLayoutId id="2147483659" r:id="rId13"/>
+    <p:sldLayoutId id="2147483660" r:id="rId14"/>
   </p:sldLayoutIdLst>
 </p:sldMaster>
 </file>
@@ -3111,8 +3219,8 @@
         </p:nvSpPr>
         <p:spPr>
           <a:xfrm>
-            <a:off x="504000" y="1428840"/>
-            <a:ext cx="9070200" cy="945360"/>
+            <a:off x="3429000" y="685800"/>
+            <a:ext cx="3839400" cy="945000"/>
           </a:xfrm>
           <a:prstGeom prst="rect">
             <a:avLst/>
@@ -3140,7 +3248,7 @@
                 </a:solidFill>
                 <a:latin typeface="Arial"/>
               </a:rPr>
-              <a:t>Contact Manager</a:t>
+              <a:t>Contacts Connect</a:t>
             </a:r>
             <a:endParaRPr b="0" lang="en-US" sz="3300" spc="-1" strike="noStrike">
               <a:latin typeface="Arial"/>
@@ -3148,43 +3256,29 @@
           </a:p>
         </p:txBody>
       </p:sp>
-      <p:sp>
-        <p:nvSpPr>
-          <p:cNvPr id="54" name="PlaceHolder 2"/>
-          <p:cNvSpPr>
-            <a:spLocks noGrp="1"/>
-          </p:cNvSpPr>
-          <p:nvPr>
-            <p:ph type="subTitle"/>
-          </p:nvPr>
-        </p:nvSpPr>
-        <p:spPr>
-          <a:xfrm>
-            <a:off x="504000" y="2592000"/>
-            <a:ext cx="9070200" cy="2021400"/>
-          </a:xfrm>
-          <a:prstGeom prst="rect">
-            <a:avLst/>
-          </a:prstGeom>
-          <a:noFill/>
-          <a:ln w="0">
-            <a:noFill/>
-          </a:ln>
-        </p:spPr>
-        <p:txBody>
-          <a:bodyPr lIns="0" rIns="0" tIns="0" bIns="0" anchor="ctr">
-            <a:noAutofit/>
-          </a:bodyPr>
-          <a:p>
-            <a:pPr algn="ctr">
-              <a:buNone/>
-            </a:pPr>
-            <a:endParaRPr b="0" lang="en-US" sz="3200" spc="-1" strike="noStrike">
-              <a:latin typeface="Arial"/>
-            </a:endParaRPr>
-          </a:p>
-        </p:txBody>
-      </p:sp>
+      <p:pic>
+        <p:nvPicPr>
+          <p:cNvPr id="54" name="" descr=""/>
+          <p:cNvPicPr/>
+          <p:nvPr/>
+        </p:nvPicPr>
+        <p:blipFill>
+          <a:blip r:embed="rId1"/>
+          <a:stretch/>
+        </p:blipFill>
+        <p:spPr>
+          <a:xfrm>
+            <a:off x="3886200" y="2057400"/>
+            <a:ext cx="2264760" cy="2264760"/>
+          </a:xfrm>
+          <a:prstGeom prst="rect">
+            <a:avLst/>
+          </a:prstGeom>
+          <a:ln w="0">
+            <a:noFill/>
+          </a:ln>
+        </p:spPr>
+      </p:pic>
     </p:spTree>
   </p:cSld>
   <mc:AlternateContent>
@@ -3217,7 +3311,7 @@
       </p:grpSpPr>
       <p:sp>
         <p:nvSpPr>
-          <p:cNvPr id="76" name="PlaceHolder 1"/>
+          <p:cNvPr id="80" name="PlaceHolder 1"/>
           <p:cNvSpPr>
             <a:spLocks noGrp="1"/>
           </p:cNvSpPr>
@@ -3227,8 +3321,8 @@
         </p:nvSpPr>
         <p:spPr>
           <a:xfrm>
-            <a:off x="540000" y="139680"/>
-            <a:ext cx="8998560" cy="1249200"/>
+            <a:off x="504000" y="-228600"/>
+            <a:ext cx="9069840" cy="1142280"/>
           </a:xfrm>
           <a:prstGeom prst="rect">
             <a:avLst/>
@@ -3256,7 +3350,34 @@
                 </a:solidFill>
                 <a:latin typeface="Arial"/>
               </a:rPr>
-              <a:t>Talk about what went well </a:t>
+              <a:t>Use </a:t>
+            </a:r>
+            <a:r>
+              <a:rPr b="0" lang="en-US" sz="4400" spc="-1" strike="noStrike">
+                <a:solidFill>
+                  <a:srgbClr val="ffffff"/>
+                </a:solidFill>
+                <a:latin typeface="Arial"/>
+              </a:rPr>
+              <a:t>Case </a:t>
+            </a:r>
+            <a:r>
+              <a:rPr b="0" lang="en-US" sz="4400" spc="-1" strike="noStrike">
+                <a:solidFill>
+                  <a:srgbClr val="ffffff"/>
+                </a:solidFill>
+                <a:latin typeface="Arial"/>
+              </a:rPr>
+              <a:t>Diagr</a:t>
+            </a:r>
+            <a:r>
+              <a:rPr b="0" lang="en-US" sz="4400" spc="-1" strike="noStrike">
+                <a:solidFill>
+                  <a:srgbClr val="ffffff"/>
+                </a:solidFill>
+                <a:latin typeface="Arial"/>
+              </a:rPr>
+              <a:t>am</a:t>
             </a:r>
             <a:endParaRPr b="0" lang="en-US" sz="4400" spc="-1" strike="noStrike">
               <a:latin typeface="Arial"/>
@@ -3264,83 +3385,29 @@
           </a:p>
         </p:txBody>
       </p:sp>
-      <p:sp>
-        <p:nvSpPr>
-          <p:cNvPr id="77" name="PlaceHolder 2"/>
-          <p:cNvSpPr>
-            <a:spLocks noGrp="1"/>
-          </p:cNvSpPr>
-          <p:nvPr>
-            <p:ph/>
-          </p:nvPr>
-        </p:nvSpPr>
-        <p:spPr>
-          <a:xfrm>
-            <a:off x="504000" y="1326600"/>
-            <a:ext cx="9070920" cy="3287520"/>
-          </a:xfrm>
-          <a:prstGeom prst="rect">
-            <a:avLst/>
-          </a:prstGeom>
-          <a:noFill/>
-          <a:ln w="0">
-            <a:noFill/>
-          </a:ln>
-        </p:spPr>
-        <p:txBody>
-          <a:bodyPr lIns="0" rIns="0" tIns="0" bIns="0" anchor="t">
-            <a:normAutofit/>
-          </a:bodyPr>
-          <a:p>
-            <a:pPr marL="432000" indent="-324000">
-              <a:lnSpc>
-                <a:spcPct val="100000"/>
-              </a:lnSpc>
-              <a:buClr>
-                <a:srgbClr val="000000"/>
-              </a:buClr>
-              <a:buFont typeface="Wingdings" charset="2"/>
-              <a:buChar char=""/>
-            </a:pPr>
-            <a:r>
-              <a:rPr b="0" lang="en-US" sz="1800" spc="-1" strike="noStrike">
-                <a:solidFill>
-                  <a:srgbClr val="ffffff"/>
-                </a:solidFill>
-                <a:latin typeface="Arial"/>
-              </a:rPr>
-              <a:t>Database</a:t>
-            </a:r>
-            <a:endParaRPr b="0" lang="en-US" sz="1800" spc="-1" strike="noStrike">
-              <a:latin typeface="Arial"/>
-            </a:endParaRPr>
-          </a:p>
-          <a:p>
-            <a:pPr marL="432000" indent="-324000">
-              <a:lnSpc>
-                <a:spcPct val="100000"/>
-              </a:lnSpc>
-              <a:buClr>
-                <a:srgbClr val="000000"/>
-              </a:buClr>
-              <a:buFont typeface="Wingdings" charset="2"/>
-              <a:buChar char=""/>
-            </a:pPr>
-            <a:r>
-              <a:rPr b="0" lang="en-US" sz="1800" spc="-1" strike="noStrike">
-                <a:solidFill>
-                  <a:srgbClr val="ffffff"/>
-                </a:solidFill>
-                <a:latin typeface="Arial"/>
-              </a:rPr>
-              <a:t>API</a:t>
-            </a:r>
-            <a:endParaRPr b="0" lang="en-US" sz="1800" spc="-1" strike="noStrike">
-              <a:latin typeface="Arial"/>
-            </a:endParaRPr>
-          </a:p>
-        </p:txBody>
-      </p:sp>
+      <p:pic>
+        <p:nvPicPr>
+          <p:cNvPr id="81" name="" descr=""/>
+          <p:cNvPicPr/>
+          <p:nvPr/>
+        </p:nvPicPr>
+        <p:blipFill>
+          <a:blip r:embed="rId1"/>
+          <a:stretch/>
+        </p:blipFill>
+        <p:spPr>
+          <a:xfrm>
+            <a:off x="777600" y="680400"/>
+            <a:ext cx="8822880" cy="4962600"/>
+          </a:xfrm>
+          <a:prstGeom prst="rect">
+            <a:avLst/>
+          </a:prstGeom>
+          <a:ln w="0">
+            <a:noFill/>
+          </a:ln>
+        </p:spPr>
+      </p:pic>
     </p:spTree>
   </p:cSld>
   <mc:AlternateContent>
@@ -3373,7 +3440,7 @@
       </p:grpSpPr>
       <p:sp>
         <p:nvSpPr>
-          <p:cNvPr id="78" name="PlaceHolder 1"/>
+          <p:cNvPr id="82" name="PlaceHolder 1"/>
           <p:cNvSpPr>
             <a:spLocks noGrp="1"/>
           </p:cNvSpPr>
@@ -3384,7 +3451,7 @@
         <p:spPr>
           <a:xfrm>
             <a:off x="540000" y="139680"/>
-            <a:ext cx="8998560" cy="1249200"/>
+            <a:ext cx="8998200" cy="1248840"/>
           </a:xfrm>
           <a:prstGeom prst="rect">
             <a:avLst/>
@@ -3412,7 +3479,7 @@
                 </a:solidFill>
                 <a:latin typeface="Arial"/>
               </a:rPr>
-              <a:t>API demonstration</a:t>
+              <a:t>Talk about what did not go well</a:t>
             </a:r>
             <a:endParaRPr b="0" lang="en-US" sz="4400" spc="-1" strike="noStrike">
               <a:latin typeface="Arial"/>
@@ -3422,7 +3489,7 @@
       </p:sp>
       <p:sp>
         <p:nvSpPr>
-          <p:cNvPr id="79" name="PlaceHolder 2"/>
+          <p:cNvPr id="83" name="PlaceHolder 2"/>
           <p:cNvSpPr>
             <a:spLocks noGrp="1"/>
           </p:cNvSpPr>
@@ -3433,7 +3500,7 @@
         <p:spPr>
           <a:xfrm>
             <a:off x="504000" y="1326600"/>
-            <a:ext cx="9070920" cy="3287520"/>
+            <a:ext cx="9070560" cy="3287160"/>
           </a:xfrm>
           <a:prstGeom prst="rect">
             <a:avLst/>
@@ -3448,7 +3515,124 @@
             <a:normAutofit/>
           </a:bodyPr>
           <a:p>
-            <a:endParaRPr b="0" lang="en-US" sz="3200" spc="-1" strike="noStrike">
+            <a:pPr marL="432000" indent="-324000">
+              <a:lnSpc>
+                <a:spcPct val="100000"/>
+              </a:lnSpc>
+              <a:buClr>
+                <a:srgbClr val="000000"/>
+              </a:buClr>
+              <a:buFont typeface="Wingdings" charset="2"/>
+              <a:buChar char=""/>
+            </a:pPr>
+            <a:r>
+              <a:rPr b="0" lang="en-US" sz="1800" spc="-1" strike="noStrike">
+                <a:solidFill>
+                  <a:srgbClr val="ffffff"/>
+                </a:solidFill>
+                <a:latin typeface="Arial"/>
+              </a:rPr>
+              <a:t>Adoption of new languages (PHP, CSS &amp; JS)</a:t>
+            </a:r>
+            <a:endParaRPr b="0" lang="en-US" sz="1800" spc="-1" strike="noStrike">
+              <a:solidFill>
+                <a:srgbClr val="ffffff"/>
+              </a:solidFill>
+              <a:latin typeface="Arial"/>
+            </a:endParaRPr>
+          </a:p>
+          <a:p>
+            <a:pPr marL="432000" indent="-324000">
+              <a:lnSpc>
+                <a:spcPct val="100000"/>
+              </a:lnSpc>
+              <a:buClr>
+                <a:srgbClr val="000000"/>
+              </a:buClr>
+              <a:buFont typeface="Wingdings" charset="2"/>
+              <a:buChar char=""/>
+            </a:pPr>
+            <a:r>
+              <a:rPr b="0" lang="en-US" sz="1800" spc="-1" strike="noStrike">
+                <a:solidFill>
+                  <a:srgbClr val="ffffff"/>
+                </a:solidFill>
+                <a:latin typeface="Arial"/>
+              </a:rPr>
+              <a:t>Working in a real team with task-dependencies</a:t>
+            </a:r>
+            <a:endParaRPr b="0" lang="en-US" sz="1800" spc="-1" strike="noStrike">
+              <a:solidFill>
+                <a:srgbClr val="ffffff"/>
+              </a:solidFill>
+              <a:latin typeface="Arial"/>
+            </a:endParaRPr>
+          </a:p>
+          <a:p>
+            <a:pPr marL="432000" indent="-324000">
+              <a:lnSpc>
+                <a:spcPct val="100000"/>
+              </a:lnSpc>
+              <a:buClr>
+                <a:srgbClr val="000000"/>
+              </a:buClr>
+              <a:buFont typeface="Wingdings" charset="2"/>
+              <a:buChar char=""/>
+            </a:pPr>
+            <a:r>
+              <a:rPr b="0" lang="en-US" sz="1800" spc="-1" strike="noStrike">
+                <a:solidFill>
+                  <a:srgbClr val="ffffff"/>
+                </a:solidFill>
+                <a:latin typeface="Arial"/>
+              </a:rPr>
+              <a:t>Scheduling and workflow (late start, slow-start)</a:t>
+            </a:r>
+            <a:endParaRPr b="0" lang="en-US" sz="1800" spc="-1" strike="noStrike">
+              <a:solidFill>
+                <a:srgbClr val="ffffff"/>
+              </a:solidFill>
+              <a:latin typeface="Arial"/>
+            </a:endParaRPr>
+          </a:p>
+          <a:p>
+            <a:pPr marL="432000" indent="-324000">
+              <a:lnSpc>
+                <a:spcPct val="100000"/>
+              </a:lnSpc>
+              <a:buClr>
+                <a:srgbClr val="000000"/>
+              </a:buClr>
+              <a:buFont typeface="Wingdings" charset="2"/>
+              <a:buChar char=""/>
+            </a:pPr>
+            <a:r>
+              <a:rPr b="0" lang="en-US" sz="1800" spc="-1" strike="noStrike">
+                <a:solidFill>
+                  <a:srgbClr val="ffffff"/>
+                </a:solidFill>
+                <a:latin typeface="Arial"/>
+              </a:rPr>
+              <a:t> </a:t>
+            </a:r>
+            <a:endParaRPr b="0" lang="en-US" sz="1800" spc="-1" strike="noStrike">
+              <a:solidFill>
+                <a:srgbClr val="ffffff"/>
+              </a:solidFill>
+              <a:latin typeface="Arial"/>
+            </a:endParaRPr>
+          </a:p>
+          <a:p>
+            <a:pPr>
+              <a:lnSpc>
+                <a:spcPct val="100000"/>
+              </a:lnSpc>
+              <a:buNone/>
+            </a:pPr>
+            <a:endParaRPr b="0" lang="en-US" sz="1800" spc="-1" strike="noStrike">
+              <a:solidFill>
+                <a:srgbClr val="ffffff"/>
+              </a:solidFill>
               <a:latin typeface="Arial"/>
             </a:endParaRPr>
           </a:p>
@@ -3486,7 +3670,7 @@
       </p:grpSpPr>
       <p:sp>
         <p:nvSpPr>
-          <p:cNvPr id="80" name="PlaceHolder 1"/>
+          <p:cNvPr id="84" name="PlaceHolder 1"/>
           <p:cNvSpPr>
             <a:spLocks noGrp="1"/>
           </p:cNvSpPr>
@@ -3497,7 +3681,7 @@
         <p:spPr>
           <a:xfrm>
             <a:off x="540000" y="139680"/>
-            <a:ext cx="8998560" cy="1249200"/>
+            <a:ext cx="8998200" cy="1248840"/>
           </a:xfrm>
           <a:prstGeom prst="rect">
             <a:avLst/>
@@ -3525,7 +3709,7 @@
                 </a:solidFill>
                 <a:latin typeface="Arial"/>
               </a:rPr>
-              <a:t>App Demonstration</a:t>
+              <a:t>Talk about what went well </a:t>
             </a:r>
             <a:endParaRPr b="0" lang="en-US" sz="4400" spc="-1" strike="noStrike">
               <a:latin typeface="Arial"/>
@@ -3535,7 +3719,7 @@
       </p:sp>
       <p:sp>
         <p:nvSpPr>
-          <p:cNvPr id="81" name="PlaceHolder 2"/>
+          <p:cNvPr id="85" name="PlaceHolder 2"/>
           <p:cNvSpPr>
             <a:spLocks noGrp="1"/>
           </p:cNvSpPr>
@@ -3546,7 +3730,7 @@
         <p:spPr>
           <a:xfrm>
             <a:off x="504000" y="1326600"/>
-            <a:ext cx="9070920" cy="3287520"/>
+            <a:ext cx="9070560" cy="3287160"/>
           </a:xfrm>
           <a:prstGeom prst="rect">
             <a:avLst/>
@@ -3561,7 +3745,56 @@
             <a:normAutofit/>
           </a:bodyPr>
           <a:p>
-            <a:endParaRPr b="0" lang="en-US" sz="3200" spc="-1" strike="noStrike">
+            <a:pPr marL="432000" indent="-324000">
+              <a:lnSpc>
+                <a:spcPct val="100000"/>
+              </a:lnSpc>
+              <a:buClr>
+                <a:srgbClr val="000000"/>
+              </a:buClr>
+              <a:buFont typeface="Wingdings" charset="2"/>
+              <a:buChar char=""/>
+            </a:pPr>
+            <a:r>
+              <a:rPr b="0" lang="en-US" sz="1800" spc="-1" strike="noStrike">
+                <a:solidFill>
+                  <a:srgbClr val="ffffff"/>
+                </a:solidFill>
+                <a:latin typeface="Arial"/>
+              </a:rPr>
+              <a:t>Communication was solid</a:t>
+            </a:r>
+            <a:endParaRPr b="0" lang="en-US" sz="1800" spc="-1" strike="noStrike">
+              <a:solidFill>
+                <a:srgbClr val="ffffff"/>
+              </a:solidFill>
+              <a:latin typeface="Arial"/>
+            </a:endParaRPr>
+          </a:p>
+          <a:p>
+            <a:pPr marL="432000" indent="-324000">
+              <a:lnSpc>
+                <a:spcPct val="100000"/>
+              </a:lnSpc>
+              <a:buClr>
+                <a:srgbClr val="000000"/>
+              </a:buClr>
+              <a:buFont typeface="Wingdings" charset="2"/>
+              <a:buChar char=""/>
+            </a:pPr>
+            <a:r>
+              <a:rPr b="0" lang="en-US" sz="1800" spc="-1" strike="noStrike">
+                <a:solidFill>
+                  <a:srgbClr val="ffffff"/>
+                </a:solidFill>
+                <a:latin typeface="Arial"/>
+              </a:rPr>
+              <a:t>No conflicts between teammates</a:t>
+            </a:r>
+            <a:endParaRPr b="0" lang="en-US" sz="1800" spc="-1" strike="noStrike">
+              <a:solidFill>
+                <a:srgbClr val="ffffff"/>
+              </a:solidFill>
               <a:latin typeface="Arial"/>
             </a:endParaRPr>
           </a:p>
@@ -3599,7 +3832,7 @@
       </p:grpSpPr>
       <p:sp>
         <p:nvSpPr>
-          <p:cNvPr id="82" name="PlaceHolder 1"/>
+          <p:cNvPr id="86" name="PlaceHolder 1"/>
           <p:cNvSpPr>
             <a:spLocks noGrp="1"/>
           </p:cNvSpPr>
@@ -3610,7 +3843,7 @@
         <p:spPr>
           <a:xfrm>
             <a:off x="540000" y="139680"/>
-            <a:ext cx="8998560" cy="1249200"/>
+            <a:ext cx="8998200" cy="1248840"/>
           </a:xfrm>
           <a:prstGeom prst="rect">
             <a:avLst/>
@@ -3638,7 +3871,7 @@
                 </a:solidFill>
                 <a:latin typeface="Arial"/>
               </a:rPr>
-              <a:t>Q&amp;A</a:t>
+              <a:t>API demonstration</a:t>
             </a:r>
             <a:endParaRPr b="0" lang="en-US" sz="4400" spc="-1" strike="noStrike">
               <a:latin typeface="Arial"/>
@@ -3648,7 +3881,7 @@
       </p:sp>
       <p:sp>
         <p:nvSpPr>
-          <p:cNvPr id="83" name="PlaceHolder 2"/>
+          <p:cNvPr id="87" name="PlaceHolder 2"/>
           <p:cNvSpPr>
             <a:spLocks noGrp="1"/>
           </p:cNvSpPr>
@@ -3659,7 +3892,7 @@
         <p:spPr>
           <a:xfrm>
             <a:off x="504000" y="1326600"/>
-            <a:ext cx="9070920" cy="3287520"/>
+            <a:ext cx="9070560" cy="3287160"/>
           </a:xfrm>
           <a:prstGeom prst="rect">
             <a:avLst/>
@@ -3674,7 +3907,334 @@
             <a:normAutofit/>
           </a:bodyPr>
           <a:p>
+            <a:pPr indent="-324000">
+              <a:lnSpc>
+                <a:spcPct val="100000"/>
+              </a:lnSpc>
+              <a:buClr>
+                <a:srgbClr val="ffffff"/>
+              </a:buClr>
+              <a:buFont typeface="Wingdings" charset="2"/>
+              <a:buChar char=""/>
+            </a:pPr>
+            <a:r>
+              <a:rPr b="0" lang="en-US" sz="1800" spc="-1" strike="noStrike">
+                <a:solidFill>
+                  <a:srgbClr val="ffffff"/>
+                </a:solidFill>
+                <a:latin typeface="Arial"/>
+              </a:rPr>
+              <a:t>[ADD SWAGGERHUB LINK]</a:t>
+            </a:r>
+            <a:endParaRPr b="0" lang="en-US" sz="1800" spc="-1" strike="noStrike">
+              <a:solidFill>
+                <a:srgbClr val="ffffff"/>
+              </a:solidFill>
+              <a:latin typeface="Arial"/>
+            </a:endParaRPr>
+          </a:p>
+        </p:txBody>
+      </p:sp>
+    </p:spTree>
+  </p:cSld>
+  <mc:AlternateContent>
+    <mc:Choice Requires="p14">
+      <p:transition spd="slow" p14:dur="2000"/>
+    </mc:Choice>
+    <mc:Fallback>
+      <p:transition spd="slow"/>
+    </mc:Fallback>
+  </mc:AlternateContent>
+</p:sld>
+</file>
+
+<file path=ppt/slides/slide14.xml><?xml version="1.0" encoding="utf-8"?>
+<p:sld xmlns:a="http://schemas.openxmlformats.org/drawingml/2006/main" xmlns:p="http://schemas.openxmlformats.org/presentationml/2006/main" xmlns:r="http://schemas.openxmlformats.org/officeDocument/2006/relationships" xmlns:p14="http://schemas.microsoft.com/office/powerpoint/2010/main" xmlns:p15="http://schemas.microsoft.com/office/powerpoint/2012/main" xmlns:mc="http://schemas.openxmlformats.org/markup-compatibility/2006">
+  <p:cSld>
+    <p:spTree>
+      <p:nvGrpSpPr>
+        <p:cNvPr id="1" name=""/>
+        <p:cNvGrpSpPr/>
+        <p:nvPr/>
+      </p:nvGrpSpPr>
+      <p:grpSpPr>
+        <a:xfrm>
+          <a:off x="0" y="0"/>
+          <a:ext cx="0" cy="0"/>
+          <a:chOff x="0" y="0"/>
+          <a:chExt cx="0" cy="0"/>
+        </a:xfrm>
+      </p:grpSpPr>
+      <p:sp>
+        <p:nvSpPr>
+          <p:cNvPr id="88" name="PlaceHolder 1"/>
+          <p:cNvSpPr>
+            <a:spLocks noGrp="1"/>
+          </p:cNvSpPr>
+          <p:nvPr>
+            <p:ph type="title"/>
+          </p:nvPr>
+        </p:nvSpPr>
+        <p:spPr>
+          <a:xfrm>
+            <a:off x="540000" y="139680"/>
+            <a:ext cx="8998200" cy="1248840"/>
+          </a:xfrm>
+          <a:prstGeom prst="rect">
+            <a:avLst/>
+          </a:prstGeom>
+          <a:noFill/>
+          <a:ln w="0">
+            <a:noFill/>
+          </a:ln>
+        </p:spPr>
+        <p:txBody>
+          <a:bodyPr lIns="0" rIns="0" tIns="0" bIns="0" anchor="ctr">
+            <a:noAutofit/>
+          </a:bodyPr>
+          <a:p>
+            <a:pPr algn="ctr">
+              <a:lnSpc>
+                <a:spcPct val="100000"/>
+              </a:lnSpc>
+              <a:buNone/>
+            </a:pPr>
+            <a:r>
+              <a:rPr b="0" lang="en-US" sz="4400" spc="-1" strike="noStrike">
+                <a:solidFill>
+                  <a:srgbClr val="ffffff"/>
+                </a:solidFill>
+                <a:latin typeface="Arial"/>
+              </a:rPr>
+              <a:t>App Demonstration</a:t>
+            </a:r>
+            <a:endParaRPr b="0" lang="en-US" sz="4400" spc="-1" strike="noStrike">
+              <a:latin typeface="Arial"/>
+            </a:endParaRPr>
+          </a:p>
+        </p:txBody>
+      </p:sp>
+      <p:sp>
+        <p:nvSpPr>
+          <p:cNvPr id="89" name="PlaceHolder 2"/>
+          <p:cNvSpPr>
+            <a:spLocks noGrp="1"/>
+          </p:cNvSpPr>
+          <p:nvPr>
+            <p:ph/>
+          </p:nvPr>
+        </p:nvSpPr>
+        <p:spPr>
+          <a:xfrm>
+            <a:off x="2514600" y="2514600"/>
+            <a:ext cx="5211000" cy="730800"/>
+          </a:xfrm>
+          <a:prstGeom prst="rect">
+            <a:avLst/>
+          </a:prstGeom>
+          <a:noFill/>
+          <a:ln w="0">
+            <a:noFill/>
+          </a:ln>
+        </p:spPr>
+        <p:txBody>
+          <a:bodyPr lIns="0" rIns="0" tIns="0" bIns="0" anchor="t">
+            <a:normAutofit/>
+          </a:bodyPr>
+          <a:p>
+            <a:pPr marL="216000" indent="-216000">
+              <a:spcBef>
+                <a:spcPts val="1414"/>
+              </a:spcBef>
+              <a:buSzPct val="100000"/>
+              <a:buBlip>
+                <a:blip r:embed="rId1"/>
+              </a:buBlip>
+            </a:pPr>
+            <a:r>
+              <a:rPr b="0" lang="en-US" sz="3200" spc="-1" strike="noStrike">
+                <a:solidFill>
+                  <a:srgbClr val="ffffff"/>
+                </a:solidFill>
+                <a:latin typeface="Arial"/>
+                <a:hlinkClick r:id="rId2"/>
+              </a:rPr>
+              <a:t>http://thisisforourclass.xyz/</a:t>
+            </a:r>
+            <a:r>
+              <a:rPr b="0" lang="en-US" sz="3200" spc="-1" strike="noStrike">
+                <a:solidFill>
+                  <a:srgbClr val="ffffff"/>
+                </a:solidFill>
+                <a:latin typeface="Arial"/>
+              </a:rPr>
+              <a:t> </a:t>
+            </a:r>
             <a:endParaRPr b="0" lang="en-US" sz="3200" spc="-1" strike="noStrike">
+              <a:solidFill>
+                <a:srgbClr val="ffffff"/>
+              </a:solidFill>
+              <a:latin typeface="Arial"/>
+            </a:endParaRPr>
+          </a:p>
+          <a:p>
+            <a:pPr marL="216000" indent="-216000">
+              <a:spcBef>
+                <a:spcPts val="1414"/>
+              </a:spcBef>
+              <a:buSzPct val="100000"/>
+              <a:buBlip>
+                <a:blip r:embed="rId3"/>
+              </a:buBlip>
+            </a:pPr>
+            <a:r>
+              <a:rPr b="0" lang="en-US" sz="3200" spc="-1" strike="noStrike">
+                <a:solidFill>
+                  <a:srgbClr val="ffffff"/>
+                </a:solidFill>
+                <a:latin typeface="Arial"/>
+              </a:rPr>
+              <a:t> </a:t>
+            </a:r>
+            <a:endParaRPr b="0" lang="en-US" sz="3200" spc="-1" strike="noStrike">
+              <a:solidFill>
+                <a:srgbClr val="ffffff"/>
+              </a:solidFill>
+              <a:latin typeface="Arial"/>
+            </a:endParaRPr>
+          </a:p>
+        </p:txBody>
+      </p:sp>
+    </p:spTree>
+  </p:cSld>
+  <mc:AlternateContent>
+    <mc:Choice Requires="p14">
+      <p:transition spd="slow" p14:dur="2000"/>
+    </mc:Choice>
+    <mc:Fallback>
+      <p:transition spd="slow"/>
+    </mc:Fallback>
+  </mc:AlternateContent>
+</p:sld>
+</file>
+
+<file path=ppt/slides/slide15.xml><?xml version="1.0" encoding="utf-8"?>
+<p:sld xmlns:a="http://schemas.openxmlformats.org/drawingml/2006/main" xmlns:p="http://schemas.openxmlformats.org/presentationml/2006/main" xmlns:r="http://schemas.openxmlformats.org/officeDocument/2006/relationships" xmlns:p14="http://schemas.microsoft.com/office/powerpoint/2010/main" xmlns:p15="http://schemas.microsoft.com/office/powerpoint/2012/main" xmlns:mc="http://schemas.openxmlformats.org/markup-compatibility/2006">
+  <p:cSld>
+    <p:spTree>
+      <p:nvGrpSpPr>
+        <p:cNvPr id="1" name=""/>
+        <p:cNvGrpSpPr/>
+        <p:nvPr/>
+      </p:nvGrpSpPr>
+      <p:grpSpPr>
+        <a:xfrm>
+          <a:off x="0" y="0"/>
+          <a:ext cx="0" cy="0"/>
+          <a:chOff x="0" y="0"/>
+          <a:chExt cx="0" cy="0"/>
+        </a:xfrm>
+      </p:grpSpPr>
+      <p:sp>
+        <p:nvSpPr>
+          <p:cNvPr id="90" name="PlaceHolder 1"/>
+          <p:cNvSpPr>
+            <a:spLocks noGrp="1"/>
+          </p:cNvSpPr>
+          <p:nvPr>
+            <p:ph type="title"/>
+          </p:nvPr>
+        </p:nvSpPr>
+        <p:spPr>
+          <a:xfrm>
+            <a:off x="457200" y="685800"/>
+            <a:ext cx="8998200" cy="1248840"/>
+          </a:xfrm>
+          <a:prstGeom prst="rect">
+            <a:avLst/>
+          </a:prstGeom>
+          <a:noFill/>
+          <a:ln w="0">
+            <a:noFill/>
+          </a:ln>
+        </p:spPr>
+        <p:txBody>
+          <a:bodyPr lIns="0" rIns="0" tIns="0" bIns="0" anchor="ctr">
+            <a:noAutofit/>
+          </a:bodyPr>
+          <a:p>
+            <a:pPr algn="ctr">
+              <a:lnSpc>
+                <a:spcPct val="100000"/>
+              </a:lnSpc>
+              <a:buNone/>
+            </a:pPr>
+            <a:r>
+              <a:rPr b="0" lang="en-US" sz="4400" spc="-1" strike="noStrike">
+                <a:solidFill>
+                  <a:srgbClr val="ffffff"/>
+                </a:solidFill>
+                <a:latin typeface="Arial"/>
+              </a:rPr>
+              <a:t>Q&amp;A</a:t>
+            </a:r>
+            <a:endParaRPr b="0" lang="en-US" sz="4400" spc="-1" strike="noStrike">
+              <a:latin typeface="Arial"/>
+            </a:endParaRPr>
+          </a:p>
+        </p:txBody>
+      </p:sp>
+      <p:sp>
+        <p:nvSpPr>
+          <p:cNvPr id="91" name="PlaceHolder 2"/>
+          <p:cNvSpPr>
+            <a:spLocks noGrp="1"/>
+          </p:cNvSpPr>
+          <p:nvPr>
+            <p:ph/>
+          </p:nvPr>
+        </p:nvSpPr>
+        <p:spPr>
+          <a:xfrm>
+            <a:off x="4343400" y="2057400"/>
+            <a:ext cx="2010600" cy="1371600"/>
+          </a:xfrm>
+          <a:prstGeom prst="rect">
+            <a:avLst/>
+          </a:prstGeom>
+          <a:noFill/>
+          <a:ln w="0">
+            <a:noFill/>
+          </a:ln>
+        </p:spPr>
+        <p:txBody>
+          <a:bodyPr lIns="0" rIns="0" tIns="0" bIns="0" anchor="t">
+            <a:normAutofit fontScale="39000"/>
+          </a:bodyPr>
+          <a:p>
+            <a:pPr indent="-324000">
+              <a:lnSpc>
+                <a:spcPct val="100000"/>
+              </a:lnSpc>
+              <a:buClr>
+                <a:srgbClr val="000000"/>
+              </a:buClr>
+              <a:buFont typeface="Wingdings" charset="2"/>
+              <a:buChar char=""/>
+            </a:pPr>
+            <a:r>
+              <a:rPr b="0" lang="en-US" sz="22650" spc="-1" strike="noStrike">
+                <a:solidFill>
+                  <a:srgbClr val="ffffff"/>
+                </a:solidFill>
+                <a:latin typeface="Arial"/>
+              </a:rPr>
+              <a:t>?</a:t>
+            </a:r>
+            <a:endParaRPr b="0" lang="en-US" sz="22650" spc="-1" strike="noStrike">
+              <a:solidFill>
+                <a:srgbClr val="ffffff"/>
+              </a:solidFill>
               <a:latin typeface="Arial"/>
             </a:endParaRPr>
           </a:p>
@@ -3722,8 +4282,8 @@
         </p:nvSpPr>
         <p:spPr>
           <a:xfrm>
-            <a:off x="530280" y="425520"/>
-            <a:ext cx="9070200" cy="945360"/>
+            <a:off x="504000" y="655200"/>
+            <a:ext cx="9069840" cy="945000"/>
           </a:xfrm>
           <a:prstGeom prst="rect">
             <a:avLst/>
@@ -3751,7 +4311,7 @@
                 </a:solidFill>
                 <a:latin typeface="Arial"/>
               </a:rPr>
-              <a:t>Members</a:t>
+              <a:t>A web app to manage your digital contacts</a:t>
             </a:r>
             <a:endParaRPr b="0" lang="en-US" sz="4400" spc="-1" strike="noStrike">
               <a:latin typeface="Arial"/>
@@ -3761,311 +4321,128 @@
       </p:sp>
       <p:sp>
         <p:nvSpPr>
-          <p:cNvPr id="56" name=""/>
-          <p:cNvSpPr/>
-          <p:nvPr/>
-        </p:nvSpPr>
-        <p:spPr>
-          <a:xfrm>
-            <a:off x="7195320" y="2057400"/>
-            <a:ext cx="1947960" cy="301680"/>
-          </a:xfrm>
-          <a:prstGeom prst="rect">
-            <a:avLst/>
-          </a:prstGeom>
-          <a:noFill/>
-          <a:ln w="0">
-            <a:noFill/>
-          </a:ln>
-        </p:spPr>
-        <p:style>
-          <a:lnRef idx="0"/>
-          <a:fillRef idx="0"/>
-          <a:effectRef idx="0"/>
-          <a:fontRef idx="minor"/>
-        </p:style>
-        <p:txBody>
-          <a:bodyPr lIns="90000" rIns="90000" tIns="45000" bIns="45000" anchor="t">
+          <p:cNvPr id="56" name="PlaceHolder 2"/>
+          <p:cNvSpPr>
+            <a:spLocks noGrp="1"/>
+          </p:cNvSpPr>
+          <p:nvPr>
+            <p:ph type="subTitle"/>
+          </p:nvPr>
+        </p:nvSpPr>
+        <p:spPr>
+          <a:xfrm>
+            <a:off x="3018600" y="2198160"/>
+            <a:ext cx="5211000" cy="1688040"/>
+          </a:xfrm>
+          <a:prstGeom prst="rect">
+            <a:avLst/>
+          </a:prstGeom>
+          <a:noFill/>
+          <a:ln w="0">
+            <a:noFill/>
+          </a:ln>
+        </p:spPr>
+        <p:txBody>
+          <a:bodyPr lIns="0" rIns="0" tIns="0" bIns="0" anchor="ctr">
             <a:noAutofit/>
           </a:bodyPr>
           <a:p>
-            <a:pPr>
+            <a:pPr lvl="1" marL="432000" indent="-216000">
               <a:lnSpc>
                 <a:spcPct val="100000"/>
               </a:lnSpc>
-              <a:buNone/>
-            </a:pPr>
-            <a:r>
-              <a:rPr b="0" lang="en-US" sz="1500" spc="-1" strike="noStrike">
-                <a:solidFill>
-                  <a:srgbClr val="ffffff"/>
-                </a:solidFill>
-                <a:latin typeface="Arial"/>
-                <a:ea typeface="DejaVu Sans"/>
-              </a:rPr>
-              <a:t>Joshua Jarquin (PM)</a:t>
-            </a:r>
-            <a:endParaRPr b="0" lang="en-US" sz="1500" spc="-1" strike="noStrike">
-              <a:latin typeface="Arial"/>
-            </a:endParaRPr>
-          </a:p>
-        </p:txBody>
-      </p:sp>
-      <p:sp>
-        <p:nvSpPr>
-          <p:cNvPr id="57" name=""/>
-          <p:cNvSpPr/>
-          <p:nvPr/>
-        </p:nvSpPr>
-        <p:spPr>
-          <a:xfrm>
-            <a:off x="685800" y="2057400"/>
-            <a:ext cx="1351800" cy="513000"/>
-          </a:xfrm>
-          <a:prstGeom prst="rect">
-            <a:avLst/>
-          </a:prstGeom>
-          <a:noFill/>
-          <a:ln w="0">
-            <a:noFill/>
-          </a:ln>
-        </p:spPr>
-        <p:style>
-          <a:lnRef idx="0"/>
-          <a:fillRef idx="0"/>
-          <a:effectRef idx="0"/>
-          <a:fontRef idx="minor"/>
-        </p:style>
-        <p:txBody>
-          <a:bodyPr lIns="90000" rIns="90000" tIns="45000" bIns="45000" anchor="t">
-            <a:noAutofit/>
-          </a:bodyPr>
-          <a:p>
-            <a:pPr>
+              <a:buClr>
+                <a:srgbClr val="000000"/>
+              </a:buClr>
+              <a:buSzPct val="45000"/>
+              <a:buFont typeface="Wingdings" charset="2"/>
+              <a:buChar char=""/>
+            </a:pPr>
+            <a:r>
+              <a:rPr b="0" lang="en-US" sz="1800" spc="-1" strike="noStrike">
+                <a:solidFill>
+                  <a:srgbClr val="ffffff"/>
+                </a:solidFill>
+                <a:latin typeface="Arial"/>
+              </a:rPr>
+              <a:t>Sign up for a contact manager! (It’s FREE!)</a:t>
+            </a:r>
+            <a:endParaRPr b="0" lang="en-US" sz="1800" spc="-1" strike="noStrike">
+              <a:latin typeface="Arial"/>
+            </a:endParaRPr>
+          </a:p>
+          <a:p>
+            <a:pPr lvl="2" marL="648000" indent="-216000">
               <a:lnSpc>
                 <a:spcPct val="100000"/>
               </a:lnSpc>
-              <a:buNone/>
-            </a:pPr>
-            <a:r>
-              <a:rPr b="0" lang="en-US" sz="1500" spc="-1" strike="noStrike">
-                <a:solidFill>
-                  <a:srgbClr val="ffffff"/>
-                </a:solidFill>
-                <a:latin typeface="Arial"/>
-                <a:ea typeface="DejaVu Sans"/>
-              </a:rPr>
-              <a:t>Joshua Bartz (Database) </a:t>
-            </a:r>
-            <a:endParaRPr b="0" lang="en-US" sz="1500" spc="-1" strike="noStrike">
-              <a:latin typeface="Arial"/>
-            </a:endParaRPr>
-          </a:p>
-        </p:txBody>
-      </p:sp>
-      <p:sp>
-        <p:nvSpPr>
-          <p:cNvPr id="58" name=""/>
-          <p:cNvSpPr/>
-          <p:nvPr/>
-        </p:nvSpPr>
-        <p:spPr>
-          <a:xfrm>
-            <a:off x="4167360" y="1983600"/>
-            <a:ext cx="1318320" cy="513000"/>
-          </a:xfrm>
-          <a:prstGeom prst="rect">
-            <a:avLst/>
-          </a:prstGeom>
-          <a:noFill/>
-          <a:ln w="0">
-            <a:noFill/>
-          </a:ln>
-        </p:spPr>
-        <p:style>
-          <a:lnRef idx="0"/>
-          <a:fillRef idx="0"/>
-          <a:effectRef idx="0"/>
-          <a:fontRef idx="minor"/>
-        </p:style>
-        <p:txBody>
-          <a:bodyPr lIns="90000" rIns="90000" tIns="45000" bIns="45000" anchor="t">
-            <a:noAutofit/>
-          </a:bodyPr>
-          <a:p>
-            <a:pPr>
+              <a:buClr>
+                <a:srgbClr val="000000"/>
+              </a:buClr>
+              <a:buSzPct val="45000"/>
+              <a:buFont typeface="Wingdings" charset="2"/>
+              <a:buChar char=""/>
+            </a:pPr>
+            <a:r>
+              <a:rPr b="0" lang="en-US" sz="1800" spc="-1" strike="noStrike">
+                <a:solidFill>
+                  <a:srgbClr val="ffffff"/>
+                </a:solidFill>
+                <a:latin typeface="Arial"/>
+              </a:rPr>
+              <a:t>Create, Delete and Edit contacts</a:t>
+            </a:r>
+            <a:endParaRPr b="0" lang="en-US" sz="1800" spc="-1" strike="noStrike">
+              <a:latin typeface="Arial"/>
+            </a:endParaRPr>
+          </a:p>
+          <a:p>
+            <a:pPr lvl="2" marL="648000" indent="-216000">
               <a:lnSpc>
                 <a:spcPct val="100000"/>
               </a:lnSpc>
-              <a:buNone/>
-            </a:pPr>
-            <a:r>
-              <a:rPr b="0" lang="en-US" sz="1500" spc="-1" strike="noStrike">
-                <a:solidFill>
-                  <a:srgbClr val="ffffff"/>
-                </a:solidFill>
-                <a:latin typeface="Arial"/>
-                <a:ea typeface="DejaVu Sans"/>
-              </a:rPr>
-              <a:t>Eugenio Diaz (API)</a:t>
-            </a:r>
-            <a:endParaRPr b="0" lang="en-US" sz="1500" spc="-1" strike="noStrike">
-              <a:latin typeface="Arial"/>
-            </a:endParaRPr>
-          </a:p>
-        </p:txBody>
-      </p:sp>
-      <p:sp>
-        <p:nvSpPr>
-          <p:cNvPr id="59" name=""/>
-          <p:cNvSpPr/>
-          <p:nvPr/>
-        </p:nvSpPr>
-        <p:spPr>
-          <a:xfrm>
-            <a:off x="616320" y="4572000"/>
-            <a:ext cx="1668960" cy="513000"/>
-          </a:xfrm>
-          <a:prstGeom prst="rect">
-            <a:avLst/>
-          </a:prstGeom>
-          <a:noFill/>
-          <a:ln w="0">
-            <a:noFill/>
-          </a:ln>
-        </p:spPr>
-        <p:style>
-          <a:lnRef idx="0"/>
-          <a:fillRef idx="0"/>
-          <a:effectRef idx="0"/>
-          <a:fontRef idx="minor"/>
-        </p:style>
-        <p:txBody>
-          <a:bodyPr lIns="90000" rIns="90000" tIns="45000" bIns="45000" anchor="t">
-            <a:noAutofit/>
-          </a:bodyPr>
-          <a:p>
-            <a:pPr>
+              <a:buClr>
+                <a:srgbClr val="000000"/>
+              </a:buClr>
+              <a:buSzPct val="45000"/>
+              <a:buFont typeface="Wingdings" charset="2"/>
+              <a:buChar char=""/>
+            </a:pPr>
+            <a:r>
+              <a:rPr b="0" lang="en-US" sz="1800" spc="-1" strike="noStrike">
+                <a:solidFill>
+                  <a:srgbClr val="ffffff"/>
+                </a:solidFill>
+                <a:latin typeface="Arial"/>
+              </a:rPr>
+              <a:t>Manage your favorite people</a:t>
+            </a:r>
+            <a:endParaRPr b="0" lang="en-US" sz="1800" spc="-1" strike="noStrike">
+              <a:latin typeface="Arial"/>
+            </a:endParaRPr>
+          </a:p>
+          <a:p>
+            <a:pPr lvl="2" marL="648000" indent="-216000">
               <a:lnSpc>
                 <a:spcPct val="100000"/>
               </a:lnSpc>
-              <a:buNone/>
-            </a:pPr>
-            <a:r>
-              <a:rPr b="0" lang="en-US" sz="1500" spc="-1" strike="noStrike">
-                <a:solidFill>
-                  <a:srgbClr val="ffffff"/>
-                </a:solidFill>
-                <a:latin typeface="Arial"/>
-                <a:ea typeface="DejaVu Sans"/>
-              </a:rPr>
-              <a:t>Benjamin Monroy (Front-End)</a:t>
-            </a:r>
-            <a:endParaRPr b="0" lang="en-US" sz="1500" spc="-1" strike="noStrike">
-              <a:latin typeface="Arial"/>
-            </a:endParaRPr>
-          </a:p>
-        </p:txBody>
-      </p:sp>
-      <p:sp>
-        <p:nvSpPr>
-          <p:cNvPr id="60" name=""/>
-          <p:cNvSpPr/>
-          <p:nvPr/>
-        </p:nvSpPr>
-        <p:spPr>
-          <a:xfrm>
-            <a:off x="4272480" y="4572000"/>
-            <a:ext cx="1670400" cy="513000"/>
-          </a:xfrm>
-          <a:prstGeom prst="rect">
-            <a:avLst/>
-          </a:prstGeom>
-          <a:noFill/>
-          <a:ln w="0">
-            <a:noFill/>
-          </a:ln>
-        </p:spPr>
-        <p:style>
-          <a:lnRef idx="0"/>
-          <a:fillRef idx="0"/>
-          <a:effectRef idx="0"/>
-          <a:fontRef idx="minor"/>
-        </p:style>
-        <p:txBody>
-          <a:bodyPr lIns="90000" rIns="90000" tIns="45000" bIns="45000" anchor="t">
-            <a:noAutofit/>
-          </a:bodyPr>
-          <a:p>
-            <a:pPr>
-              <a:lnSpc>
-                <a:spcPct val="100000"/>
-              </a:lnSpc>
-              <a:buNone/>
-            </a:pPr>
-            <a:r>
-              <a:rPr b="0" lang="en-US" sz="1500" spc="-1" strike="noStrike">
-                <a:solidFill>
-                  <a:srgbClr val="ffffff"/>
-                </a:solidFill>
-                <a:latin typeface="Arial"/>
-                <a:ea typeface="DejaVu Sans"/>
-              </a:rPr>
-              <a:t>Gabriel Rechdan (API) </a:t>
-            </a:r>
-            <a:endParaRPr b="0" lang="en-US" sz="1500" spc="-1" strike="noStrike">
-              <a:latin typeface="Arial"/>
-            </a:endParaRPr>
-          </a:p>
-        </p:txBody>
-      </p:sp>
-      <p:sp>
-        <p:nvSpPr>
-          <p:cNvPr id="61" name=""/>
-          <p:cNvSpPr/>
-          <p:nvPr/>
-        </p:nvSpPr>
-        <p:spPr>
-          <a:xfrm>
-            <a:off x="7539840" y="4572000"/>
-            <a:ext cx="1603440" cy="513000"/>
-          </a:xfrm>
-          <a:prstGeom prst="rect">
-            <a:avLst/>
-          </a:prstGeom>
-          <a:noFill/>
-          <a:ln w="0">
-            <a:noFill/>
-          </a:ln>
-        </p:spPr>
-        <p:style>
-          <a:lnRef idx="0"/>
-          <a:fillRef idx="0"/>
-          <a:effectRef idx="0"/>
-          <a:fontRef idx="minor"/>
-        </p:style>
-        <p:txBody>
-          <a:bodyPr lIns="90000" rIns="90000" tIns="45000" bIns="45000" anchor="t">
-            <a:noAutofit/>
-          </a:bodyPr>
-          <a:p>
-            <a:pPr>
-              <a:lnSpc>
-                <a:spcPct val="100000"/>
-              </a:lnSpc>
-              <a:buNone/>
-            </a:pPr>
-            <a:r>
-              <a:rPr b="0" lang="en-US" sz="1500" spc="-1" strike="noStrike">
-                <a:solidFill>
-                  <a:srgbClr val="ffffff"/>
-                </a:solidFill>
-                <a:latin typeface="Arial"/>
-                <a:ea typeface="DejaVu Sans"/>
-              </a:rPr>
-              <a:t>Alejandro Tejeira  (Front-End)</a:t>
-            </a:r>
-            <a:endParaRPr b="0" lang="en-US" sz="1500" spc="-1" strike="noStrike">
+              <a:buClr>
+                <a:srgbClr val="000000"/>
+              </a:buClr>
+              <a:buSzPct val="45000"/>
+              <a:buFont typeface="Wingdings" charset="2"/>
+              <a:buChar char=""/>
+            </a:pPr>
+            <a:r>
+              <a:rPr b="0" lang="en-US" sz="1800" spc="-1" strike="noStrike">
+                <a:solidFill>
+                  <a:srgbClr val="ffffff"/>
+                </a:solidFill>
+                <a:latin typeface="Arial"/>
+              </a:rPr>
+              <a:t>Difficulties looking for someone amongst your 6 contacts? Just search them up!</a:t>
+            </a:r>
+            <a:endParaRPr b="0" lang="en-US" sz="1800" spc="-1" strike="noStrike">
               <a:latin typeface="Arial"/>
             </a:endParaRPr>
           </a:p>
@@ -4103,7 +4480,7 @@
       </p:grpSpPr>
       <p:sp>
         <p:nvSpPr>
-          <p:cNvPr id="62" name="PlaceHolder 1"/>
+          <p:cNvPr id="57" name="PlaceHolder 1"/>
           <p:cNvSpPr>
             <a:spLocks noGrp="1"/>
           </p:cNvSpPr>
@@ -4113,8 +4490,8 @@
         </p:nvSpPr>
         <p:spPr>
           <a:xfrm>
-            <a:off x="504000" y="1428840"/>
-            <a:ext cx="9070200" cy="945360"/>
+            <a:off x="530280" y="425520"/>
+            <a:ext cx="9069840" cy="945000"/>
           </a:xfrm>
           <a:prstGeom prst="rect">
             <a:avLst/>
@@ -4142,7 +4519,7 @@
                 </a:solidFill>
                 <a:latin typeface="Arial"/>
               </a:rPr>
-              <a:t>What is this project</a:t>
+              <a:t>Brought to you by...</a:t>
             </a:r>
             <a:endParaRPr b="0" lang="en-US" sz="4400" spc="-1" strike="noStrike">
               <a:latin typeface="Arial"/>
@@ -4152,48 +4529,486 @@
       </p:sp>
       <p:sp>
         <p:nvSpPr>
-          <p:cNvPr id="63" name="PlaceHolder 2"/>
-          <p:cNvSpPr>
-            <a:spLocks noGrp="1"/>
-          </p:cNvSpPr>
-          <p:nvPr>
-            <p:ph type="subTitle"/>
-          </p:nvPr>
-        </p:nvSpPr>
-        <p:spPr>
-          <a:xfrm>
-            <a:off x="504000" y="1958400"/>
-            <a:ext cx="9070200" cy="3288600"/>
-          </a:xfrm>
-          <a:prstGeom prst="rect">
-            <a:avLst/>
-          </a:prstGeom>
-          <a:noFill/>
-          <a:ln w="0">
-            <a:noFill/>
-          </a:ln>
-        </p:spPr>
-        <p:txBody>
-          <a:bodyPr lIns="0" rIns="0" tIns="0" bIns="0" anchor="ctr">
+          <p:cNvPr id="58" name=""/>
+          <p:cNvSpPr/>
+          <p:nvPr/>
+        </p:nvSpPr>
+        <p:spPr>
+          <a:xfrm>
+            <a:off x="7195320" y="2057400"/>
+            <a:ext cx="1947600" cy="301320"/>
+          </a:xfrm>
+          <a:prstGeom prst="rect">
+            <a:avLst/>
+          </a:prstGeom>
+          <a:noFill/>
+          <a:ln w="0">
+            <a:noFill/>
+          </a:ln>
+        </p:spPr>
+        <p:style>
+          <a:lnRef idx="0"/>
+          <a:fillRef idx="0"/>
+          <a:effectRef idx="0"/>
+          <a:fontRef idx="minor"/>
+        </p:style>
+      </p:sp>
+      <p:sp>
+        <p:nvSpPr>
+          <p:cNvPr id="59" name=""/>
+          <p:cNvSpPr/>
+          <p:nvPr/>
+        </p:nvSpPr>
+        <p:spPr>
+          <a:xfrm>
+            <a:off x="685800" y="2057400"/>
+            <a:ext cx="1351440" cy="512640"/>
+          </a:xfrm>
+          <a:prstGeom prst="rect">
+            <a:avLst/>
+          </a:prstGeom>
+          <a:noFill/>
+          <a:ln w="0">
+            <a:noFill/>
+          </a:ln>
+        </p:spPr>
+        <p:style>
+          <a:lnRef idx="0"/>
+          <a:fillRef idx="0"/>
+          <a:effectRef idx="0"/>
+          <a:fontRef idx="minor"/>
+        </p:style>
+      </p:sp>
+      <p:sp>
+        <p:nvSpPr>
+          <p:cNvPr id="60" name=""/>
+          <p:cNvSpPr/>
+          <p:nvPr/>
+        </p:nvSpPr>
+        <p:spPr>
+          <a:xfrm>
+            <a:off x="4167360" y="1983600"/>
+            <a:ext cx="1317960" cy="512640"/>
+          </a:xfrm>
+          <a:prstGeom prst="rect">
+            <a:avLst/>
+          </a:prstGeom>
+          <a:noFill/>
+          <a:ln w="0">
+            <a:noFill/>
+          </a:ln>
+        </p:spPr>
+        <p:style>
+          <a:lnRef idx="0"/>
+          <a:fillRef idx="0"/>
+          <a:effectRef idx="0"/>
+          <a:fontRef idx="minor"/>
+        </p:style>
+      </p:sp>
+      <p:sp>
+        <p:nvSpPr>
+          <p:cNvPr id="61" name=""/>
+          <p:cNvSpPr/>
+          <p:nvPr/>
+        </p:nvSpPr>
+        <p:spPr>
+          <a:xfrm>
+            <a:off x="616320" y="4572000"/>
+            <a:ext cx="1668600" cy="512640"/>
+          </a:xfrm>
+          <a:prstGeom prst="rect">
+            <a:avLst/>
+          </a:prstGeom>
+          <a:noFill/>
+          <a:ln w="0">
+            <a:noFill/>
+          </a:ln>
+        </p:spPr>
+        <p:style>
+          <a:lnRef idx="0"/>
+          <a:fillRef idx="0"/>
+          <a:effectRef idx="0"/>
+          <a:fontRef idx="minor"/>
+        </p:style>
+      </p:sp>
+      <p:sp>
+        <p:nvSpPr>
+          <p:cNvPr id="62" name=""/>
+          <p:cNvSpPr/>
+          <p:nvPr/>
+        </p:nvSpPr>
+        <p:spPr>
+          <a:xfrm>
+            <a:off x="4272480" y="4572000"/>
+            <a:ext cx="1670040" cy="512640"/>
+          </a:xfrm>
+          <a:prstGeom prst="rect">
+            <a:avLst/>
+          </a:prstGeom>
+          <a:noFill/>
+          <a:ln w="0">
+            <a:noFill/>
+          </a:ln>
+        </p:spPr>
+        <p:style>
+          <a:lnRef idx="0"/>
+          <a:fillRef idx="0"/>
+          <a:effectRef idx="0"/>
+          <a:fontRef idx="minor"/>
+        </p:style>
+      </p:sp>
+      <p:sp>
+        <p:nvSpPr>
+          <p:cNvPr id="63" name=""/>
+          <p:cNvSpPr/>
+          <p:nvPr/>
+        </p:nvSpPr>
+        <p:spPr>
+          <a:xfrm>
+            <a:off x="7539840" y="4572000"/>
+            <a:ext cx="1603080" cy="512640"/>
+          </a:xfrm>
+          <a:prstGeom prst="rect">
+            <a:avLst/>
+          </a:prstGeom>
+          <a:noFill/>
+          <a:ln w="0">
+            <a:noFill/>
+          </a:ln>
+        </p:spPr>
+        <p:style>
+          <a:lnRef idx="0"/>
+          <a:fillRef idx="0"/>
+          <a:effectRef idx="0"/>
+          <a:fontRef idx="minor"/>
+        </p:style>
+      </p:sp>
+      <p:sp>
+        <p:nvSpPr>
+          <p:cNvPr id="64" name=""/>
+          <p:cNvSpPr txBox="1"/>
+          <p:nvPr/>
+        </p:nvSpPr>
+        <p:spPr>
+          <a:xfrm>
+            <a:off x="3200400" y="1755000"/>
+            <a:ext cx="4114800" cy="2797560"/>
+          </a:xfrm>
+          <a:prstGeom prst="rect">
+            <a:avLst/>
+          </a:prstGeom>
+          <a:noFill/>
+          <a:ln w="0">
+            <a:noFill/>
+          </a:ln>
+        </p:spPr>
+        <p:txBody>
+          <a:bodyPr lIns="90000" rIns="90000" tIns="45000" bIns="45000" anchor="t">
             <a:noAutofit/>
           </a:bodyPr>
           <a:p>
-            <a:pPr algn="ctr">
+            <a:pPr>
               <a:lnSpc>
-                <a:spcPct val="100000"/>
+                <a:spcPct val="150000"/>
               </a:lnSpc>
               <a:buNone/>
             </a:pPr>
             <a:r>
-              <a:rPr b="0" lang="en-US" sz="1800" spc="-1" strike="noStrike">
-                <a:solidFill>
-                  <a:srgbClr val="ffffff"/>
-                </a:solidFill>
-                <a:latin typeface="Arial"/>
-              </a:rPr>
-              <a:t>how it was developed, and anything that you feel is important</a:t>
-            </a:r>
-            <a:endParaRPr b="0" lang="en-US" sz="1800" spc="-1" strike="noStrike">
+              <a:rPr b="1" lang="en-US" sz="1600" spc="-1" strike="noStrike">
+                <a:solidFill>
+                  <a:srgbClr val="ffffff"/>
+                </a:solidFill>
+                <a:latin typeface="Arial"/>
+                <a:ea typeface="DejaVu Sans"/>
+              </a:rPr>
+              <a:t>Joshua Bartz </a:t>
+            </a:r>
+            <a:r>
+              <a:rPr b="1" lang="en-US" sz="1600" spc="-1" strike="noStrike">
+                <a:solidFill>
+                  <a:srgbClr val="ffffff"/>
+                </a:solidFill>
+                <a:latin typeface="Arial"/>
+                <a:ea typeface="DejaVu Sans"/>
+              </a:rPr>
+              <a:t>	</a:t>
+            </a:r>
+            <a:r>
+              <a:rPr b="1" lang="en-US" sz="1600" spc="-1" strike="noStrike">
+                <a:solidFill>
+                  <a:srgbClr val="ffffff"/>
+                </a:solidFill>
+                <a:latin typeface="Arial"/>
+                <a:ea typeface="DejaVu Sans"/>
+              </a:rPr>
+              <a:t>	</a:t>
+            </a:r>
+            <a:r>
+              <a:rPr b="1" lang="en-US" sz="1600" spc="-1" strike="noStrike">
+                <a:solidFill>
+                  <a:srgbClr val="ffffff"/>
+                </a:solidFill>
+                <a:latin typeface="Arial"/>
+                <a:ea typeface="DejaVu Sans"/>
+              </a:rPr>
+              <a:t>(Database)</a:t>
+            </a:r>
+            <a:endParaRPr b="1" lang="en-US" sz="1600" spc="-1" strike="noStrike">
+              <a:latin typeface="Arial"/>
+            </a:endParaRPr>
+          </a:p>
+          <a:p>
+            <a:pPr>
+              <a:lnSpc>
+                <a:spcPct val="150000"/>
+              </a:lnSpc>
+              <a:buNone/>
+            </a:pPr>
+            <a:r>
+              <a:rPr b="1" lang="en-US" sz="1600" spc="-1" strike="noStrike">
+                <a:solidFill>
+                  <a:srgbClr val="ffffff"/>
+                </a:solidFill>
+                <a:latin typeface="Arial"/>
+                <a:ea typeface="DejaVu Sans"/>
+              </a:rPr>
+              <a:t>Eugenio Diaz </a:t>
+            </a:r>
+            <a:r>
+              <a:rPr b="1" lang="en-US" sz="1600" spc="-1" strike="noStrike">
+                <a:solidFill>
+                  <a:srgbClr val="ffffff"/>
+                </a:solidFill>
+                <a:latin typeface="Arial"/>
+                <a:ea typeface="DejaVu Sans"/>
+              </a:rPr>
+              <a:t>	</a:t>
+            </a:r>
+            <a:r>
+              <a:rPr b="1" lang="en-US" sz="1600" spc="-1" strike="noStrike">
+                <a:solidFill>
+                  <a:srgbClr val="ffffff"/>
+                </a:solidFill>
+                <a:latin typeface="Arial"/>
+                <a:ea typeface="DejaVu Sans"/>
+              </a:rPr>
+              <a:t>	</a:t>
+            </a:r>
+            <a:r>
+              <a:rPr b="1" lang="en-US" sz="1600" spc="-1" strike="noStrike">
+                <a:solidFill>
+                  <a:srgbClr val="ffffff"/>
+                </a:solidFill>
+                <a:latin typeface="Arial"/>
+                <a:ea typeface="DejaVu Sans"/>
+              </a:rPr>
+              <a:t>(API)</a:t>
+            </a:r>
+            <a:endParaRPr b="1" lang="en-US" sz="1600" spc="-1" strike="noStrike">
+              <a:latin typeface="Arial"/>
+            </a:endParaRPr>
+          </a:p>
+          <a:p>
+            <a:pPr>
+              <a:lnSpc>
+                <a:spcPct val="150000"/>
+              </a:lnSpc>
+              <a:buNone/>
+            </a:pPr>
+            <a:r>
+              <a:rPr b="1" lang="en-US" sz="1600" spc="-1" strike="noStrike">
+                <a:solidFill>
+                  <a:srgbClr val="ffffff"/>
+                </a:solidFill>
+                <a:latin typeface="Arial"/>
+                <a:ea typeface="DejaVu Sans"/>
+              </a:rPr>
+              <a:t>Joshua Jarquin </a:t>
+            </a:r>
+            <a:r>
+              <a:rPr b="1" lang="en-US" sz="1600" spc="-1" strike="noStrike">
+                <a:solidFill>
+                  <a:srgbClr val="ffffff"/>
+                </a:solidFill>
+                <a:latin typeface="Arial"/>
+                <a:ea typeface="DejaVu Sans"/>
+              </a:rPr>
+              <a:t>	</a:t>
+            </a:r>
+            <a:r>
+              <a:rPr b="1" lang="en-US" sz="1600" spc="-1" strike="noStrike">
+                <a:solidFill>
+                  <a:srgbClr val="ffffff"/>
+                </a:solidFill>
+                <a:latin typeface="Arial"/>
+                <a:ea typeface="DejaVu Sans"/>
+              </a:rPr>
+              <a:t>	</a:t>
+            </a:r>
+            <a:r>
+              <a:rPr b="1" lang="en-US" sz="1600" spc="-1" strike="noStrike">
+                <a:solidFill>
+                  <a:srgbClr val="ffffff"/>
+                </a:solidFill>
+                <a:latin typeface="Arial"/>
+                <a:ea typeface="DejaVu Sans"/>
+              </a:rPr>
+              <a:t>(PM)</a:t>
+            </a:r>
+            <a:endParaRPr b="1" lang="en-US" sz="1600" spc="-1" strike="noStrike">
+              <a:latin typeface="Arial"/>
+            </a:endParaRPr>
+          </a:p>
+          <a:p>
+            <a:pPr>
+              <a:lnSpc>
+                <a:spcPct val="150000"/>
+              </a:lnSpc>
+              <a:buNone/>
+            </a:pPr>
+            <a:r>
+              <a:rPr b="1" lang="en-US" sz="1600" spc="-1" strike="noStrike">
+                <a:solidFill>
+                  <a:srgbClr val="ffffff"/>
+                </a:solidFill>
+                <a:latin typeface="Arial"/>
+                <a:ea typeface="DejaVu Sans"/>
+              </a:rPr>
+              <a:t>Benjamin Monroy </a:t>
+            </a:r>
+            <a:r>
+              <a:rPr b="1" lang="en-US" sz="1600" spc="-1" strike="noStrike">
+                <a:solidFill>
+                  <a:srgbClr val="ffffff"/>
+                </a:solidFill>
+                <a:latin typeface="Arial"/>
+                <a:ea typeface="DejaVu Sans"/>
+              </a:rPr>
+              <a:t>	</a:t>
+            </a:r>
+            <a:r>
+              <a:rPr b="1" lang="en-US" sz="1600" spc="-1" strike="noStrike">
+                <a:solidFill>
+                  <a:srgbClr val="ffffff"/>
+                </a:solidFill>
+                <a:latin typeface="Arial"/>
+                <a:ea typeface="DejaVu Sans"/>
+              </a:rPr>
+              <a:t>	</a:t>
+            </a:r>
+            <a:r>
+              <a:rPr b="1" lang="en-US" sz="1600" spc="-1" strike="noStrike">
+                <a:solidFill>
+                  <a:srgbClr val="ffffff"/>
+                </a:solidFill>
+                <a:latin typeface="Arial"/>
+                <a:ea typeface="DejaVu Sans"/>
+              </a:rPr>
+              <a:t>(Front-End)</a:t>
+            </a:r>
+            <a:endParaRPr b="1" lang="en-US" sz="1600" spc="-1" strike="noStrike">
+              <a:latin typeface="Arial"/>
+            </a:endParaRPr>
+          </a:p>
+          <a:p>
+            <a:pPr>
+              <a:lnSpc>
+                <a:spcPct val="150000"/>
+              </a:lnSpc>
+              <a:buNone/>
+            </a:pPr>
+            <a:r>
+              <a:rPr b="1" lang="en-US" sz="1600" spc="-1" strike="noStrike">
+                <a:solidFill>
+                  <a:srgbClr val="ffffff"/>
+                </a:solidFill>
+                <a:latin typeface="Arial"/>
+                <a:ea typeface="DejaVu Sans"/>
+              </a:rPr>
+              <a:t>Gabriel Rechdan </a:t>
+            </a:r>
+            <a:r>
+              <a:rPr b="1" lang="en-US" sz="1600" spc="-1" strike="noStrike">
+                <a:solidFill>
+                  <a:srgbClr val="ffffff"/>
+                </a:solidFill>
+                <a:latin typeface="Arial"/>
+                <a:ea typeface="DejaVu Sans"/>
+              </a:rPr>
+              <a:t>	</a:t>
+            </a:r>
+            <a:r>
+              <a:rPr b="1" lang="en-US" sz="1600" spc="-1" strike="noStrike">
+                <a:solidFill>
+                  <a:srgbClr val="ffffff"/>
+                </a:solidFill>
+                <a:latin typeface="Arial"/>
+                <a:ea typeface="DejaVu Sans"/>
+              </a:rPr>
+              <a:t>	</a:t>
+            </a:r>
+            <a:r>
+              <a:rPr b="1" lang="en-US" sz="1600" spc="-1" strike="noStrike">
+                <a:solidFill>
+                  <a:srgbClr val="ffffff"/>
+                </a:solidFill>
+                <a:latin typeface="Arial"/>
+                <a:ea typeface="DejaVu Sans"/>
+              </a:rPr>
+              <a:t>(API)</a:t>
+            </a:r>
+            <a:endParaRPr b="1" lang="en-US" sz="1600" spc="-1" strike="noStrike">
+              <a:latin typeface="Arial"/>
+            </a:endParaRPr>
+          </a:p>
+          <a:p>
+            <a:pPr>
+              <a:lnSpc>
+                <a:spcPct val="150000"/>
+              </a:lnSpc>
+              <a:buNone/>
+            </a:pPr>
+            <a:r>
+              <a:rPr b="1" lang="en-US" sz="1600" spc="-1" strike="noStrike">
+                <a:solidFill>
+                  <a:srgbClr val="ffffff"/>
+                </a:solidFill>
+                <a:latin typeface="Arial"/>
+                <a:ea typeface="DejaVu Sans"/>
+              </a:rPr>
+              <a:t>Alejandro Tejeira  </a:t>
+            </a:r>
+            <a:r>
+              <a:rPr b="1" lang="en-US" sz="1600" spc="-1" strike="noStrike">
+                <a:solidFill>
+                  <a:srgbClr val="ffffff"/>
+                </a:solidFill>
+                <a:latin typeface="Arial"/>
+                <a:ea typeface="DejaVu Sans"/>
+              </a:rPr>
+              <a:t>	</a:t>
+            </a:r>
+            <a:r>
+              <a:rPr b="1" lang="en-US" sz="1600" spc="-1" strike="noStrike">
+                <a:solidFill>
+                  <a:srgbClr val="ffffff"/>
+                </a:solidFill>
+                <a:latin typeface="Arial"/>
+                <a:ea typeface="DejaVu Sans"/>
+              </a:rPr>
+              <a:t>	</a:t>
+            </a:r>
+            <a:r>
+              <a:rPr b="1" lang="en-US" sz="1600" spc="-1" strike="noStrike">
+                <a:solidFill>
+                  <a:srgbClr val="ffffff"/>
+                </a:solidFill>
+                <a:latin typeface="Arial"/>
+                <a:ea typeface="DejaVu Sans"/>
+              </a:rPr>
+              <a:t>(Front-End)</a:t>
+            </a:r>
+            <a:endParaRPr b="1" lang="en-US" sz="1600" spc="-1" strike="noStrike">
               <a:latin typeface="Arial"/>
             </a:endParaRPr>
           </a:p>
@@ -4231,7 +5046,7 @@
       </p:grpSpPr>
       <p:sp>
         <p:nvSpPr>
-          <p:cNvPr id="64" name="PlaceHolder 1"/>
+          <p:cNvPr id="65" name="PlaceHolder 1"/>
           <p:cNvSpPr>
             <a:spLocks noGrp="1"/>
           </p:cNvSpPr>
@@ -4241,8 +5056,8 @@
         </p:nvSpPr>
         <p:spPr>
           <a:xfrm>
-            <a:off x="504000" y="1428840"/>
-            <a:ext cx="9070200" cy="945360"/>
+            <a:off x="504000" y="457200"/>
+            <a:ext cx="9069840" cy="945000"/>
           </a:xfrm>
           <a:prstGeom prst="rect">
             <a:avLst/>
@@ -4270,7 +5085,43 @@
                 </a:solidFill>
                 <a:latin typeface="Arial"/>
               </a:rPr>
-              <a:t>Technology Used</a:t>
+              <a:t>Techn</a:t>
+            </a:r>
+            <a:r>
+              <a:rPr b="0" lang="en-US" sz="4400" spc="-1" strike="noStrike">
+                <a:solidFill>
+                  <a:srgbClr val="ffffff"/>
+                </a:solidFill>
+                <a:latin typeface="Arial"/>
+              </a:rPr>
+              <a:t>ology </a:t>
+            </a:r>
+            <a:r>
+              <a:rPr b="0" lang="en-US" sz="4400" spc="-1" strike="noStrike">
+                <a:solidFill>
+                  <a:srgbClr val="ffffff"/>
+                </a:solidFill>
+                <a:latin typeface="Arial"/>
+              </a:rPr>
+              <a:t>Used - </a:t>
+            </a:r>
+            <a:r>
+              <a:rPr b="0" lang="en-US" sz="4400" spc="-1" strike="noStrike">
+                <a:solidFill>
+                  <a:srgbClr val="ffffff"/>
+                </a:solidFill>
+                <a:latin typeface="Arial"/>
+              </a:rPr>
+              <a:t>Creati</a:t>
+            </a:r>
+            <a:r>
+              <a:rPr b="0" lang="en-US" sz="4400" spc="-1" strike="noStrike">
+                <a:solidFill>
+                  <a:srgbClr val="ffffff"/>
+                </a:solidFill>
+                <a:latin typeface="Arial"/>
+              </a:rPr>
+              <a:t>on</a:t>
             </a:r>
             <a:endParaRPr b="0" lang="en-US" sz="4400" spc="-1" strike="noStrike">
               <a:latin typeface="Arial"/>
@@ -4280,7 +5131,7 @@
       </p:sp>
       <p:sp>
         <p:nvSpPr>
-          <p:cNvPr id="65" name="PlaceHolder 2"/>
+          <p:cNvPr id="66" name="PlaceHolder 2"/>
           <p:cNvSpPr>
             <a:spLocks noGrp="1"/>
           </p:cNvSpPr>
@@ -4290,8 +5141,8 @@
         </p:nvSpPr>
         <p:spPr>
           <a:xfrm>
-            <a:off x="504000" y="2592000"/>
-            <a:ext cx="9070200" cy="2021400"/>
+            <a:off x="1217160" y="2514600"/>
+            <a:ext cx="9069840" cy="2021040"/>
           </a:xfrm>
           <a:prstGeom prst="rect">
             <a:avLst/>
@@ -4306,12 +5157,24 @@
             <a:noAutofit/>
           </a:bodyPr>
           <a:p>
-            <a:pPr>
+            <a:pPr marL="216000" indent="-216000">
               <a:lnSpc>
                 <a:spcPct val="100000"/>
               </a:lnSpc>
-              <a:buNone/>
-            </a:pPr>
+              <a:buSzPct val="100000"/>
+              <a:buBlip>
+                <a:blip r:embed="rId1"/>
+              </a:buBlip>
+            </a:pPr>
+            <a:r>
+              <a:rPr b="1" lang="en-US" sz="1800" spc="-1" strike="noStrike">
+                <a:solidFill>
+                  <a:srgbClr val="ffffff"/>
+                </a:solidFill>
+                <a:latin typeface="Arial"/>
+              </a:rPr>
+              <a:t>LAMP</a:t>
+            </a:r>
             <a:r>
               <a:rPr b="0" lang="en-US" sz="1800" spc="-1" strike="noStrike">
                 <a:solidFill>
@@ -4319,19 +5182,33 @@
                 </a:solidFill>
                 <a:latin typeface="Arial"/>
               </a:rPr>
-              <a:t>LAMP stack implemented</a:t>
+              <a:t> stack implementation:</a:t>
             </a:r>
             <a:endParaRPr b="0" lang="en-US" sz="1800" spc="-1" strike="noStrike">
               <a:latin typeface="Arial"/>
             </a:endParaRPr>
           </a:p>
           <a:p>
-            <a:pPr>
+            <a:pPr lvl="1" marL="432000" indent="-216000">
               <a:lnSpc>
                 <a:spcPct val="100000"/>
               </a:lnSpc>
-              <a:buNone/>
-            </a:pPr>
+              <a:buClr>
+                <a:srgbClr val="ffffff"/>
+              </a:buClr>
+              <a:buSzPct val="45000"/>
+              <a:buFont typeface="Wingdings" charset="2"/>
+              <a:buChar char=""/>
+            </a:pPr>
+            <a:r>
+              <a:rPr b="1" lang="en-US" sz="1800" spc="-1" strike="noStrike">
+                <a:solidFill>
+                  <a:srgbClr val="ffffff"/>
+                </a:solidFill>
+                <a:latin typeface="Arial"/>
+              </a:rPr>
+              <a:t>Linux</a:t>
+            </a:r>
             <a:r>
               <a:rPr b="0" lang="en-US" sz="1800" spc="-1" strike="noStrike">
                 <a:solidFill>
@@ -4339,18 +5216,41 @@
                 </a:solidFill>
                 <a:latin typeface="Arial"/>
               </a:rPr>
-              <a:t>Linux: Hosted on an ubuntu 22.04 server from DigitalOcean</a:t>
+              <a:t>: </a:t>
+            </a:r>
+            <a:r>
+              <a:rPr b="0" lang="en-US" sz="1800" spc="-1" strike="noStrike">
+                <a:solidFill>
+                  <a:srgbClr val="ffffff"/>
+                </a:solidFill>
+                <a:latin typeface="Arial"/>
+              </a:rPr>
+              <a:t>	</a:t>
+            </a:r>
+            <a:r>
+              <a:rPr b="0" lang="en-US" sz="1800" spc="-1" strike="noStrike">
+                <a:solidFill>
+                  <a:srgbClr val="ffffff"/>
+                </a:solidFill>
+                <a:latin typeface="Arial"/>
+              </a:rPr>
+              <a:t>	</a:t>
             </a:r>
             <a:endParaRPr b="0" lang="en-US" sz="1800" spc="-1" strike="noStrike">
               <a:latin typeface="Arial"/>
             </a:endParaRPr>
           </a:p>
           <a:p>
-            <a:pPr>
+            <a:pPr lvl="2" marL="648000" indent="-216000">
               <a:lnSpc>
                 <a:spcPct val="100000"/>
               </a:lnSpc>
-              <a:buNone/>
+              <a:buClr>
+                <a:srgbClr val="ffffff"/>
+              </a:buClr>
+              <a:buSzPct val="45000"/>
+              <a:buFont typeface="Wingdings" charset="2"/>
+              <a:buChar char=""/>
             </a:pPr>
             <a:r>
               <a:rPr b="0" lang="en-US" sz="1800" spc="-1" strike="noStrike">
@@ -4359,19 +5259,33 @@
                 </a:solidFill>
                 <a:latin typeface="Arial"/>
               </a:rPr>
-              <a:t>Apache (HTTP): </a:t>
+              <a:t>Hosted on an Ubuntu 22.04 server rented from DigitalOcean.</a:t>
             </a:r>
             <a:endParaRPr b="0" lang="en-US" sz="1800" spc="-1" strike="noStrike">
               <a:latin typeface="Arial"/>
             </a:endParaRPr>
           </a:p>
           <a:p>
-            <a:pPr>
+            <a:pPr lvl="1" marL="432000" indent="-216000">
               <a:lnSpc>
                 <a:spcPct val="100000"/>
               </a:lnSpc>
-              <a:buNone/>
-            </a:pPr>
+              <a:buClr>
+                <a:srgbClr val="ffffff"/>
+              </a:buClr>
+              <a:buSzPct val="45000"/>
+              <a:buFont typeface="Wingdings" charset="2"/>
+              <a:buChar char=""/>
+            </a:pPr>
+            <a:r>
+              <a:rPr b="1" lang="en-US" sz="1800" spc="-1" strike="noStrike">
+                <a:solidFill>
+                  <a:srgbClr val="ffffff"/>
+                </a:solidFill>
+                <a:latin typeface="Arial"/>
+              </a:rPr>
+              <a:t>Apache</a:t>
+            </a:r>
             <a:r>
               <a:rPr b="0" lang="en-US" sz="1800" spc="-1" strike="noStrike">
                 <a:solidFill>
@@ -4379,18 +5293,59 @@
                 </a:solidFill>
                 <a:latin typeface="Arial"/>
               </a:rPr>
-              <a:t>MySQL: The database solution to store user login info and each user’s contact’s info</a:t>
+              <a:t> </a:t>
+            </a:r>
+            <a:r>
+              <a:rPr b="0" lang="en-US" sz="1800" spc="-1" strike="noStrike">
+                <a:solidFill>
+                  <a:srgbClr val="ffffff"/>
+                </a:solidFill>
+                <a:latin typeface="Arial"/>
+              </a:rPr>
+              <a:t>	</a:t>
+            </a:r>
+            <a:r>
+              <a:rPr b="0" lang="en-US" sz="1800" spc="-1" strike="noStrike">
+                <a:solidFill>
+                  <a:srgbClr val="ffffff"/>
+                </a:solidFill>
+                <a:latin typeface="Arial"/>
+              </a:rPr>
+              <a:t>(</a:t>
+            </a:r>
+            <a:r>
+              <a:rPr b="1" lang="en-US" sz="1800" spc="-1" strike="noStrike">
+                <a:solidFill>
+                  <a:srgbClr val="ffffff"/>
+                </a:solidFill>
+                <a:latin typeface="Arial"/>
+              </a:rPr>
+              <a:t>HTTP</a:t>
+            </a:r>
+            <a:r>
+              <a:rPr b="0" lang="en-US" sz="1800" spc="-1" strike="noStrike">
+                <a:solidFill>
+                  <a:srgbClr val="ffffff"/>
+                </a:solidFill>
+                <a:latin typeface="Arial"/>
+              </a:rPr>
+              <a:t>): </a:t>
             </a:r>
             <a:endParaRPr b="0" lang="en-US" sz="1800" spc="-1" strike="noStrike">
               <a:latin typeface="Arial"/>
             </a:endParaRPr>
           </a:p>
           <a:p>
-            <a:pPr>
+            <a:pPr lvl="2" marL="648000" indent="-216000">
               <a:lnSpc>
                 <a:spcPct val="100000"/>
               </a:lnSpc>
-              <a:buNone/>
+              <a:buClr>
+                <a:srgbClr val="ffffff"/>
+              </a:buClr>
+              <a:buSzPct val="45000"/>
+              <a:buFont typeface="Wingdings" charset="2"/>
+              <a:buChar char=""/>
             </a:pPr>
             <a:r>
               <a:rPr b="0" lang="en-US" sz="1800" spc="-1" strike="noStrike">
@@ -4399,7 +5354,215 @@
                 </a:solidFill>
                 <a:latin typeface="Arial"/>
               </a:rPr>
-              <a:t>PHP: The interface used to communicate between the front-end (user actions) and the database (the info which is then displayed in browser).</a:t>
+              <a:t>An HTTP web server used to deliver web pages across the </a:t>
+            </a:r>
+            <a:r>
+              <a:rPr b="0" lang="en-US" sz="1800" spc="-1" strike="noStrike">
+                <a:solidFill>
+                  <a:srgbClr val="ffffff"/>
+                </a:solidFill>
+                <a:latin typeface="Arial"/>
+              </a:rPr>
+              <a:t>	</a:t>
+            </a:r>
+            <a:r>
+              <a:rPr b="0" lang="en-US" sz="1800" spc="-1" strike="noStrike">
+                <a:solidFill>
+                  <a:srgbClr val="ffffff"/>
+                </a:solidFill>
+                <a:latin typeface="Arial"/>
+              </a:rPr>
+              <a:t>	</a:t>
+            </a:r>
+            <a:r>
+              <a:rPr b="0" lang="en-US" sz="1800" spc="-1" strike="noStrike">
+                <a:solidFill>
+                  <a:srgbClr val="ffffff"/>
+                </a:solidFill>
+                <a:latin typeface="Arial"/>
+              </a:rPr>
+              <a:t>	</a:t>
+            </a:r>
+            <a:r>
+              <a:rPr b="0" lang="en-US" sz="1800" spc="-1" strike="noStrike">
+                <a:solidFill>
+                  <a:srgbClr val="ffffff"/>
+                </a:solidFill>
+                <a:latin typeface="Arial"/>
+              </a:rPr>
+              <a:t>internet.</a:t>
+            </a:r>
+            <a:endParaRPr b="0" lang="en-US" sz="1800" spc="-1" strike="noStrike">
+              <a:latin typeface="Arial"/>
+            </a:endParaRPr>
+          </a:p>
+          <a:p>
+            <a:pPr lvl="1" marL="432000" indent="-216000">
+              <a:lnSpc>
+                <a:spcPct val="100000"/>
+              </a:lnSpc>
+              <a:buClr>
+                <a:srgbClr val="ffffff"/>
+              </a:buClr>
+              <a:buSzPct val="45000"/>
+              <a:buFont typeface="Wingdings" charset="2"/>
+              <a:buChar char=""/>
+            </a:pPr>
+            <a:r>
+              <a:rPr b="1" lang="en-US" sz="1800" spc="-1" strike="noStrike">
+                <a:solidFill>
+                  <a:srgbClr val="ffffff"/>
+                </a:solidFill>
+                <a:latin typeface="Arial"/>
+              </a:rPr>
+              <a:t>MySQL</a:t>
+            </a:r>
+            <a:r>
+              <a:rPr b="0" lang="en-US" sz="1800" spc="-1" strike="noStrike">
+                <a:solidFill>
+                  <a:srgbClr val="ffffff"/>
+                </a:solidFill>
+                <a:latin typeface="Arial"/>
+              </a:rPr>
+              <a:t>: </a:t>
+            </a:r>
+            <a:r>
+              <a:rPr b="0" lang="en-US" sz="1800" spc="-1" strike="noStrike">
+                <a:solidFill>
+                  <a:srgbClr val="ffffff"/>
+                </a:solidFill>
+                <a:latin typeface="Arial"/>
+              </a:rPr>
+              <a:t>	</a:t>
+            </a:r>
+            <a:endParaRPr b="0" lang="en-US" sz="1800" spc="-1" strike="noStrike">
+              <a:latin typeface="Arial"/>
+            </a:endParaRPr>
+          </a:p>
+          <a:p>
+            <a:pPr lvl="2" marL="648000" indent="-216000">
+              <a:lnSpc>
+                <a:spcPct val="100000"/>
+              </a:lnSpc>
+              <a:buClr>
+                <a:srgbClr val="ffffff"/>
+              </a:buClr>
+              <a:buSzPct val="45000"/>
+              <a:buFont typeface="Wingdings" charset="2"/>
+              <a:buChar char=""/>
+            </a:pPr>
+            <a:r>
+              <a:rPr b="0" lang="en-US" sz="1800" spc="-1" strike="noStrike">
+                <a:solidFill>
+                  <a:srgbClr val="ffffff"/>
+                </a:solidFill>
+                <a:latin typeface="Arial"/>
+              </a:rPr>
+              <a:t>The database solution to store/modify/fetch relevant data.</a:t>
+            </a:r>
+            <a:endParaRPr b="0" lang="en-US" sz="1800" spc="-1" strike="noStrike">
+              <a:latin typeface="Arial"/>
+            </a:endParaRPr>
+          </a:p>
+          <a:p>
+            <a:pPr lvl="1" marL="432000" indent="-216000">
+              <a:lnSpc>
+                <a:spcPct val="100000"/>
+              </a:lnSpc>
+              <a:buClr>
+                <a:srgbClr val="ffffff"/>
+              </a:buClr>
+              <a:buSzPct val="45000"/>
+              <a:buFont typeface="Wingdings" charset="2"/>
+              <a:buChar char=""/>
+            </a:pPr>
+            <a:r>
+              <a:rPr b="1" lang="en-US" sz="1800" spc="-1" strike="noStrike">
+                <a:solidFill>
+                  <a:srgbClr val="ffffff"/>
+                </a:solidFill>
+                <a:latin typeface="Arial"/>
+              </a:rPr>
+              <a:t>PHP</a:t>
+            </a:r>
+            <a:r>
+              <a:rPr b="0" lang="en-US" sz="1800" spc="-1" strike="noStrike">
+                <a:solidFill>
+                  <a:srgbClr val="ffffff"/>
+                </a:solidFill>
+                <a:latin typeface="Arial"/>
+              </a:rPr>
+              <a:t>: </a:t>
+            </a:r>
+            <a:r>
+              <a:rPr b="0" lang="en-US" sz="1800" spc="-1" strike="noStrike">
+                <a:solidFill>
+                  <a:srgbClr val="ffffff"/>
+                </a:solidFill>
+                <a:latin typeface="Arial"/>
+              </a:rPr>
+              <a:t>	</a:t>
+            </a:r>
+            <a:r>
+              <a:rPr b="0" lang="en-US" sz="1800" spc="-1" strike="noStrike">
+                <a:solidFill>
+                  <a:srgbClr val="ffffff"/>
+                </a:solidFill>
+                <a:latin typeface="Arial"/>
+              </a:rPr>
+              <a:t>	</a:t>
+            </a:r>
+            <a:endParaRPr b="0" lang="en-US" sz="1800" spc="-1" strike="noStrike">
+              <a:latin typeface="Arial"/>
+            </a:endParaRPr>
+          </a:p>
+          <a:p>
+            <a:pPr lvl="2" marL="648000" indent="-216000">
+              <a:lnSpc>
+                <a:spcPct val="100000"/>
+              </a:lnSpc>
+              <a:buClr>
+                <a:srgbClr val="ffffff"/>
+              </a:buClr>
+              <a:buSzPct val="45000"/>
+              <a:buFont typeface="Wingdings" charset="2"/>
+              <a:buChar char=""/>
+            </a:pPr>
+            <a:r>
+              <a:rPr b="0" lang="en-US" sz="1800" spc="-1" strike="noStrike">
+                <a:solidFill>
+                  <a:srgbClr val="ffffff"/>
+                </a:solidFill>
+                <a:latin typeface="Arial"/>
+              </a:rPr>
+              <a:t>The language used to bridge requests to and from the website to </a:t>
+            </a:r>
+            <a:r>
+              <a:rPr b="0" lang="en-US" sz="1800" spc="-1" strike="noStrike">
+                <a:solidFill>
+                  <a:srgbClr val="ffffff"/>
+                </a:solidFill>
+                <a:latin typeface="Arial"/>
+              </a:rPr>
+              <a:t>	</a:t>
+            </a:r>
+            <a:r>
+              <a:rPr b="0" lang="en-US" sz="1800" spc="-1" strike="noStrike">
+                <a:solidFill>
+                  <a:srgbClr val="ffffff"/>
+                </a:solidFill>
+                <a:latin typeface="Arial"/>
+              </a:rPr>
+              <a:t>	</a:t>
+            </a:r>
+            <a:r>
+              <a:rPr b="0" lang="en-US" sz="1800" spc="-1" strike="noStrike">
+                <a:solidFill>
+                  <a:srgbClr val="ffffff"/>
+                </a:solidFill>
+                <a:latin typeface="Arial"/>
+              </a:rPr>
+              <a:t>the database.</a:t>
             </a:r>
             <a:endParaRPr b="0" lang="en-US" sz="1800" spc="-1" strike="noStrike">
               <a:latin typeface="Arial"/>
@@ -4439,7 +5602,7 @@
       </p:grpSpPr>
       <p:sp>
         <p:nvSpPr>
-          <p:cNvPr id="66" name="PlaceHolder 1"/>
+          <p:cNvPr id="67" name="PlaceHolder 1"/>
           <p:cNvSpPr>
             <a:spLocks noGrp="1"/>
           </p:cNvSpPr>
@@ -4449,8 +5612,8 @@
         </p:nvSpPr>
         <p:spPr>
           <a:xfrm>
-            <a:off x="504000" y="1428840"/>
-            <a:ext cx="9070200" cy="945360"/>
+            <a:off x="531360" y="426600"/>
+            <a:ext cx="9069840" cy="945000"/>
           </a:xfrm>
           <a:prstGeom prst="rect">
             <a:avLst/>
@@ -4478,7 +5641,7 @@
                 </a:solidFill>
                 <a:latin typeface="Arial"/>
               </a:rPr>
-              <a:t>Technology Used Cont.</a:t>
+              <a:t>Technology Used - Organization</a:t>
             </a:r>
             <a:endParaRPr b="0" lang="en-US" sz="4400" spc="-1" strike="noStrike">
               <a:latin typeface="Arial"/>
@@ -4488,7 +5651,7 @@
       </p:sp>
       <p:sp>
         <p:nvSpPr>
-          <p:cNvPr id="67" name="PlaceHolder 2"/>
+          <p:cNvPr id="68" name="PlaceHolder 2"/>
           <p:cNvSpPr>
             <a:spLocks noGrp="1"/>
           </p:cNvSpPr>
@@ -4498,8 +5661,8 @@
         </p:nvSpPr>
         <p:spPr>
           <a:xfrm>
-            <a:off x="504000" y="2592000"/>
-            <a:ext cx="9070200" cy="2021400"/>
+            <a:off x="2286000" y="1600200"/>
+            <a:ext cx="6858000" cy="2971800"/>
           </a:xfrm>
           <a:prstGeom prst="rect">
             <a:avLst/>
@@ -4521,13 +5684,40 @@
               <a:buNone/>
             </a:pPr>
             <a:r>
+              <a:rPr b="1" lang="en-US" sz="1800" spc="-1" strike="noStrike">
+                <a:solidFill>
+                  <a:srgbClr val="ffffff"/>
+                </a:solidFill>
+                <a:latin typeface="Arial"/>
+              </a:rPr>
+              <a:t>Github</a:t>
+            </a:r>
+            <a:r>
               <a:rPr b="0" lang="en-US" sz="1800" spc="-1" strike="noStrike">
                 <a:solidFill>
                   <a:srgbClr val="ffffff"/>
                 </a:solidFill>
                 <a:latin typeface="Arial"/>
               </a:rPr>
-              <a:t>Github: Source Code &amp; document digital repository host.</a:t>
+              <a:t>: </a:t>
+            </a:r>
+            <a:r>
+              <a:rPr b="0" lang="en-US" sz="1800" spc="-1" strike="noStrike">
+                <a:solidFill>
+                  <a:srgbClr val="ffffff"/>
+                </a:solidFill>
+                <a:latin typeface="Arial"/>
+              </a:rPr>
+              <a:t>	</a:t>
+            </a:r>
+            <a:r>
+              <a:rPr b="0" lang="en-US" sz="1800" spc="-1" strike="noStrike">
+                <a:solidFill>
+                  <a:srgbClr val="ffffff"/>
+                </a:solidFill>
+                <a:latin typeface="Arial"/>
+              </a:rPr>
+              <a:t>  Repository for source code and documentation.</a:t>
             </a:r>
             <a:endParaRPr b="0" lang="en-US" sz="1800" spc="-1" strike="noStrike">
               <a:latin typeface="Arial"/>
@@ -4540,15 +5730,6 @@
               </a:lnSpc>
               <a:buNone/>
             </a:pPr>
-            <a:r>
-              <a:rPr b="0" lang="en-US" sz="1800" spc="-1" strike="noStrike">
-                <a:solidFill>
-                  <a:srgbClr val="ffffff"/>
-                </a:solidFill>
-                <a:latin typeface="Arial"/>
-              </a:rPr>
-              <a:t>Discord: Primary source of communication</a:t>
-            </a:r>
             <a:endParaRPr b="0" lang="en-US" sz="1800" spc="-1" strike="noStrike">
               <a:latin typeface="Arial"/>
             </a:endParaRPr>
@@ -4560,6 +5741,37 @@
               </a:lnSpc>
               <a:buNone/>
             </a:pPr>
+            <a:endParaRPr b="0" lang="en-US" sz="1800" spc="-1" strike="noStrike">
+              <a:latin typeface="Arial"/>
+            </a:endParaRPr>
+          </a:p>
+          <a:p>
+            <a:pPr>
+              <a:lnSpc>
+                <a:spcPct val="100000"/>
+              </a:lnSpc>
+              <a:buNone/>
+            </a:pPr>
+            <a:endParaRPr b="0" lang="en-US" sz="1800" spc="-1" strike="noStrike">
+              <a:latin typeface="Arial"/>
+            </a:endParaRPr>
+          </a:p>
+          <a:p>
+            <a:pPr>
+              <a:lnSpc>
+                <a:spcPct val="100000"/>
+              </a:lnSpc>
+              <a:buNone/>
+            </a:pPr>
+            <a:r>
+              <a:rPr b="1" lang="en-US" sz="1800" spc="-1" strike="noStrike">
+                <a:solidFill>
+                  <a:srgbClr val="ffffff"/>
+                </a:solidFill>
+                <a:latin typeface="Arial"/>
+              </a:rPr>
+              <a:t>Discord</a:t>
+            </a:r>
             <a:r>
               <a:rPr b="0" lang="en-US" sz="1800" spc="-1" strike="noStrike">
                 <a:solidFill>
@@ -4567,14 +5779,163 @@
                 </a:solidFill>
                 <a:latin typeface="Arial"/>
               </a:rPr>
-              <a:t>Ganttpro: Used to create the gantt chart</a:t>
+              <a:t>:   Primary platform for communication and exchanges.</a:t>
             </a:r>
             <a:endParaRPr b="0" lang="en-US" sz="1800" spc="-1" strike="noStrike">
               <a:latin typeface="Arial"/>
             </a:endParaRPr>
           </a:p>
-        </p:txBody>
-      </p:sp>
+          <a:p>
+            <a:pPr>
+              <a:lnSpc>
+                <a:spcPct val="100000"/>
+              </a:lnSpc>
+              <a:buNone/>
+            </a:pPr>
+            <a:endParaRPr b="0" lang="en-US" sz="1800" spc="-1" strike="noStrike">
+              <a:latin typeface="Arial"/>
+            </a:endParaRPr>
+          </a:p>
+          <a:p>
+            <a:pPr>
+              <a:lnSpc>
+                <a:spcPct val="100000"/>
+              </a:lnSpc>
+              <a:buNone/>
+            </a:pPr>
+            <a:endParaRPr b="0" lang="en-US" sz="1800" spc="-1" strike="noStrike">
+              <a:latin typeface="Arial"/>
+            </a:endParaRPr>
+          </a:p>
+          <a:p>
+            <a:pPr>
+              <a:lnSpc>
+                <a:spcPct val="100000"/>
+              </a:lnSpc>
+              <a:buNone/>
+            </a:pPr>
+            <a:endParaRPr b="0" lang="en-US" sz="1800" spc="-1" strike="noStrike">
+              <a:latin typeface="Arial"/>
+            </a:endParaRPr>
+          </a:p>
+          <a:p>
+            <a:pPr>
+              <a:lnSpc>
+                <a:spcPct val="100000"/>
+              </a:lnSpc>
+              <a:buNone/>
+            </a:pPr>
+            <a:r>
+              <a:rPr b="1" lang="en-US" sz="1800" spc="-1" strike="noStrike">
+                <a:solidFill>
+                  <a:srgbClr val="ffffff"/>
+                </a:solidFill>
+                <a:latin typeface="Arial"/>
+              </a:rPr>
+              <a:t>Ganttpro</a:t>
+            </a:r>
+            <a:r>
+              <a:rPr b="0" lang="en-US" sz="1800" spc="-1" strike="noStrike">
+                <a:solidFill>
+                  <a:srgbClr val="ffffff"/>
+                </a:solidFill>
+                <a:latin typeface="Arial"/>
+              </a:rPr>
+              <a:t>: Gantt chart creation tool used to keep track of workflow </a:t>
+            </a:r>
+            <a:r>
+              <a:rPr b="0" lang="en-US" sz="1800" spc="-1" strike="noStrike">
+                <a:solidFill>
+                  <a:srgbClr val="ffffff"/>
+                </a:solidFill>
+                <a:latin typeface="Arial"/>
+              </a:rPr>
+              <a:t>	</a:t>
+            </a:r>
+            <a:r>
+              <a:rPr b="0" lang="en-US" sz="1800" spc="-1" strike="noStrike">
+                <a:solidFill>
+                  <a:srgbClr val="ffffff"/>
+                </a:solidFill>
+                <a:latin typeface="Arial"/>
+              </a:rPr>
+              <a:t>  and timelines.</a:t>
+            </a:r>
+            <a:endParaRPr b="0" lang="en-US" sz="1800" spc="-1" strike="noStrike">
+              <a:latin typeface="Arial"/>
+            </a:endParaRPr>
+          </a:p>
+        </p:txBody>
+      </p:sp>
+      <p:pic>
+        <p:nvPicPr>
+          <p:cNvPr id="69" name="" descr=""/>
+          <p:cNvPicPr/>
+          <p:nvPr/>
+        </p:nvPicPr>
+        <p:blipFill>
+          <a:blip r:embed="rId1"/>
+          <a:stretch/>
+        </p:blipFill>
+        <p:spPr>
+          <a:xfrm>
+            <a:off x="1143000" y="2514600"/>
+            <a:ext cx="1143000" cy="1143000"/>
+          </a:xfrm>
+          <a:prstGeom prst="rect">
+            <a:avLst/>
+          </a:prstGeom>
+          <a:ln w="0">
+            <a:noFill/>
+          </a:ln>
+        </p:spPr>
+      </p:pic>
+      <p:pic>
+        <p:nvPicPr>
+          <p:cNvPr id="70" name="" descr=""/>
+          <p:cNvPicPr/>
+          <p:nvPr/>
+        </p:nvPicPr>
+        <p:blipFill>
+          <a:blip r:embed="rId2"/>
+          <a:stretch/>
+        </p:blipFill>
+        <p:spPr>
+          <a:xfrm>
+            <a:off x="1143000" y="1371600"/>
+            <a:ext cx="1143000" cy="1143000"/>
+          </a:xfrm>
+          <a:prstGeom prst="rect">
+            <a:avLst/>
+          </a:prstGeom>
+          <a:ln w="0">
+            <a:noFill/>
+          </a:ln>
+        </p:spPr>
+      </p:pic>
+      <p:pic>
+        <p:nvPicPr>
+          <p:cNvPr id="71" name="" descr=""/>
+          <p:cNvPicPr/>
+          <p:nvPr/>
+        </p:nvPicPr>
+        <p:blipFill>
+          <a:blip r:embed="rId3"/>
+          <a:stretch/>
+        </p:blipFill>
+        <p:spPr>
+          <a:xfrm>
+            <a:off x="1143000" y="3657600"/>
+            <a:ext cx="1143000" cy="1143000"/>
+          </a:xfrm>
+          <a:prstGeom prst="rect">
+            <a:avLst/>
+          </a:prstGeom>
+          <a:ln w="0">
+            <a:noFill/>
+          </a:ln>
+        </p:spPr>
+      </p:pic>
     </p:spTree>
   </p:cSld>
   <mc:AlternateContent>
@@ -4607,7 +5968,7 @@
       </p:grpSpPr>
       <p:sp>
         <p:nvSpPr>
-          <p:cNvPr id="68" name="PlaceHolder 1"/>
+          <p:cNvPr id="72" name="PlaceHolder 1"/>
           <p:cNvSpPr>
             <a:spLocks noGrp="1"/>
           </p:cNvSpPr>
@@ -4618,7 +5979,7 @@
         <p:spPr>
           <a:xfrm>
             <a:off x="457200" y="197280"/>
-            <a:ext cx="9070200" cy="945360"/>
+            <a:ext cx="9069840" cy="945000"/>
           </a:xfrm>
           <a:prstGeom prst="rect">
             <a:avLst/>
@@ -4646,7 +6007,7 @@
                 </a:solidFill>
                 <a:latin typeface="Arial"/>
               </a:rPr>
-              <a:t>ERD</a:t>
+              <a:t>ERD w/ fav</a:t>
             </a:r>
             <a:endParaRPr b="0" lang="en-US" sz="4400" spc="-1" strike="noStrike">
               <a:latin typeface="Arial"/>
@@ -4656,7 +6017,7 @@
       </p:sp>
       <p:pic>
         <p:nvPicPr>
-          <p:cNvPr id="69" name="" descr=""/>
+          <p:cNvPr id="73" name="" descr=""/>
           <p:cNvPicPr/>
           <p:nvPr/>
         </p:nvPicPr>
@@ -4667,7 +6028,7 @@
         <p:spPr>
           <a:xfrm>
             <a:off x="457200" y="1298880"/>
-            <a:ext cx="9372240" cy="3958560"/>
+            <a:ext cx="9371880" cy="3958200"/>
           </a:xfrm>
           <a:prstGeom prst="rect">
             <a:avLst/>
@@ -4709,7 +6070,7 @@
       </p:grpSpPr>
       <p:sp>
         <p:nvSpPr>
-          <p:cNvPr id="70" name="PlaceHolder 1"/>
+          <p:cNvPr id="74" name="PlaceHolder 1"/>
           <p:cNvSpPr>
             <a:spLocks noGrp="1"/>
           </p:cNvSpPr>
@@ -4719,8 +6080,8 @@
         </p:nvSpPr>
         <p:spPr>
           <a:xfrm>
-            <a:off x="531000" y="197640"/>
-            <a:ext cx="9070200" cy="945360"/>
+            <a:off x="457200" y="197280"/>
+            <a:ext cx="9069840" cy="945000"/>
           </a:xfrm>
           <a:prstGeom prst="rect">
             <a:avLst/>
@@ -4748,7 +6109,7 @@
                 </a:solidFill>
                 <a:latin typeface="Arial"/>
               </a:rPr>
-              <a:t>Gantt chart</a:t>
+              <a:t>ERD w/o fav</a:t>
             </a:r>
             <a:endParaRPr b="0" lang="en-US" sz="4400" spc="-1" strike="noStrike">
               <a:latin typeface="Arial"/>
@@ -4758,7 +6119,7 @@
       </p:sp>
       <p:pic>
         <p:nvPicPr>
-          <p:cNvPr id="71" name="" descr=""/>
+          <p:cNvPr id="75" name="" descr=""/>
           <p:cNvPicPr/>
           <p:nvPr/>
         </p:nvPicPr>
@@ -4768,8 +6129,8 @@
         </p:blipFill>
         <p:spPr>
           <a:xfrm>
-            <a:off x="4320" y="1337760"/>
-            <a:ext cx="10080360" cy="2988360"/>
+            <a:off x="914400" y="1371600"/>
+            <a:ext cx="8434440" cy="3628080"/>
           </a:xfrm>
           <a:prstGeom prst="rect">
             <a:avLst/>
@@ -4811,18 +6172,14 @@
       </p:grpSpPr>
       <p:sp>
         <p:nvSpPr>
-          <p:cNvPr id="72" name="PlaceHolder 1"/>
-          <p:cNvSpPr>
-            <a:spLocks noGrp="1"/>
-          </p:cNvSpPr>
-          <p:nvPr>
-            <p:ph type="title"/>
-          </p:nvPr>
-        </p:nvSpPr>
-        <p:spPr>
-          <a:xfrm>
-            <a:off x="504000" y="-228600"/>
-            <a:ext cx="9070200" cy="1142640"/>
+          <p:cNvPr id="76" name="PlaceHolder 3"/>
+          <p:cNvSpPr txBox="1"/>
+          <p:nvPr/>
+        </p:nvSpPr>
+        <p:spPr>
+          <a:xfrm>
+            <a:off x="457200" y="197640"/>
+            <a:ext cx="9069840" cy="945000"/>
           </a:xfrm>
           <a:prstGeom prst="rect">
             <a:avLst/>
@@ -4850,7 +6207,7 @@
                 </a:solidFill>
                 <a:latin typeface="Arial"/>
               </a:rPr>
-              <a:t>Use Case Diagram</a:t>
+              <a:t>ERD?</a:t>
             </a:r>
             <a:endParaRPr b="0" lang="en-US" sz="4400" spc="-1" strike="noStrike">
               <a:latin typeface="Arial"/>
@@ -4860,7 +6217,7 @@
       </p:sp>
       <p:pic>
         <p:nvPicPr>
-          <p:cNvPr id="73" name="" descr=""/>
+          <p:cNvPr id="77" name="" descr=""/>
           <p:cNvPicPr/>
           <p:nvPr/>
         </p:nvPicPr>
@@ -4870,8 +6227,8 @@
         </p:blipFill>
         <p:spPr>
           <a:xfrm>
-            <a:off x="777600" y="680400"/>
-            <a:ext cx="8823240" cy="4962960"/>
+            <a:off x="1256040" y="1509840"/>
+            <a:ext cx="7887960" cy="3290760"/>
           </a:xfrm>
           <a:prstGeom prst="rect">
             <a:avLst/>
@@ -4913,7 +6270,7 @@
       </p:grpSpPr>
       <p:sp>
         <p:nvSpPr>
-          <p:cNvPr id="74" name="PlaceHolder 1"/>
+          <p:cNvPr id="78" name="PlaceHolder 1"/>
           <p:cNvSpPr>
             <a:spLocks noGrp="1"/>
           </p:cNvSpPr>
@@ -4923,8 +6280,8 @@
         </p:nvSpPr>
         <p:spPr>
           <a:xfrm>
-            <a:off x="540000" y="139680"/>
-            <a:ext cx="8998560" cy="1249200"/>
+            <a:off x="531000" y="197640"/>
+            <a:ext cx="9069840" cy="945000"/>
           </a:xfrm>
           <a:prstGeom prst="rect">
             <a:avLst/>
@@ -4952,7 +6309,7 @@
                 </a:solidFill>
                 <a:latin typeface="Arial"/>
               </a:rPr>
-              <a:t>Talk about what did not go well</a:t>
+              <a:t>Gantt chart</a:t>
             </a:r>
             <a:endParaRPr b="0" lang="en-US" sz="4400" spc="-1" strike="noStrike">
               <a:latin typeface="Arial"/>
@@ -4960,70 +6317,29 @@
           </a:p>
         </p:txBody>
       </p:sp>
-      <p:sp>
-        <p:nvSpPr>
-          <p:cNvPr id="75" name="PlaceHolder 2"/>
-          <p:cNvSpPr>
-            <a:spLocks noGrp="1"/>
-          </p:cNvSpPr>
-          <p:nvPr>
-            <p:ph/>
-          </p:nvPr>
-        </p:nvSpPr>
-        <p:spPr>
-          <a:xfrm>
-            <a:off x="504000" y="1326600"/>
-            <a:ext cx="9070920" cy="3287520"/>
-          </a:xfrm>
-          <a:prstGeom prst="rect">
-            <a:avLst/>
-          </a:prstGeom>
-          <a:noFill/>
-          <a:ln w="0">
-            <a:noFill/>
-          </a:ln>
-        </p:spPr>
-        <p:txBody>
-          <a:bodyPr lIns="0" rIns="0" tIns="0" bIns="0" anchor="t">
-            <a:normAutofit/>
-          </a:bodyPr>
-          <a:p>
-            <a:pPr marL="432000" indent="-324000">
-              <a:lnSpc>
-                <a:spcPct val="100000"/>
-              </a:lnSpc>
-              <a:buClr>
-                <a:srgbClr val="000000"/>
-              </a:buClr>
-              <a:buFont typeface="Wingdings" charset="2"/>
-              <a:buChar char=""/>
-            </a:pPr>
-            <a:r>
-              <a:rPr b="0" lang="en-US" sz="1800" spc="-1" strike="noStrike">
-                <a:solidFill>
-                  <a:srgbClr val="ffffff"/>
-                </a:solidFill>
-                <a:latin typeface="Arial"/>
-              </a:rPr>
-              <a:t>Front-End?</a:t>
-            </a:r>
-            <a:endParaRPr b="0" lang="en-US" sz="1800" spc="-1" strike="noStrike">
-              <a:latin typeface="Arial"/>
-            </a:endParaRPr>
-          </a:p>
-          <a:p>
-            <a:pPr>
-              <a:lnSpc>
-                <a:spcPct val="100000"/>
-              </a:lnSpc>
-              <a:buNone/>
-            </a:pPr>
-            <a:endParaRPr b="0" lang="en-US" sz="1800" spc="-1" strike="noStrike">
-              <a:latin typeface="Arial"/>
-            </a:endParaRPr>
-          </a:p>
-        </p:txBody>
-      </p:sp>
+      <p:pic>
+        <p:nvPicPr>
+          <p:cNvPr id="79" name="" descr=""/>
+          <p:cNvPicPr/>
+          <p:nvPr/>
+        </p:nvPicPr>
+        <p:blipFill>
+          <a:blip r:embed="rId1"/>
+          <a:stretch/>
+        </p:blipFill>
+        <p:spPr>
+          <a:xfrm>
+            <a:off x="4320" y="1337760"/>
+            <a:ext cx="10080000" cy="2988000"/>
+          </a:xfrm>
+          <a:prstGeom prst="rect">
+            <a:avLst/>
+          </a:prstGeom>
+          <a:ln w="0">
+            <a:noFill/>
+          </a:ln>
+        </p:spPr>
+      </p:pic>
     </p:spTree>
   </p:cSld>
   <mc:AlternateContent>

</xml_diff>

<commit_message>
finalized genral outline of pres?
</commit_message>
<xml_diff>
--- a/Pres.pptx
+++ b/Pres.pptx
@@ -20,6 +20,8 @@
     <p:sldId id="268" r:id="rId15"/>
     <p:sldId id="269" r:id="rId16"/>
     <p:sldId id="270" r:id="rId17"/>
+    <p:sldId id="271" r:id="rId18"/>
+    <p:sldId id="272" r:id="rId19"/>
   </p:sldIdLst>
   <p:sldSz cx="10080625" cy="5670550"/>
   <p:notesSz cx="7559675" cy="10691813"/>
@@ -77,7 +79,7 @@
         <p:txBody>
           <a:bodyPr/>
           <a:p>
-            <a:fld id="{A0797950-1CCD-4D8E-BF44-15E3A778D523}" type="slidenum">
+            <a:fld id="{8B24E4B5-66A1-435C-836F-ED8E97BE7DD1}" type="slidenum">
               <a:t>&lt;#&gt;</a:t>
             </a:fld>
           </a:p>
@@ -271,7 +273,7 @@
         <p:txBody>
           <a:bodyPr/>
           <a:p>
-            <a:fld id="{60E8AF3F-B5CD-44A0-99F8-49B35702040A}" type="slidenum">
+            <a:fld id="{E2DF7EB4-BA8A-469E-9DE4-42791DA6AF69}" type="slidenum">
               <a:t>&lt;#&gt;</a:t>
             </a:fld>
           </a:p>
@@ -539,7 +541,7 @@
         <p:txBody>
           <a:bodyPr/>
           <a:p>
-            <a:fld id="{45C5DF6E-A76C-4425-B043-D48D562D2A0B}" type="slidenum">
+            <a:fld id="{CA57EF88-5939-408F-A004-C6D1AD2913CA}" type="slidenum">
               <a:t>&lt;#&gt;</a:t>
             </a:fld>
           </a:p>
@@ -881,7 +883,7 @@
         <p:txBody>
           <a:bodyPr/>
           <a:p>
-            <a:fld id="{85680409-3622-46D6-BB2D-6F3D6F72B71E}" type="slidenum">
+            <a:fld id="{2885B67D-4BE4-4EC2-8981-523184707A14}" type="slidenum">
               <a:t>&lt;#&gt;</a:t>
             </a:fld>
           </a:p>
@@ -1035,7 +1037,7 @@
         <p:txBody>
           <a:bodyPr/>
           <a:p>
-            <a:fld id="{1E2AD819-A9C5-4C30-A65C-3D03DDC2709D}" type="slidenum">
+            <a:fld id="{4EB53086-3B8C-4684-94BC-A4388F08B97A}" type="slidenum">
               <a:t>&lt;#&gt;</a:t>
             </a:fld>
           </a:p>
@@ -1192,7 +1194,7 @@
         <p:txBody>
           <a:bodyPr/>
           <a:p>
-            <a:fld id="{85EC7235-D7D0-4AEA-BB16-12EB748D4BA3}" type="slidenum">
+            <a:fld id="{FF0A5F09-CFA4-4479-A17F-13BB357FC318}" type="slidenum">
               <a:t>&lt;#&gt;</a:t>
             </a:fld>
           </a:p>
@@ -1386,7 +1388,7 @@
         <p:txBody>
           <a:bodyPr/>
           <a:p>
-            <a:fld id="{09508BBD-BA9F-452B-93A9-3AC89E107571}" type="slidenum">
+            <a:fld id="{277C8F56-9F1D-42EB-8E9A-D8F9B407D14D}" type="slidenum">
               <a:t>&lt;#&gt;</a:t>
             </a:fld>
           </a:p>
@@ -1506,7 +1508,7 @@
         <p:txBody>
           <a:bodyPr/>
           <a:p>
-            <a:fld id="{1759758E-1B30-47E3-BE72-F95510B48638}" type="slidenum">
+            <a:fld id="{B9F86654-BEFC-4AC3-ABC5-0EFA862350B2}" type="slidenum">
               <a:t>&lt;#&gt;</a:t>
             </a:fld>
           </a:p>
@@ -1623,7 +1625,7 @@
         <p:txBody>
           <a:bodyPr/>
           <a:p>
-            <a:fld id="{69566389-F2B1-40D9-8C69-9E23BE2A33E0}" type="slidenum">
+            <a:fld id="{5BC3A444-F634-44BE-93C2-DD2487AE53C0}" type="slidenum">
               <a:t>&lt;#&gt;</a:t>
             </a:fld>
           </a:p>
@@ -1854,7 +1856,7 @@
         <p:txBody>
           <a:bodyPr/>
           <a:p>
-            <a:fld id="{E358E313-2DFB-4C4F-9BA0-E519CB6B6C20}" type="slidenum">
+            <a:fld id="{DDEBA5A9-5A9A-41E7-B208-7A0F883A7B08}" type="slidenum">
               <a:t>&lt;#&gt;</a:t>
             </a:fld>
           </a:p>
@@ -2085,7 +2087,7 @@
         <p:txBody>
           <a:bodyPr/>
           <a:p>
-            <a:fld id="{EE4A6721-C2DF-46F8-AD63-A5624365EF86}" type="slidenum">
+            <a:fld id="{9C30BA0F-4A97-4870-80EE-7107285E48C2}" type="slidenum">
               <a:t>&lt;#&gt;</a:t>
             </a:fld>
           </a:p>
@@ -2316,7 +2318,7 @@
         <p:txBody>
           <a:bodyPr/>
           <a:p>
-            <a:fld id="{6055937B-F078-4BF4-A9DB-FF66B9BB7FD0}" type="slidenum">
+            <a:fld id="{A8DA74EC-C3D6-408F-858B-B46E7DBC1521}" type="slidenum">
               <a:t>&lt;#&gt;</a:t>
             </a:fld>
           </a:p>
@@ -2842,7 +2844,7 @@
               </a:lnSpc>
               <a:buNone/>
             </a:pPr>
-            <a:fld id="{B72329F8-E8A3-4DC5-89C6-2C47ECF7F69B}" type="slidenum">
+            <a:fld id="{7A746B8B-5D51-4B20-B3F1-8D16318C4F2C}" type="slidenum">
               <a:rPr b="0" lang="en-US" sz="1400" spc="-1" strike="noStrike">
                 <a:solidFill>
                   <a:srgbClr val="ffffff"/>
@@ -3248,7 +3250,16 @@
                 </a:solidFill>
                 <a:latin typeface="Arial"/>
               </a:rPr>
-              <a:t>Contacts Connect</a:t>
+              <a:t>Contacts </a:t>
+            </a:r>
+            <a:r>
+              <a:rPr b="0" lang="en-US" sz="3300" spc="-1" strike="noStrike">
+                <a:solidFill>
+                  <a:srgbClr val="ffffff"/>
+                </a:solidFill>
+                <a:latin typeface="Arial"/>
+              </a:rPr>
+              <a:t>Connect</a:t>
             </a:r>
             <a:endParaRPr b="0" lang="en-US" sz="3300" spc="-1" strike="noStrike">
               <a:latin typeface="Arial"/>
@@ -3311,18 +3322,14 @@
       </p:grpSpPr>
       <p:sp>
         <p:nvSpPr>
-          <p:cNvPr id="80" name="PlaceHolder 1"/>
-          <p:cNvSpPr>
-            <a:spLocks noGrp="1"/>
-          </p:cNvSpPr>
-          <p:nvPr>
-            <p:ph type="title"/>
-          </p:nvPr>
-        </p:nvSpPr>
-        <p:spPr>
-          <a:xfrm>
-            <a:off x="504000" y="-228600"/>
-            <a:ext cx="9069840" cy="1142280"/>
+          <p:cNvPr id="80" name="PlaceHolder 3"/>
+          <p:cNvSpPr txBox="1"/>
+          <p:nvPr/>
+        </p:nvSpPr>
+        <p:spPr>
+          <a:xfrm>
+            <a:off x="457200" y="197640"/>
+            <a:ext cx="9069840" cy="945000"/>
           </a:xfrm>
           <a:prstGeom prst="rect">
             <a:avLst/>
@@ -3350,34 +3357,7 @@
                 </a:solidFill>
                 <a:latin typeface="Arial"/>
               </a:rPr>
-              <a:t>Use </a:t>
-            </a:r>
-            <a:r>
-              <a:rPr b="0" lang="en-US" sz="4400" spc="-1" strike="noStrike">
-                <a:solidFill>
-                  <a:srgbClr val="ffffff"/>
-                </a:solidFill>
-                <a:latin typeface="Arial"/>
-              </a:rPr>
-              <a:t>Case </a:t>
-            </a:r>
-            <a:r>
-              <a:rPr b="0" lang="en-US" sz="4400" spc="-1" strike="noStrike">
-                <a:solidFill>
-                  <a:srgbClr val="ffffff"/>
-                </a:solidFill>
-                <a:latin typeface="Arial"/>
-              </a:rPr>
-              <a:t>Diagr</a:t>
-            </a:r>
-            <a:r>
-              <a:rPr b="0" lang="en-US" sz="4400" spc="-1" strike="noStrike">
-                <a:solidFill>
-                  <a:srgbClr val="ffffff"/>
-                </a:solidFill>
-                <a:latin typeface="Arial"/>
-              </a:rPr>
-              <a:t>am</a:t>
+              <a:t>ERD?</a:t>
             </a:r>
             <a:endParaRPr b="0" lang="en-US" sz="4400" spc="-1" strike="noStrike">
               <a:latin typeface="Arial"/>
@@ -3397,8 +3377,8 @@
         </p:blipFill>
         <p:spPr>
           <a:xfrm>
-            <a:off x="777600" y="680400"/>
-            <a:ext cx="8822880" cy="4962600"/>
+            <a:off x="1256040" y="1509840"/>
+            <a:ext cx="7887960" cy="3290760"/>
           </a:xfrm>
           <a:prstGeom prst="rect">
             <a:avLst/>
@@ -3450,8 +3430,8 @@
         </p:nvSpPr>
         <p:spPr>
           <a:xfrm>
-            <a:off x="540000" y="139680"/>
-            <a:ext cx="8998200" cy="1248840"/>
+            <a:off x="531000" y="197640"/>
+            <a:ext cx="9069840" cy="945000"/>
           </a:xfrm>
           <a:prstGeom prst="rect">
             <a:avLst/>
@@ -3479,7 +3459,34 @@
                 </a:solidFill>
                 <a:latin typeface="Arial"/>
               </a:rPr>
-              <a:t>Talk about what did not go well</a:t>
+              <a:t>Gan</a:t>
+            </a:r>
+            <a:r>
+              <a:rPr b="0" lang="en-US" sz="4400" spc="-1" strike="noStrike">
+                <a:solidFill>
+                  <a:srgbClr val="ffffff"/>
+                </a:solidFill>
+                <a:latin typeface="Arial"/>
+              </a:rPr>
+              <a:t>tt </a:t>
+            </a:r>
+            <a:r>
+              <a:rPr b="0" lang="en-US" sz="4400" spc="-1" strike="noStrike">
+                <a:solidFill>
+                  <a:srgbClr val="ffffff"/>
+                </a:solidFill>
+                <a:latin typeface="Arial"/>
+              </a:rPr>
+              <a:t>char</a:t>
+            </a:r>
+            <a:r>
+              <a:rPr b="0" lang="en-US" sz="4400" spc="-1" strike="noStrike">
+                <a:solidFill>
+                  <a:srgbClr val="ffffff"/>
+                </a:solidFill>
+                <a:latin typeface="Arial"/>
+              </a:rPr>
+              <a:t>t</a:t>
             </a:r>
             <a:endParaRPr b="0" lang="en-US" sz="4400" spc="-1" strike="noStrike">
               <a:latin typeface="Arial"/>
@@ -3487,157 +3494,29 @@
           </a:p>
         </p:txBody>
       </p:sp>
-      <p:sp>
-        <p:nvSpPr>
-          <p:cNvPr id="83" name="PlaceHolder 2"/>
-          <p:cNvSpPr>
-            <a:spLocks noGrp="1"/>
-          </p:cNvSpPr>
-          <p:nvPr>
-            <p:ph/>
-          </p:nvPr>
-        </p:nvSpPr>
-        <p:spPr>
-          <a:xfrm>
-            <a:off x="504000" y="1326600"/>
-            <a:ext cx="9070560" cy="3287160"/>
-          </a:xfrm>
-          <a:prstGeom prst="rect">
-            <a:avLst/>
-          </a:prstGeom>
-          <a:noFill/>
-          <a:ln w="0">
-            <a:noFill/>
-          </a:ln>
-        </p:spPr>
-        <p:txBody>
-          <a:bodyPr lIns="0" rIns="0" tIns="0" bIns="0" anchor="t">
-            <a:normAutofit/>
-          </a:bodyPr>
-          <a:p>
-            <a:pPr marL="432000" indent="-324000">
-              <a:lnSpc>
-                <a:spcPct val="100000"/>
-              </a:lnSpc>
-              <a:buClr>
-                <a:srgbClr val="000000"/>
-              </a:buClr>
-              <a:buFont typeface="Wingdings" charset="2"/>
-              <a:buChar char=""/>
-            </a:pPr>
-            <a:r>
-              <a:rPr b="0" lang="en-US" sz="1800" spc="-1" strike="noStrike">
-                <a:solidFill>
-                  <a:srgbClr val="ffffff"/>
-                </a:solidFill>
-                <a:latin typeface="Arial"/>
-              </a:rPr>
-              <a:t>Adoption of new languages (PHP, CSS &amp; JS)</a:t>
-            </a:r>
-            <a:endParaRPr b="0" lang="en-US" sz="1800" spc="-1" strike="noStrike">
-              <a:solidFill>
-                <a:srgbClr val="ffffff"/>
-              </a:solidFill>
-              <a:latin typeface="Arial"/>
-            </a:endParaRPr>
-          </a:p>
-          <a:p>
-            <a:pPr marL="432000" indent="-324000">
-              <a:lnSpc>
-                <a:spcPct val="100000"/>
-              </a:lnSpc>
-              <a:buClr>
-                <a:srgbClr val="000000"/>
-              </a:buClr>
-              <a:buFont typeface="Wingdings" charset="2"/>
-              <a:buChar char=""/>
-            </a:pPr>
-            <a:r>
-              <a:rPr b="0" lang="en-US" sz="1800" spc="-1" strike="noStrike">
-                <a:solidFill>
-                  <a:srgbClr val="ffffff"/>
-                </a:solidFill>
-                <a:latin typeface="Arial"/>
-              </a:rPr>
-              <a:t>Working in a real team with task-dependencies</a:t>
-            </a:r>
-            <a:endParaRPr b="0" lang="en-US" sz="1800" spc="-1" strike="noStrike">
-              <a:solidFill>
-                <a:srgbClr val="ffffff"/>
-              </a:solidFill>
-              <a:latin typeface="Arial"/>
-            </a:endParaRPr>
-          </a:p>
-          <a:p>
-            <a:pPr marL="432000" indent="-324000">
-              <a:lnSpc>
-                <a:spcPct val="100000"/>
-              </a:lnSpc>
-              <a:buClr>
-                <a:srgbClr val="000000"/>
-              </a:buClr>
-              <a:buFont typeface="Wingdings" charset="2"/>
-              <a:buChar char=""/>
-            </a:pPr>
-            <a:r>
-              <a:rPr b="0" lang="en-US" sz="1800" spc="-1" strike="noStrike">
-                <a:solidFill>
-                  <a:srgbClr val="ffffff"/>
-                </a:solidFill>
-                <a:latin typeface="Arial"/>
-              </a:rPr>
-              <a:t>Scheduling and workflow (late start, slow-start)</a:t>
-            </a:r>
-            <a:endParaRPr b="0" lang="en-US" sz="1800" spc="-1" strike="noStrike">
-              <a:solidFill>
-                <a:srgbClr val="ffffff"/>
-              </a:solidFill>
-              <a:latin typeface="Arial"/>
-            </a:endParaRPr>
-          </a:p>
-          <a:p>
-            <a:pPr marL="432000" indent="-324000">
-              <a:lnSpc>
-                <a:spcPct val="100000"/>
-              </a:lnSpc>
-              <a:buClr>
-                <a:srgbClr val="000000"/>
-              </a:buClr>
-              <a:buFont typeface="Wingdings" charset="2"/>
-              <a:buChar char=""/>
-            </a:pPr>
-            <a:r>
-              <a:rPr b="0" lang="en-US" sz="1800" spc="-1" strike="noStrike">
-                <a:solidFill>
-                  <a:srgbClr val="ffffff"/>
-                </a:solidFill>
-                <a:latin typeface="Arial"/>
-              </a:rPr>
-              <a:t> </a:t>
-            </a:r>
-            <a:endParaRPr b="0" lang="en-US" sz="1800" spc="-1" strike="noStrike">
-              <a:solidFill>
-                <a:srgbClr val="ffffff"/>
-              </a:solidFill>
-              <a:latin typeface="Arial"/>
-            </a:endParaRPr>
-          </a:p>
-          <a:p>
-            <a:pPr>
-              <a:lnSpc>
-                <a:spcPct val="100000"/>
-              </a:lnSpc>
-              <a:buNone/>
-            </a:pPr>
-            <a:endParaRPr b="0" lang="en-US" sz="1800" spc="-1" strike="noStrike">
-              <a:solidFill>
-                <a:srgbClr val="ffffff"/>
-              </a:solidFill>
-              <a:latin typeface="Arial"/>
-            </a:endParaRPr>
-          </a:p>
-        </p:txBody>
-      </p:sp>
+      <p:pic>
+        <p:nvPicPr>
+          <p:cNvPr id="83" name="" descr=""/>
+          <p:cNvPicPr/>
+          <p:nvPr/>
+        </p:nvPicPr>
+        <p:blipFill>
+          <a:blip r:embed="rId1"/>
+          <a:stretch/>
+        </p:blipFill>
+        <p:spPr>
+          <a:xfrm>
+            <a:off x="4320" y="1337760"/>
+            <a:ext cx="10080000" cy="2988000"/>
+          </a:xfrm>
+          <a:prstGeom prst="rect">
+            <a:avLst/>
+          </a:prstGeom>
+          <a:ln w="0">
+            <a:noFill/>
+          </a:ln>
+        </p:spPr>
+      </p:pic>
     </p:spTree>
   </p:cSld>
   <mc:AlternateContent>
@@ -3680,8 +3559,8 @@
         </p:nvSpPr>
         <p:spPr>
           <a:xfrm>
-            <a:off x="540000" y="139680"/>
-            <a:ext cx="8998200" cy="1248840"/>
+            <a:off x="504000" y="-228600"/>
+            <a:ext cx="9069840" cy="1142280"/>
           </a:xfrm>
           <a:prstGeom prst="rect">
             <a:avLst/>
@@ -3709,7 +3588,7 @@
                 </a:solidFill>
                 <a:latin typeface="Arial"/>
               </a:rPr>
-              <a:t>Talk about what went well </a:t>
+              <a:t>Use Case Diagram</a:t>
             </a:r>
             <a:endParaRPr b="0" lang="en-US" sz="4400" spc="-1" strike="noStrike">
               <a:latin typeface="Arial"/>
@@ -3717,89 +3596,29 @@
           </a:p>
         </p:txBody>
       </p:sp>
-      <p:sp>
-        <p:nvSpPr>
-          <p:cNvPr id="85" name="PlaceHolder 2"/>
-          <p:cNvSpPr>
-            <a:spLocks noGrp="1"/>
-          </p:cNvSpPr>
-          <p:nvPr>
-            <p:ph/>
-          </p:nvPr>
-        </p:nvSpPr>
-        <p:spPr>
-          <a:xfrm>
-            <a:off x="504000" y="1326600"/>
-            <a:ext cx="9070560" cy="3287160"/>
-          </a:xfrm>
-          <a:prstGeom prst="rect">
-            <a:avLst/>
-          </a:prstGeom>
-          <a:noFill/>
-          <a:ln w="0">
-            <a:noFill/>
-          </a:ln>
-        </p:spPr>
-        <p:txBody>
-          <a:bodyPr lIns="0" rIns="0" tIns="0" bIns="0" anchor="t">
-            <a:normAutofit/>
-          </a:bodyPr>
-          <a:p>
-            <a:pPr marL="432000" indent="-324000">
-              <a:lnSpc>
-                <a:spcPct val="100000"/>
-              </a:lnSpc>
-              <a:buClr>
-                <a:srgbClr val="000000"/>
-              </a:buClr>
-              <a:buFont typeface="Wingdings" charset="2"/>
-              <a:buChar char=""/>
-            </a:pPr>
-            <a:r>
-              <a:rPr b="0" lang="en-US" sz="1800" spc="-1" strike="noStrike">
-                <a:solidFill>
-                  <a:srgbClr val="ffffff"/>
-                </a:solidFill>
-                <a:latin typeface="Arial"/>
-              </a:rPr>
-              <a:t>Communication was solid</a:t>
-            </a:r>
-            <a:endParaRPr b="0" lang="en-US" sz="1800" spc="-1" strike="noStrike">
-              <a:solidFill>
-                <a:srgbClr val="ffffff"/>
-              </a:solidFill>
-              <a:latin typeface="Arial"/>
-            </a:endParaRPr>
-          </a:p>
-          <a:p>
-            <a:pPr marL="432000" indent="-324000">
-              <a:lnSpc>
-                <a:spcPct val="100000"/>
-              </a:lnSpc>
-              <a:buClr>
-                <a:srgbClr val="000000"/>
-              </a:buClr>
-              <a:buFont typeface="Wingdings" charset="2"/>
-              <a:buChar char=""/>
-            </a:pPr>
-            <a:r>
-              <a:rPr b="0" lang="en-US" sz="1800" spc="-1" strike="noStrike">
-                <a:solidFill>
-                  <a:srgbClr val="ffffff"/>
-                </a:solidFill>
-                <a:latin typeface="Arial"/>
-              </a:rPr>
-              <a:t>No conflicts between teammates</a:t>
-            </a:r>
-            <a:endParaRPr b="0" lang="en-US" sz="1800" spc="-1" strike="noStrike">
-              <a:solidFill>
-                <a:srgbClr val="ffffff"/>
-              </a:solidFill>
-              <a:latin typeface="Arial"/>
-            </a:endParaRPr>
-          </a:p>
-        </p:txBody>
-      </p:sp>
+      <p:pic>
+        <p:nvPicPr>
+          <p:cNvPr id="85" name="" descr=""/>
+          <p:cNvPicPr/>
+          <p:nvPr/>
+        </p:nvPicPr>
+        <p:blipFill>
+          <a:blip r:embed="rId1"/>
+          <a:stretch/>
+        </p:blipFill>
+        <p:spPr>
+          <a:xfrm>
+            <a:off x="777600" y="680400"/>
+            <a:ext cx="8822880" cy="4962600"/>
+          </a:xfrm>
+          <a:prstGeom prst="rect">
+            <a:avLst/>
+          </a:prstGeom>
+          <a:ln w="0">
+            <a:noFill/>
+          </a:ln>
+        </p:spPr>
+      </p:pic>
     </p:spTree>
   </p:cSld>
   <mc:AlternateContent>
@@ -3871,7 +3690,7 @@
                 </a:solidFill>
                 <a:latin typeface="Arial"/>
               </a:rPr>
-              <a:t>API demonstration</a:t>
+              <a:t>Color Palette</a:t>
             </a:r>
             <a:endParaRPr b="0" lang="en-US" sz="4400" spc="-1" strike="noStrike">
               <a:latin typeface="Arial"/>
@@ -3924,7 +3743,7 @@
                 </a:solidFill>
                 <a:latin typeface="Arial"/>
               </a:rPr>
-              <a:t>[ADD SWAGGERHUB LINK]</a:t>
+              <a:t>[INSERT COLORS]</a:t>
             </a:r>
             <a:endParaRPr b="0" lang="en-US" sz="1800" spc="-1" strike="noStrike">
               <a:solidFill>
@@ -4006,7 +3825,7 @@
                 </a:solidFill>
                 <a:latin typeface="Arial"/>
               </a:rPr>
-              <a:t>App Demonstration</a:t>
+              <a:t>API demonstration</a:t>
             </a:r>
             <a:endParaRPr b="0" lang="en-US" sz="4400" spc="-1" strike="noStrike">
               <a:latin typeface="Arial"/>
@@ -4026,8 +3845,8 @@
         </p:nvSpPr>
         <p:spPr>
           <a:xfrm>
-            <a:off x="2514600" y="2514600"/>
-            <a:ext cx="5211000" cy="730800"/>
+            <a:off x="504000" y="1326600"/>
+            <a:ext cx="9070560" cy="3287160"/>
           </a:xfrm>
           <a:prstGeom prst="rect">
             <a:avLst/>
@@ -4042,61 +3861,26 @@
             <a:normAutofit/>
           </a:bodyPr>
           <a:p>
-            <a:pPr marL="216000" indent="-216000">
-              <a:spcBef>
-                <a:spcPts val="1414"/>
-              </a:spcBef>
-              <a:buSzPct val="100000"/>
-              <a:buBlip>
-                <a:blip r:embed="rId1"/>
-              </a:buBlip>
-            </a:pPr>
-            <a:r>
-              <a:rPr b="0" lang="en-US" sz="3200" spc="-1" strike="noStrike">
-                <a:solidFill>
-                  <a:srgbClr val="ffffff"/>
-                </a:solidFill>
-                <a:latin typeface="Arial"/>
-                <a:hlinkClick r:id="rId2"/>
-              </a:rPr>
-              <a:t>http://thisisforourclass.xyz/</a:t>
-            </a:r>
-            <a:r>
-              <a:rPr b="0" lang="en-US" sz="3200" spc="-1" strike="noStrike">
-                <a:solidFill>
-                  <a:srgbClr val="ffffff"/>
-                </a:solidFill>
-                <a:latin typeface="Arial"/>
-              </a:rPr>
-              <a:t> </a:t>
-            </a:r>
-            <a:endParaRPr b="0" lang="en-US" sz="3200" spc="-1" strike="noStrike">
-              <a:solidFill>
+            <a:pPr indent="-324000">
+              <a:lnSpc>
+                <a:spcPct val="100000"/>
+              </a:lnSpc>
+              <a:buClr>
                 <a:srgbClr val="ffffff"/>
-              </a:solidFill>
-              <a:latin typeface="Arial"/>
-            </a:endParaRPr>
-          </a:p>
-          <a:p>
-            <a:pPr marL="216000" indent="-216000">
-              <a:spcBef>
-                <a:spcPts val="1414"/>
-              </a:spcBef>
-              <a:buSzPct val="100000"/>
-              <a:buBlip>
-                <a:blip r:embed="rId3"/>
-              </a:buBlip>
-            </a:pPr>
-            <a:r>
-              <a:rPr b="0" lang="en-US" sz="3200" spc="-1" strike="noStrike">
-                <a:solidFill>
-                  <a:srgbClr val="ffffff"/>
-                </a:solidFill>
-                <a:latin typeface="Arial"/>
-              </a:rPr>
-              <a:t> </a:t>
-            </a:r>
-            <a:endParaRPr b="0" lang="en-US" sz="3200" spc="-1" strike="noStrike">
+              </a:buClr>
+              <a:buFont typeface="Wingdings" charset="2"/>
+              <a:buChar char=""/>
+            </a:pPr>
+            <a:r>
+              <a:rPr b="0" lang="en-US" sz="1800" spc="-1" strike="noStrike">
+                <a:solidFill>
+                  <a:srgbClr val="ffffff"/>
+                </a:solidFill>
+                <a:latin typeface="Arial"/>
+              </a:rPr>
+              <a:t>[ADD SWAGGERHUB LINK]</a:t>
+            </a:r>
+            <a:endParaRPr b="0" lang="en-US" sz="1800" spc="-1" strike="noStrike">
               <a:solidFill>
                 <a:srgbClr val="ffffff"/>
               </a:solidFill>
@@ -4147,7 +3931,7 @@
         </p:nvSpPr>
         <p:spPr>
           <a:xfrm>
-            <a:off x="457200" y="685800"/>
+            <a:off x="540000" y="139680"/>
             <a:ext cx="8998200" cy="1248840"/>
           </a:xfrm>
           <a:prstGeom prst="rect">
@@ -4176,6 +3960,311 @@
                 </a:solidFill>
                 <a:latin typeface="Arial"/>
               </a:rPr>
+              <a:t>App Demonstration</a:t>
+            </a:r>
+            <a:endParaRPr b="0" lang="en-US" sz="4400" spc="-1" strike="noStrike">
+              <a:latin typeface="Arial"/>
+            </a:endParaRPr>
+          </a:p>
+        </p:txBody>
+      </p:sp>
+      <p:sp>
+        <p:nvSpPr>
+          <p:cNvPr id="91" name="PlaceHolder 2"/>
+          <p:cNvSpPr>
+            <a:spLocks noGrp="1"/>
+          </p:cNvSpPr>
+          <p:nvPr>
+            <p:ph/>
+          </p:nvPr>
+        </p:nvSpPr>
+        <p:spPr>
+          <a:xfrm>
+            <a:off x="2514600" y="2514600"/>
+            <a:ext cx="5211000" cy="730800"/>
+          </a:xfrm>
+          <a:prstGeom prst="rect">
+            <a:avLst/>
+          </a:prstGeom>
+          <a:noFill/>
+          <a:ln w="0">
+            <a:noFill/>
+          </a:ln>
+        </p:spPr>
+        <p:txBody>
+          <a:bodyPr lIns="0" rIns="0" tIns="0" bIns="0" anchor="t">
+            <a:normAutofit/>
+          </a:bodyPr>
+          <a:p>
+            <a:pPr marL="216000" indent="-216000">
+              <a:spcBef>
+                <a:spcPts val="1414"/>
+              </a:spcBef>
+              <a:buSzPct val="100000"/>
+              <a:buBlip>
+                <a:blip r:embed="rId1"/>
+              </a:buBlip>
+            </a:pPr>
+            <a:r>
+              <a:rPr b="0" lang="en-US" sz="3200" spc="-1" strike="noStrike">
+                <a:solidFill>
+                  <a:srgbClr val="ffffff"/>
+                </a:solidFill>
+                <a:latin typeface="Arial"/>
+                <a:hlinkClick r:id="rId2"/>
+              </a:rPr>
+              <a:t>http://thisisforourclass.xyz/</a:t>
+            </a:r>
+            <a:r>
+              <a:rPr b="0" lang="en-US" sz="3200" spc="-1" strike="noStrike">
+                <a:solidFill>
+                  <a:srgbClr val="ffffff"/>
+                </a:solidFill>
+                <a:latin typeface="Arial"/>
+              </a:rPr>
+              <a:t> </a:t>
+            </a:r>
+            <a:endParaRPr b="0" lang="en-US" sz="3200" spc="-1" strike="noStrike">
+              <a:solidFill>
+                <a:srgbClr val="ffffff"/>
+              </a:solidFill>
+              <a:latin typeface="Arial"/>
+            </a:endParaRPr>
+          </a:p>
+          <a:p>
+            <a:pPr marL="216000" indent="-216000">
+              <a:spcBef>
+                <a:spcPts val="1414"/>
+              </a:spcBef>
+              <a:buSzPct val="100000"/>
+              <a:buBlip>
+                <a:blip r:embed="rId3"/>
+              </a:buBlip>
+            </a:pPr>
+            <a:r>
+              <a:rPr b="0" lang="en-US" sz="3200" spc="-1" strike="noStrike">
+                <a:solidFill>
+                  <a:srgbClr val="ffffff"/>
+                </a:solidFill>
+                <a:latin typeface="Arial"/>
+              </a:rPr>
+              <a:t> </a:t>
+            </a:r>
+            <a:endParaRPr b="0" lang="en-US" sz="3200" spc="-1" strike="noStrike">
+              <a:solidFill>
+                <a:srgbClr val="ffffff"/>
+              </a:solidFill>
+              <a:latin typeface="Arial"/>
+            </a:endParaRPr>
+          </a:p>
+        </p:txBody>
+      </p:sp>
+    </p:spTree>
+  </p:cSld>
+  <mc:AlternateContent>
+    <mc:Choice Requires="p14">
+      <p:transition spd="slow" p14:dur="2000"/>
+    </mc:Choice>
+    <mc:Fallback>
+      <p:transition spd="slow"/>
+    </mc:Fallback>
+  </mc:AlternateContent>
+</p:sld>
+</file>
+
+<file path=ppt/slides/slide16.xml><?xml version="1.0" encoding="utf-8"?>
+<p:sld xmlns:a="http://schemas.openxmlformats.org/drawingml/2006/main" xmlns:p="http://schemas.openxmlformats.org/presentationml/2006/main" xmlns:r="http://schemas.openxmlformats.org/officeDocument/2006/relationships" xmlns:p14="http://schemas.microsoft.com/office/powerpoint/2010/main" xmlns:p15="http://schemas.microsoft.com/office/powerpoint/2012/main" xmlns:mc="http://schemas.openxmlformats.org/markup-compatibility/2006">
+  <p:cSld>
+    <p:spTree>
+      <p:nvGrpSpPr>
+        <p:cNvPr id="1" name=""/>
+        <p:cNvGrpSpPr/>
+        <p:nvPr/>
+      </p:nvGrpSpPr>
+      <p:grpSpPr>
+        <a:xfrm>
+          <a:off x="0" y="0"/>
+          <a:ext cx="0" cy="0"/>
+          <a:chOff x="0" y="0"/>
+          <a:chExt cx="0" cy="0"/>
+        </a:xfrm>
+      </p:grpSpPr>
+      <p:sp>
+        <p:nvSpPr>
+          <p:cNvPr id="92" name="PlaceHolder 1"/>
+          <p:cNvSpPr>
+            <a:spLocks noGrp="1"/>
+          </p:cNvSpPr>
+          <p:nvPr>
+            <p:ph type="title"/>
+          </p:nvPr>
+        </p:nvSpPr>
+        <p:spPr>
+          <a:xfrm>
+            <a:off x="540000" y="139680"/>
+            <a:ext cx="8998200" cy="1248840"/>
+          </a:xfrm>
+          <a:prstGeom prst="rect">
+            <a:avLst/>
+          </a:prstGeom>
+          <a:noFill/>
+          <a:ln w="0">
+            <a:noFill/>
+          </a:ln>
+        </p:spPr>
+        <p:txBody>
+          <a:bodyPr lIns="0" rIns="0" tIns="0" bIns="0" anchor="ctr">
+            <a:noAutofit/>
+          </a:bodyPr>
+          <a:p>
+            <a:pPr algn="ctr">
+              <a:lnSpc>
+                <a:spcPct val="100000"/>
+              </a:lnSpc>
+              <a:buNone/>
+            </a:pPr>
+            <a:r>
+              <a:rPr b="0" lang="en-US" sz="4400" spc="-1" strike="noStrike">
+                <a:solidFill>
+                  <a:srgbClr val="ffffff"/>
+                </a:solidFill>
+                <a:latin typeface="Arial"/>
+              </a:rPr>
+              <a:t>Accessibility</a:t>
+            </a:r>
+            <a:endParaRPr b="0" lang="en-US" sz="4400" spc="-1" strike="noStrike">
+              <a:latin typeface="Arial"/>
+            </a:endParaRPr>
+          </a:p>
+        </p:txBody>
+      </p:sp>
+      <p:sp>
+        <p:nvSpPr>
+          <p:cNvPr id="93" name="PlaceHolder 2"/>
+          <p:cNvSpPr>
+            <a:spLocks noGrp="1"/>
+          </p:cNvSpPr>
+          <p:nvPr>
+            <p:ph/>
+          </p:nvPr>
+        </p:nvSpPr>
+        <p:spPr>
+          <a:xfrm>
+            <a:off x="504000" y="1326600"/>
+            <a:ext cx="9070560" cy="3287160"/>
+          </a:xfrm>
+          <a:prstGeom prst="rect">
+            <a:avLst/>
+          </a:prstGeom>
+          <a:noFill/>
+          <a:ln w="0">
+            <a:noFill/>
+          </a:ln>
+        </p:spPr>
+        <p:txBody>
+          <a:bodyPr lIns="0" rIns="0" tIns="0" bIns="0" anchor="t">
+            <a:normAutofit/>
+          </a:bodyPr>
+          <a:p>
+            <a:pPr indent="-324000">
+              <a:lnSpc>
+                <a:spcPct val="100000"/>
+              </a:lnSpc>
+              <a:buClr>
+                <a:srgbClr val="ffffff"/>
+              </a:buClr>
+              <a:buFont typeface="Wingdings" charset="2"/>
+              <a:buChar char=""/>
+            </a:pPr>
+            <a:r>
+              <a:rPr b="0" lang="en-US" sz="1800" spc="-1" strike="noStrike">
+                <a:solidFill>
+                  <a:srgbClr val="ffffff"/>
+                </a:solidFill>
+                <a:latin typeface="Arial"/>
+              </a:rPr>
+              <a:t>GOOGLE LIGHTHOUSE</a:t>
+            </a:r>
+            <a:endParaRPr b="0" lang="en-US" sz="1800" spc="-1" strike="noStrike">
+              <a:solidFill>
+                <a:srgbClr val="ffffff"/>
+              </a:solidFill>
+              <a:latin typeface="Arial"/>
+            </a:endParaRPr>
+          </a:p>
+        </p:txBody>
+      </p:sp>
+    </p:spTree>
+  </p:cSld>
+  <mc:AlternateContent>
+    <mc:Choice Requires="p14">
+      <p:transition spd="slow" p14:dur="2000"/>
+    </mc:Choice>
+    <mc:Fallback>
+      <p:transition spd="slow"/>
+    </mc:Fallback>
+  </mc:AlternateContent>
+</p:sld>
+</file>
+
+<file path=ppt/slides/slide17.xml><?xml version="1.0" encoding="utf-8"?>
+<p:sld xmlns:a="http://schemas.openxmlformats.org/drawingml/2006/main" xmlns:p="http://schemas.openxmlformats.org/presentationml/2006/main" xmlns:r="http://schemas.openxmlformats.org/officeDocument/2006/relationships" xmlns:p14="http://schemas.microsoft.com/office/powerpoint/2010/main" xmlns:p15="http://schemas.microsoft.com/office/powerpoint/2012/main" xmlns:mc="http://schemas.openxmlformats.org/markup-compatibility/2006">
+  <p:cSld>
+    <p:spTree>
+      <p:nvGrpSpPr>
+        <p:cNvPr id="1" name=""/>
+        <p:cNvGrpSpPr/>
+        <p:nvPr/>
+      </p:nvGrpSpPr>
+      <p:grpSpPr>
+        <a:xfrm>
+          <a:off x="0" y="0"/>
+          <a:ext cx="0" cy="0"/>
+          <a:chOff x="0" y="0"/>
+          <a:chExt cx="0" cy="0"/>
+        </a:xfrm>
+      </p:grpSpPr>
+      <p:sp>
+        <p:nvSpPr>
+          <p:cNvPr id="94" name="PlaceHolder 1"/>
+          <p:cNvSpPr>
+            <a:spLocks noGrp="1"/>
+          </p:cNvSpPr>
+          <p:nvPr>
+            <p:ph type="title"/>
+          </p:nvPr>
+        </p:nvSpPr>
+        <p:spPr>
+          <a:xfrm>
+            <a:off x="457200" y="685800"/>
+            <a:ext cx="8998200" cy="1248840"/>
+          </a:xfrm>
+          <a:prstGeom prst="rect">
+            <a:avLst/>
+          </a:prstGeom>
+          <a:noFill/>
+          <a:ln w="0">
+            <a:noFill/>
+          </a:ln>
+        </p:spPr>
+        <p:txBody>
+          <a:bodyPr lIns="0" rIns="0" tIns="0" bIns="0" anchor="ctr">
+            <a:noAutofit/>
+          </a:bodyPr>
+          <a:p>
+            <a:pPr algn="ctr">
+              <a:lnSpc>
+                <a:spcPct val="100000"/>
+              </a:lnSpc>
+              <a:buNone/>
+            </a:pPr>
+            <a:r>
+              <a:rPr b="0" lang="en-US" sz="4400" spc="-1" strike="noStrike">
+                <a:solidFill>
+                  <a:srgbClr val="ffffff"/>
+                </a:solidFill>
+                <a:latin typeface="Arial"/>
+              </a:rPr>
               <a:t>Q&amp;A</a:t>
             </a:r>
             <a:endParaRPr b="0" lang="en-US" sz="4400" spc="-1" strike="noStrike">
@@ -4186,7 +4275,7 @@
       </p:sp>
       <p:sp>
         <p:nvSpPr>
-          <p:cNvPr id="91" name="PlaceHolder 2"/>
+          <p:cNvPr id="95" name="PlaceHolder 2"/>
           <p:cNvSpPr>
             <a:spLocks noGrp="1"/>
           </p:cNvSpPr>
@@ -5085,43 +5174,7 @@
                 </a:solidFill>
                 <a:latin typeface="Arial"/>
               </a:rPr>
-              <a:t>Techn</a:t>
-            </a:r>
-            <a:r>
-              <a:rPr b="0" lang="en-US" sz="4400" spc="-1" strike="noStrike">
-                <a:solidFill>
-                  <a:srgbClr val="ffffff"/>
-                </a:solidFill>
-                <a:latin typeface="Arial"/>
-              </a:rPr>
-              <a:t>ology </a:t>
-            </a:r>
-            <a:r>
-              <a:rPr b="0" lang="en-US" sz="4400" spc="-1" strike="noStrike">
-                <a:solidFill>
-                  <a:srgbClr val="ffffff"/>
-                </a:solidFill>
-                <a:latin typeface="Arial"/>
-              </a:rPr>
-              <a:t>Used - </a:t>
-            </a:r>
-            <a:r>
-              <a:rPr b="0" lang="en-US" sz="4400" spc="-1" strike="noStrike">
-                <a:solidFill>
-                  <a:srgbClr val="ffffff"/>
-                </a:solidFill>
-                <a:latin typeface="Arial"/>
-              </a:rPr>
-              <a:t>Creati</a:t>
-            </a:r>
-            <a:r>
-              <a:rPr b="0" lang="en-US" sz="4400" spc="-1" strike="noStrike">
-                <a:solidFill>
-                  <a:srgbClr val="ffffff"/>
-                </a:solidFill>
-                <a:latin typeface="Arial"/>
-              </a:rPr>
-              <a:t>on</a:t>
+              <a:t>Technology Used - Creation</a:t>
             </a:r>
             <a:endParaRPr b="0" lang="en-US" sz="4400" spc="-1" strike="noStrike">
               <a:latin typeface="Arial"/>
@@ -5978,8 +6031,8 @@
         </p:nvSpPr>
         <p:spPr>
           <a:xfrm>
-            <a:off x="457200" y="197280"/>
-            <a:ext cx="9069840" cy="945000"/>
+            <a:off x="540000" y="139680"/>
+            <a:ext cx="8998200" cy="1248840"/>
           </a:xfrm>
           <a:prstGeom prst="rect">
             <a:avLst/>
@@ -6007,7 +6060,7 @@
                 </a:solidFill>
                 <a:latin typeface="Arial"/>
               </a:rPr>
-              <a:t>ERD w/ fav</a:t>
+              <a:t>Talk about what did not go well</a:t>
             </a:r>
             <a:endParaRPr b="0" lang="en-US" sz="4400" spc="-1" strike="noStrike">
               <a:latin typeface="Arial"/>
@@ -6015,29 +6068,157 @@
           </a:p>
         </p:txBody>
       </p:sp>
-      <p:pic>
-        <p:nvPicPr>
-          <p:cNvPr id="73" name="" descr=""/>
-          <p:cNvPicPr/>
-          <p:nvPr/>
-        </p:nvPicPr>
-        <p:blipFill>
-          <a:blip r:embed="rId1"/>
-          <a:stretch/>
-        </p:blipFill>
-        <p:spPr>
-          <a:xfrm>
-            <a:off x="457200" y="1298880"/>
-            <a:ext cx="9371880" cy="3958200"/>
-          </a:xfrm>
-          <a:prstGeom prst="rect">
-            <a:avLst/>
-          </a:prstGeom>
-          <a:ln w="0">
-            <a:noFill/>
-          </a:ln>
-        </p:spPr>
-      </p:pic>
+      <p:sp>
+        <p:nvSpPr>
+          <p:cNvPr id="73" name="PlaceHolder 2"/>
+          <p:cNvSpPr>
+            <a:spLocks noGrp="1"/>
+          </p:cNvSpPr>
+          <p:nvPr>
+            <p:ph/>
+          </p:nvPr>
+        </p:nvSpPr>
+        <p:spPr>
+          <a:xfrm>
+            <a:off x="504000" y="1326600"/>
+            <a:ext cx="9070560" cy="3287160"/>
+          </a:xfrm>
+          <a:prstGeom prst="rect">
+            <a:avLst/>
+          </a:prstGeom>
+          <a:noFill/>
+          <a:ln w="0">
+            <a:noFill/>
+          </a:ln>
+        </p:spPr>
+        <p:txBody>
+          <a:bodyPr lIns="0" rIns="0" tIns="0" bIns="0" anchor="t">
+            <a:normAutofit/>
+          </a:bodyPr>
+          <a:p>
+            <a:pPr marL="432000" indent="-324000">
+              <a:lnSpc>
+                <a:spcPct val="100000"/>
+              </a:lnSpc>
+              <a:buClr>
+                <a:srgbClr val="000000"/>
+              </a:buClr>
+              <a:buFont typeface="Wingdings" charset="2"/>
+              <a:buChar char=""/>
+            </a:pPr>
+            <a:r>
+              <a:rPr b="0" lang="en-US" sz="1800" spc="-1" strike="noStrike">
+                <a:solidFill>
+                  <a:srgbClr val="ffffff"/>
+                </a:solidFill>
+                <a:latin typeface="Arial"/>
+              </a:rPr>
+              <a:t>Adoption of new languages (PHP, CSS &amp; JS)</a:t>
+            </a:r>
+            <a:endParaRPr b="0" lang="en-US" sz="1800" spc="-1" strike="noStrike">
+              <a:solidFill>
+                <a:srgbClr val="ffffff"/>
+              </a:solidFill>
+              <a:latin typeface="Arial"/>
+            </a:endParaRPr>
+          </a:p>
+          <a:p>
+            <a:pPr marL="432000" indent="-324000">
+              <a:lnSpc>
+                <a:spcPct val="100000"/>
+              </a:lnSpc>
+              <a:buClr>
+                <a:srgbClr val="000000"/>
+              </a:buClr>
+              <a:buFont typeface="Wingdings" charset="2"/>
+              <a:buChar char=""/>
+            </a:pPr>
+            <a:r>
+              <a:rPr b="0" lang="en-US" sz="1800" spc="-1" strike="noStrike">
+                <a:solidFill>
+                  <a:srgbClr val="ffffff"/>
+                </a:solidFill>
+                <a:latin typeface="Arial"/>
+              </a:rPr>
+              <a:t>(Working in a real team with task-dependencies)?</a:t>
+            </a:r>
+            <a:endParaRPr b="0" lang="en-US" sz="1800" spc="-1" strike="noStrike">
+              <a:solidFill>
+                <a:srgbClr val="ffffff"/>
+              </a:solidFill>
+              <a:latin typeface="Arial"/>
+            </a:endParaRPr>
+          </a:p>
+          <a:p>
+            <a:pPr marL="432000" indent="-324000">
+              <a:lnSpc>
+                <a:spcPct val="100000"/>
+              </a:lnSpc>
+              <a:buClr>
+                <a:srgbClr val="000000"/>
+              </a:buClr>
+              <a:buFont typeface="Wingdings" charset="2"/>
+              <a:buChar char=""/>
+            </a:pPr>
+            <a:r>
+              <a:rPr b="0" lang="en-US" sz="1800" spc="-1" strike="noStrike">
+                <a:solidFill>
+                  <a:srgbClr val="ffffff"/>
+                </a:solidFill>
+                <a:latin typeface="Arial"/>
+              </a:rPr>
+              <a:t>Scheduling and workflow (late start, slow-start)</a:t>
+            </a:r>
+            <a:endParaRPr b="0" lang="en-US" sz="1800" spc="-1" strike="noStrike">
+              <a:solidFill>
+                <a:srgbClr val="ffffff"/>
+              </a:solidFill>
+              <a:latin typeface="Arial"/>
+            </a:endParaRPr>
+          </a:p>
+          <a:p>
+            <a:pPr marL="432000" indent="-324000">
+              <a:lnSpc>
+                <a:spcPct val="100000"/>
+              </a:lnSpc>
+              <a:buClr>
+                <a:srgbClr val="000000"/>
+              </a:buClr>
+              <a:buFont typeface="Wingdings" charset="2"/>
+              <a:buChar char=""/>
+            </a:pPr>
+            <a:r>
+              <a:rPr b="0" lang="en-US" sz="1800" spc="-1" strike="noStrike">
+                <a:solidFill>
+                  <a:srgbClr val="ffffff"/>
+                </a:solidFill>
+                <a:latin typeface="Arial"/>
+              </a:rPr>
+              <a:t> </a:t>
+            </a:r>
+            <a:endParaRPr b="0" lang="en-US" sz="1800" spc="-1" strike="noStrike">
+              <a:solidFill>
+                <a:srgbClr val="ffffff"/>
+              </a:solidFill>
+              <a:latin typeface="Arial"/>
+            </a:endParaRPr>
+          </a:p>
+          <a:p>
+            <a:pPr>
+              <a:lnSpc>
+                <a:spcPct val="100000"/>
+              </a:lnSpc>
+              <a:buNone/>
+            </a:pPr>
+            <a:endParaRPr b="0" lang="en-US" sz="1800" spc="-1" strike="noStrike">
+              <a:solidFill>
+                <a:srgbClr val="ffffff"/>
+              </a:solidFill>
+              <a:latin typeface="Arial"/>
+            </a:endParaRPr>
+          </a:p>
+        </p:txBody>
+      </p:sp>
     </p:spTree>
   </p:cSld>
   <mc:AlternateContent>
@@ -6080,8 +6261,8 @@
         </p:nvSpPr>
         <p:spPr>
           <a:xfrm>
-            <a:off x="457200" y="197280"/>
-            <a:ext cx="9069840" cy="945000"/>
+            <a:off x="540000" y="139680"/>
+            <a:ext cx="8998200" cy="1248840"/>
           </a:xfrm>
           <a:prstGeom prst="rect">
             <a:avLst/>
@@ -6109,7 +6290,7 @@
                 </a:solidFill>
                 <a:latin typeface="Arial"/>
               </a:rPr>
-              <a:t>ERD w/o fav</a:t>
+              <a:t>Talk about what went well </a:t>
             </a:r>
             <a:endParaRPr b="0" lang="en-US" sz="4400" spc="-1" strike="noStrike">
               <a:latin typeface="Arial"/>
@@ -6117,29 +6298,89 @@
           </a:p>
         </p:txBody>
       </p:sp>
-      <p:pic>
-        <p:nvPicPr>
-          <p:cNvPr id="75" name="" descr=""/>
-          <p:cNvPicPr/>
-          <p:nvPr/>
-        </p:nvPicPr>
-        <p:blipFill>
-          <a:blip r:embed="rId1"/>
-          <a:stretch/>
-        </p:blipFill>
-        <p:spPr>
-          <a:xfrm>
-            <a:off x="914400" y="1371600"/>
-            <a:ext cx="8434440" cy="3628080"/>
-          </a:xfrm>
-          <a:prstGeom prst="rect">
-            <a:avLst/>
-          </a:prstGeom>
-          <a:ln w="0">
-            <a:noFill/>
-          </a:ln>
-        </p:spPr>
-      </p:pic>
+      <p:sp>
+        <p:nvSpPr>
+          <p:cNvPr id="75" name="PlaceHolder 2"/>
+          <p:cNvSpPr>
+            <a:spLocks noGrp="1"/>
+          </p:cNvSpPr>
+          <p:nvPr>
+            <p:ph/>
+          </p:nvPr>
+        </p:nvSpPr>
+        <p:spPr>
+          <a:xfrm>
+            <a:off x="504000" y="1326600"/>
+            <a:ext cx="9070560" cy="3287160"/>
+          </a:xfrm>
+          <a:prstGeom prst="rect">
+            <a:avLst/>
+          </a:prstGeom>
+          <a:noFill/>
+          <a:ln w="0">
+            <a:noFill/>
+          </a:ln>
+        </p:spPr>
+        <p:txBody>
+          <a:bodyPr lIns="0" rIns="0" tIns="0" bIns="0" anchor="t">
+            <a:normAutofit/>
+          </a:bodyPr>
+          <a:p>
+            <a:pPr marL="432000" indent="-324000">
+              <a:lnSpc>
+                <a:spcPct val="100000"/>
+              </a:lnSpc>
+              <a:buClr>
+                <a:srgbClr val="000000"/>
+              </a:buClr>
+              <a:buFont typeface="Wingdings" charset="2"/>
+              <a:buChar char=""/>
+            </a:pPr>
+            <a:r>
+              <a:rPr b="0" lang="en-US" sz="1800" spc="-1" strike="noStrike">
+                <a:solidFill>
+                  <a:srgbClr val="ffffff"/>
+                </a:solidFill>
+                <a:latin typeface="Arial"/>
+              </a:rPr>
+              <a:t>Communication was solid</a:t>
+            </a:r>
+            <a:endParaRPr b="0" lang="en-US" sz="1800" spc="-1" strike="noStrike">
+              <a:solidFill>
+                <a:srgbClr val="ffffff"/>
+              </a:solidFill>
+              <a:latin typeface="Arial"/>
+            </a:endParaRPr>
+          </a:p>
+          <a:p>
+            <a:pPr marL="432000" indent="-324000">
+              <a:lnSpc>
+                <a:spcPct val="100000"/>
+              </a:lnSpc>
+              <a:buClr>
+                <a:srgbClr val="000000"/>
+              </a:buClr>
+              <a:buFont typeface="Wingdings" charset="2"/>
+              <a:buChar char=""/>
+            </a:pPr>
+            <a:r>
+              <a:rPr b="0" lang="en-US" sz="1800" spc="-1" strike="noStrike">
+                <a:solidFill>
+                  <a:srgbClr val="ffffff"/>
+                </a:solidFill>
+                <a:latin typeface="Arial"/>
+              </a:rPr>
+              <a:t>No conflicts between teammates</a:t>
+            </a:r>
+            <a:endParaRPr b="0" lang="en-US" sz="1800" spc="-1" strike="noStrike">
+              <a:solidFill>
+                <a:srgbClr val="ffffff"/>
+              </a:solidFill>
+              <a:latin typeface="Arial"/>
+            </a:endParaRPr>
+          </a:p>
+        </p:txBody>
+      </p:sp>
     </p:spTree>
   </p:cSld>
   <mc:AlternateContent>
@@ -6172,13 +6413,17 @@
       </p:grpSpPr>
       <p:sp>
         <p:nvSpPr>
-          <p:cNvPr id="76" name="PlaceHolder 3"/>
-          <p:cNvSpPr txBox="1"/>
-          <p:nvPr/>
-        </p:nvSpPr>
-        <p:spPr>
-          <a:xfrm>
-            <a:off x="457200" y="197640"/>
+          <p:cNvPr id="76" name="PlaceHolder 1"/>
+          <p:cNvSpPr>
+            <a:spLocks noGrp="1"/>
+          </p:cNvSpPr>
+          <p:nvPr>
+            <p:ph type="title"/>
+          </p:nvPr>
+        </p:nvSpPr>
+        <p:spPr>
+          <a:xfrm>
+            <a:off x="457200" y="197280"/>
             <a:ext cx="9069840" cy="945000"/>
           </a:xfrm>
           <a:prstGeom prst="rect">
@@ -6207,7 +6452,7 @@
                 </a:solidFill>
                 <a:latin typeface="Arial"/>
               </a:rPr>
-              <a:t>ERD?</a:t>
+              <a:t>ERD w/ fav</a:t>
             </a:r>
             <a:endParaRPr b="0" lang="en-US" sz="4400" spc="-1" strike="noStrike">
               <a:latin typeface="Arial"/>
@@ -6227,8 +6472,8 @@
         </p:blipFill>
         <p:spPr>
           <a:xfrm>
-            <a:off x="1256040" y="1509840"/>
-            <a:ext cx="7887960" cy="3290760"/>
+            <a:off x="457200" y="1298880"/>
+            <a:ext cx="9371880" cy="3958200"/>
           </a:xfrm>
           <a:prstGeom prst="rect">
             <a:avLst/>
@@ -6280,7 +6525,7 @@
         </p:nvSpPr>
         <p:spPr>
           <a:xfrm>
-            <a:off x="531000" y="197640"/>
+            <a:off x="457200" y="197280"/>
             <a:ext cx="9069840" cy="945000"/>
           </a:xfrm>
           <a:prstGeom prst="rect">
@@ -6309,7 +6554,7 @@
                 </a:solidFill>
                 <a:latin typeface="Arial"/>
               </a:rPr>
-              <a:t>Gantt chart</a:t>
+              <a:t>ERD w/o fav</a:t>
             </a:r>
             <a:endParaRPr b="0" lang="en-US" sz="4400" spc="-1" strike="noStrike">
               <a:latin typeface="Arial"/>
@@ -6329,8 +6574,8 @@
         </p:blipFill>
         <p:spPr>
           <a:xfrm>
-            <a:off x="4320" y="1337760"/>
-            <a:ext cx="10080000" cy="2988000"/>
+            <a:off x="914400" y="1371600"/>
+            <a:ext cx="8434440" cy="3628080"/>
           </a:xfrm>
           <a:prstGeom prst="rect">
             <a:avLst/>

</xml_diff>

<commit_message>
Edited Use Case Diagram for Pres
</commit_message>
<xml_diff>
--- a/Pres.pptx
+++ b/Pres.pptx
@@ -126,6 +126,11 @@
       </a:defRPr>
     </a:lvl9pPr>
   </p:defaultTextStyle>
+  <p:extLst>
+    <p:ext uri="{EFAFB233-063F-42B5-8137-9DF3F51BA10A}">
+      <p15:sldGuideLst xmlns:p15="http://schemas.microsoft.com/office/powerpoint/2012/main"/>
+    </p:ext>
+  </p:extLst>
 </p:presentation>
 </file>
 
@@ -3780,7 +3785,7 @@
         </p:blipFill>
         <p:spPr>
           <a:xfrm>
-            <a:off x="777600" y="680400"/>
+            <a:off x="575969" y="680400"/>
             <a:ext cx="8822520" cy="4962240"/>
           </a:xfrm>
           <a:prstGeom prst="rect">
@@ -3789,6 +3794,42 @@
           <a:ln w="0">
             <a:noFill/>
           </a:ln>
+        </p:spPr>
+      </p:pic>
+      <p:pic>
+        <p:nvPicPr>
+          <p:cNvPr id="3" name="Picture 2" descr="A diagram of a contact manager&#10;&#10;Description automatically generated">
+            <a:extLst>
+              <a:ext uri="{FF2B5EF4-FFF2-40B4-BE49-F238E27FC236}">
+                <a16:creationId xmlns:a16="http://schemas.microsoft.com/office/drawing/2014/main" id="{96E87136-5ED5-0AD7-EC01-ECD3A1DBEDC1}"/>
+              </a:ext>
+            </a:extLst>
+          </p:cNvPr>
+          <p:cNvPicPr>
+            <a:picLocks noChangeAspect="1"/>
+          </p:cNvPicPr>
+          <p:nvPr/>
+        </p:nvPicPr>
+        <p:blipFill>
+          <a:blip r:embed="rId3" cstate="print">
+            <a:extLst>
+              <a:ext uri="{28A0092B-C50C-407E-A947-70E740481C1C}">
+                <a14:useLocalDpi xmlns:a14="http://schemas.microsoft.com/office/drawing/2010/main" val="0"/>
+              </a:ext>
+            </a:extLst>
+          </a:blip>
+          <a:stretch>
+            <a:fillRect/>
+          </a:stretch>
+        </p:blipFill>
+        <p:spPr>
+          <a:xfrm>
+            <a:off x="427422" y="680399"/>
+            <a:ext cx="9119614" cy="4962239"/>
+          </a:xfrm>
+          <a:prstGeom prst="rect">
+            <a:avLst/>
+          </a:prstGeom>
         </p:spPr>
       </p:pic>
     </p:spTree>
@@ -5517,7 +5558,7 @@
         </p:spPr>
         <p:txBody>
           <a:bodyPr lIns="0" tIns="0" rIns="0" bIns="0" anchor="t">
-            <a:normAutofit fontScale="63000" lnSpcReduction="10000"/>
+            <a:normAutofit fontScale="70500" lnSpcReduction="20000"/>
           </a:bodyPr>
           <a:lstStyle/>
           <a:p>
@@ -5814,7 +5855,7 @@
         </p:spPr>
         <p:txBody>
           <a:bodyPr lIns="0" tIns="0" rIns="0" bIns="0" anchor="t">
-            <a:normAutofit fontScale="46500" lnSpcReduction="10000"/>
+            <a:normAutofit fontScale="46500" lnSpcReduction="20000"/>
           </a:bodyPr>
           <a:lstStyle/>
           <a:p>

</xml_diff>